<commit_message>
ppt date + tot
</commit_message>
<xml_diff>
--- a/A4_Presentation.pptx
+++ b/A4_Presentation.pptx
@@ -5,7 +5,7 @@
     <p:sldMasterId id="2147483660" r:id="rId1"/>
   </p:sldMasterIdLst>
   <p:handoutMasterIdLst>
-    <p:handoutMasterId r:id="rId17"/>
+    <p:handoutMasterId r:id="rId19"/>
   </p:handoutMasterIdLst>
   <p:sldIdLst>
     <p:sldId id="280" r:id="rId2"/>
@@ -21,8 +21,10 @@
     <p:sldId id="285" r:id="rId12"/>
     <p:sldId id="286" r:id="rId13"/>
     <p:sldId id="289" r:id="rId14"/>
-    <p:sldId id="287" r:id="rId15"/>
-    <p:sldId id="290" r:id="rId16"/>
+    <p:sldId id="296" r:id="rId15"/>
+    <p:sldId id="297" r:id="rId16"/>
+    <p:sldId id="287" r:id="rId17"/>
+    <p:sldId id="290" r:id="rId18"/>
   </p:sldIdLst>
   <p:sldSz cx="24387175" cy="13716000"/>
   <p:notesSz cx="6858000" cy="9144000"/>
@@ -788,12 +790,12 @@
           </a:ln>
           <a:extLst>
             <a:ext uri="{909E8E84-426E-40dd-AFC4-6F175D3DCCD1}">
-              <a14:hiddenFill xmlns:a14="http://schemas.microsoft.com/office/drawing/2010/main" xmlns="">
+              <a14:hiddenFill xmlns="" xmlns:a14="http://schemas.microsoft.com/office/drawing/2010/main">
                 <a:noFill/>
               </a14:hiddenFill>
             </a:ext>
             <a:ext uri="{91240B29-F687-4f45-9708-019B960494DF}">
-              <a14:hiddenLine xmlns:a14="http://schemas.microsoft.com/office/drawing/2010/main" xmlns="" w="9525">
+              <a14:hiddenLine xmlns="" xmlns:a14="http://schemas.microsoft.com/office/drawing/2010/main" w="9525">
                 <a:solidFill>
                   <a:srgbClr val="000000"/>
                 </a:solidFill>
@@ -838,12 +840,12 @@
           </a:ln>
           <a:extLst>
             <a:ext uri="{909E8E84-426E-40dd-AFC4-6F175D3DCCD1}">
-              <a14:hiddenFill xmlns:a14="http://schemas.microsoft.com/office/drawing/2010/main" xmlns="">
+              <a14:hiddenFill xmlns="" xmlns:a14="http://schemas.microsoft.com/office/drawing/2010/main">
                 <a:noFill/>
               </a14:hiddenFill>
             </a:ext>
             <a:ext uri="{91240B29-F687-4f45-9708-019B960494DF}">
-              <a14:hiddenLine xmlns:a14="http://schemas.microsoft.com/office/drawing/2010/main" xmlns="" w="9525">
+              <a14:hiddenLine xmlns="" xmlns:a14="http://schemas.microsoft.com/office/drawing/2010/main" w="9525">
                 <a:solidFill>
                   <a:srgbClr val="000000"/>
                 </a:solidFill>
@@ -1370,11 +1372,14 @@
             </a:r>
           </a:p>
           <a:p>
-            <a:endParaRPr lang="fr-FR" sz="2800" dirty="0">
-              <a:latin typeface="Open Sans" panose="020B0606030504020204" pitchFamily="34" charset="0"/>
-              <a:ea typeface="Open Sans" panose="020B0606030504020204" pitchFamily="34" charset="0"/>
-              <a:cs typeface="Open Sans" panose="020B0606030504020204" pitchFamily="34" charset="0"/>
-            </a:endParaRPr>
+            <a:r>
+              <a:rPr lang="fr-FR" sz="2800" dirty="0">
+                <a:latin typeface="Open Sans" panose="020B0606030504020204" pitchFamily="34" charset="0"/>
+                <a:ea typeface="Open Sans" panose="020B0606030504020204" pitchFamily="34" charset="0"/>
+                <a:cs typeface="Open Sans" panose="020B0606030504020204" pitchFamily="34" charset="0"/>
+              </a:rPr>
+              <a:t>…</a:t>
+            </a:r>
           </a:p>
         </p:txBody>
       </p:sp>
@@ -1393,7 +1398,7 @@
         <p:spPr>
           <a:xfrm>
             <a:off x="13141915" y="2815521"/>
-            <a:ext cx="10279444" cy="9325630"/>
+            <a:ext cx="10279444" cy="9787295"/>
           </a:xfrm>
           <a:prstGeom prst="rect">
             <a:avLst/>
@@ -1404,6 +1409,16 @@
             <a:spAutoFit/>
           </a:bodyPr>
           <a:lstStyle/>
+          <a:p>
+            <a:r>
+              <a:rPr lang="fr-FR" sz="3000" dirty="0">
+                <a:latin typeface="Open Sans" panose="020B0606030504020204" pitchFamily="34" charset="0"/>
+                <a:ea typeface="Open Sans" panose="020B0606030504020204" pitchFamily="34" charset="0"/>
+                <a:cs typeface="Open Sans" panose="020B0606030504020204" pitchFamily="34" charset="0"/>
+              </a:rPr>
+              <a:t>…</a:t>
+            </a:r>
+          </a:p>
           <a:p>
             <a:r>
               <a:rPr lang="fr-FR" sz="3000" dirty="0">
@@ -2463,6 +2478,14 @@
 <file path=ppt/slides/slide13.xml><?xml version="1.0" encoding="utf-8"?>
 <p:sld xmlns:a="http://schemas.openxmlformats.org/drawingml/2006/main" xmlns:r="http://schemas.openxmlformats.org/officeDocument/2006/relationships" xmlns:p="http://schemas.openxmlformats.org/presentationml/2006/main">
   <p:cSld>
+    <p:bg>
+      <p:bgPr>
+        <a:solidFill>
+          <a:srgbClr val="0070C0"/>
+        </a:solidFill>
+        <a:effectLst/>
+      </p:bgPr>
+    </p:bg>
     <p:spTree>
       <p:nvGrpSpPr>
         <p:cNvPr id="1" name=""/>
@@ -3035,6 +3058,1469 @@
       </p:grpSpPr>
       <p:sp>
         <p:nvSpPr>
+          <p:cNvPr id="3" name="ZoneTexte 2">
+            <a:extLst>
+              <a:ext uri="{FF2B5EF4-FFF2-40B4-BE49-F238E27FC236}">
+                <a16:creationId xmlns:a16="http://schemas.microsoft.com/office/drawing/2014/main" id="{168B7E97-4894-436F-9382-6A92F4014357}"/>
+              </a:ext>
+            </a:extLst>
+          </p:cNvPr>
+          <p:cNvSpPr txBox="1"/>
+          <p:nvPr/>
+        </p:nvSpPr>
+        <p:spPr>
+          <a:xfrm>
+            <a:off x="2375271" y="1113184"/>
+            <a:ext cx="17880677" cy="1046440"/>
+          </a:xfrm>
+          <a:prstGeom prst="rect">
+            <a:avLst/>
+          </a:prstGeom>
+          <a:noFill/>
+        </p:spPr>
+        <p:txBody>
+          <a:bodyPr wrap="square" rtlCol="0">
+            <a:spAutoFit/>
+          </a:bodyPr>
+          <a:lstStyle/>
+          <a:p>
+            <a:r>
+              <a:rPr lang="fr-FR" sz="6200" b="1" dirty="0">
+                <a:latin typeface="Montserrat" panose="00000500000000000000" pitchFamily="2" charset="0"/>
+              </a:rPr>
+              <a:t>V : Méthode de l’ordonnancement</a:t>
+            </a:r>
+          </a:p>
+        </p:txBody>
+      </p:sp>
+      <p:sp>
+        <p:nvSpPr>
+          <p:cNvPr id="4" name="Oval 58">
+            <a:extLst>
+              <a:ext uri="{FF2B5EF4-FFF2-40B4-BE49-F238E27FC236}">
+                <a16:creationId xmlns:a16="http://schemas.microsoft.com/office/drawing/2014/main" id="{B07BAEF7-F2F1-4129-850F-39566CB7AE7B}"/>
+              </a:ext>
+            </a:extLst>
+          </p:cNvPr>
+          <p:cNvSpPr/>
+          <p:nvPr/>
+        </p:nvSpPr>
+        <p:spPr>
+          <a:xfrm>
+            <a:off x="1673229" y="3765604"/>
+            <a:ext cx="1074332" cy="1074611"/>
+          </a:xfrm>
+          <a:prstGeom prst="ellipse">
+            <a:avLst/>
+          </a:prstGeom>
+          <a:noFill/>
+          <a:ln w="28575">
+            <a:solidFill>
+              <a:schemeClr val="tx1"/>
+            </a:solidFill>
+          </a:ln>
+        </p:spPr>
+        <p:style>
+          <a:lnRef idx="2">
+            <a:schemeClr val="accent1">
+              <a:shade val="50000"/>
+            </a:schemeClr>
+          </a:lnRef>
+          <a:fillRef idx="1">
+            <a:schemeClr val="accent1"/>
+          </a:fillRef>
+          <a:effectRef idx="0">
+            <a:schemeClr val="accent1"/>
+          </a:effectRef>
+          <a:fontRef idx="minor">
+            <a:schemeClr val="lt1"/>
+          </a:fontRef>
+        </p:style>
+        <p:txBody>
+          <a:bodyPr rtlCol="0" anchor="ctr"/>
+          <a:lstStyle/>
+          <a:p>
+            <a:pPr algn="ctr"/>
+            <a:endParaRPr lang="en-US" sz="2900" dirty="0">
+              <a:latin typeface="Montserrat Light" charset="0"/>
+              <a:ea typeface="Montserrat Light" charset="0"/>
+              <a:cs typeface="Montserrat Light" charset="0"/>
+            </a:endParaRPr>
+          </a:p>
+        </p:txBody>
+      </p:sp>
+      <p:sp>
+        <p:nvSpPr>
+          <p:cNvPr id="5" name="ZoneTexte 4">
+            <a:extLst>
+              <a:ext uri="{FF2B5EF4-FFF2-40B4-BE49-F238E27FC236}">
+                <a16:creationId xmlns:a16="http://schemas.microsoft.com/office/drawing/2014/main" id="{F680C0E6-F5ED-46B1-BB6D-14E0E90DF401}"/>
+              </a:ext>
+            </a:extLst>
+          </p:cNvPr>
+          <p:cNvSpPr txBox="1"/>
+          <p:nvPr/>
+        </p:nvSpPr>
+        <p:spPr>
+          <a:xfrm>
+            <a:off x="1827648" y="3856634"/>
+            <a:ext cx="765494" cy="892552"/>
+          </a:xfrm>
+          <a:prstGeom prst="rect">
+            <a:avLst/>
+          </a:prstGeom>
+          <a:noFill/>
+        </p:spPr>
+        <p:txBody>
+          <a:bodyPr wrap="square" rtlCol="0">
+            <a:spAutoFit/>
+          </a:bodyPr>
+          <a:lstStyle/>
+          <a:p>
+            <a:pPr algn="ctr"/>
+            <a:r>
+              <a:rPr lang="fr-FR" sz="5200" b="1" dirty="0">
+                <a:latin typeface="Montserrat" panose="00000500000000000000" pitchFamily="2" charset="0"/>
+              </a:rPr>
+              <a:t>1</a:t>
+            </a:r>
+          </a:p>
+        </p:txBody>
+      </p:sp>
+      <p:sp>
+        <p:nvSpPr>
+          <p:cNvPr id="6" name="ZoneTexte 5">
+            <a:extLst>
+              <a:ext uri="{FF2B5EF4-FFF2-40B4-BE49-F238E27FC236}">
+                <a16:creationId xmlns:a16="http://schemas.microsoft.com/office/drawing/2014/main" id="{110C598B-31D9-45EA-92EE-E3CCB76B189C}"/>
+              </a:ext>
+            </a:extLst>
+          </p:cNvPr>
+          <p:cNvSpPr txBox="1"/>
+          <p:nvPr/>
+        </p:nvSpPr>
+        <p:spPr>
+          <a:xfrm>
+            <a:off x="3813175" y="3702744"/>
+            <a:ext cx="7456472" cy="1200329"/>
+          </a:xfrm>
+          <a:prstGeom prst="rect">
+            <a:avLst/>
+          </a:prstGeom>
+          <a:noFill/>
+        </p:spPr>
+        <p:txBody>
+          <a:bodyPr wrap="square" rtlCol="0">
+            <a:spAutoFit/>
+          </a:bodyPr>
+          <a:lstStyle/>
+          <a:p>
+            <a:r>
+              <a:rPr lang="fr-FR" dirty="0">
+                <a:latin typeface="Open Sans" panose="020B0606030504020204" pitchFamily="34" charset="0"/>
+                <a:ea typeface="Open Sans" panose="020B0606030504020204" pitchFamily="34" charset="0"/>
+                <a:cs typeface="Open Sans" panose="020B0606030504020204" pitchFamily="34" charset="0"/>
+              </a:rPr>
+              <a:t>Récupération de la liste des prédécesseurs</a:t>
+            </a:r>
+          </a:p>
+        </p:txBody>
+      </p:sp>
+      <p:sp>
+        <p:nvSpPr>
+          <p:cNvPr id="8" name="Oval 58">
+            <a:extLst>
+              <a:ext uri="{FF2B5EF4-FFF2-40B4-BE49-F238E27FC236}">
+                <a16:creationId xmlns:a16="http://schemas.microsoft.com/office/drawing/2014/main" id="{C7DDF454-155F-4E61-AFEC-FEA3F830D8B6}"/>
+              </a:ext>
+            </a:extLst>
+          </p:cNvPr>
+          <p:cNvSpPr/>
+          <p:nvPr/>
+        </p:nvSpPr>
+        <p:spPr>
+          <a:xfrm>
+            <a:off x="1653792" y="10439313"/>
+            <a:ext cx="1074332" cy="1074611"/>
+          </a:xfrm>
+          <a:prstGeom prst="ellipse">
+            <a:avLst/>
+          </a:prstGeom>
+          <a:noFill/>
+          <a:ln w="28575">
+            <a:solidFill>
+              <a:schemeClr val="tx1"/>
+            </a:solidFill>
+          </a:ln>
+        </p:spPr>
+        <p:style>
+          <a:lnRef idx="2">
+            <a:schemeClr val="accent1">
+              <a:shade val="50000"/>
+            </a:schemeClr>
+          </a:lnRef>
+          <a:fillRef idx="1">
+            <a:schemeClr val="accent1"/>
+          </a:fillRef>
+          <a:effectRef idx="0">
+            <a:schemeClr val="accent1"/>
+          </a:effectRef>
+          <a:fontRef idx="minor">
+            <a:schemeClr val="lt1"/>
+          </a:fontRef>
+        </p:style>
+        <p:txBody>
+          <a:bodyPr rtlCol="0" anchor="ctr"/>
+          <a:lstStyle/>
+          <a:p>
+            <a:pPr algn="ctr"/>
+            <a:endParaRPr lang="en-US" sz="2900" dirty="0">
+              <a:latin typeface="Montserrat Light" charset="0"/>
+              <a:ea typeface="Montserrat Light" charset="0"/>
+              <a:cs typeface="Montserrat Light" charset="0"/>
+            </a:endParaRPr>
+          </a:p>
+        </p:txBody>
+      </p:sp>
+      <p:sp>
+        <p:nvSpPr>
+          <p:cNvPr id="9" name="ZoneTexte 8">
+            <a:extLst>
+              <a:ext uri="{FF2B5EF4-FFF2-40B4-BE49-F238E27FC236}">
+                <a16:creationId xmlns:a16="http://schemas.microsoft.com/office/drawing/2014/main" id="{F4424929-5651-49E7-8B2F-63484DFC02E3}"/>
+              </a:ext>
+            </a:extLst>
+          </p:cNvPr>
+          <p:cNvSpPr txBox="1"/>
+          <p:nvPr/>
+        </p:nvSpPr>
+        <p:spPr>
+          <a:xfrm>
+            <a:off x="3813175" y="10439492"/>
+            <a:ext cx="7456472" cy="1200329"/>
+          </a:xfrm>
+          <a:prstGeom prst="rect">
+            <a:avLst/>
+          </a:prstGeom>
+          <a:noFill/>
+        </p:spPr>
+        <p:txBody>
+          <a:bodyPr wrap="square" rtlCol="0">
+            <a:spAutoFit/>
+          </a:bodyPr>
+          <a:lstStyle/>
+          <a:p>
+            <a:r>
+              <a:rPr lang="fr-FR" dirty="0">
+                <a:latin typeface="Open Sans" panose="020B0606030504020204" pitchFamily="34" charset="0"/>
+                <a:ea typeface="Open Sans" panose="020B0606030504020204" pitchFamily="34" charset="0"/>
+                <a:cs typeface="Open Sans" panose="020B0606030504020204" pitchFamily="34" charset="0"/>
+              </a:rPr>
+              <a:t>Récupération de la tâche de chaque prédécesseurs</a:t>
+            </a:r>
+          </a:p>
+        </p:txBody>
+      </p:sp>
+      <p:sp>
+        <p:nvSpPr>
+          <p:cNvPr id="10" name="ZoneTexte 9">
+            <a:extLst>
+              <a:ext uri="{FF2B5EF4-FFF2-40B4-BE49-F238E27FC236}">
+                <a16:creationId xmlns:a16="http://schemas.microsoft.com/office/drawing/2014/main" id="{D7B59304-604B-48E2-BDA1-4BACBADAC7DD}"/>
+              </a:ext>
+            </a:extLst>
+          </p:cNvPr>
+          <p:cNvSpPr txBox="1"/>
+          <p:nvPr/>
+        </p:nvSpPr>
+        <p:spPr>
+          <a:xfrm>
+            <a:off x="1808211" y="10530341"/>
+            <a:ext cx="765494" cy="892552"/>
+          </a:xfrm>
+          <a:prstGeom prst="rect">
+            <a:avLst/>
+          </a:prstGeom>
+          <a:noFill/>
+        </p:spPr>
+        <p:txBody>
+          <a:bodyPr wrap="square" rtlCol="0">
+            <a:spAutoFit/>
+          </a:bodyPr>
+          <a:lstStyle/>
+          <a:p>
+            <a:pPr algn="ctr"/>
+            <a:r>
+              <a:rPr lang="fr-FR" sz="5200" b="1" dirty="0">
+                <a:latin typeface="Montserrat" panose="00000500000000000000" pitchFamily="2" charset="0"/>
+              </a:rPr>
+              <a:t>2</a:t>
+            </a:r>
+          </a:p>
+        </p:txBody>
+      </p:sp>
+      <p:sp>
+        <p:nvSpPr>
+          <p:cNvPr id="12" name="Rectangle 11">
+            <a:extLst>
+              <a:ext uri="{FF2B5EF4-FFF2-40B4-BE49-F238E27FC236}">
+                <a16:creationId xmlns:a16="http://schemas.microsoft.com/office/drawing/2014/main" id="{193DAD89-4DD8-47EB-9C8D-35040D650EF0}"/>
+              </a:ext>
+            </a:extLst>
+          </p:cNvPr>
+          <p:cNvSpPr/>
+          <p:nvPr/>
+        </p:nvSpPr>
+        <p:spPr>
+          <a:xfrm>
+            <a:off x="13247048" y="2729880"/>
+            <a:ext cx="9466898" cy="4708981"/>
+          </a:xfrm>
+          <a:prstGeom prst="rect">
+            <a:avLst/>
+          </a:prstGeom>
+        </p:spPr>
+        <p:txBody>
+          <a:bodyPr wrap="square">
+            <a:spAutoFit/>
+          </a:bodyPr>
+          <a:lstStyle/>
+          <a:p>
+            <a:r>
+              <a:rPr lang="fr-FR" sz="3000" dirty="0" err="1">
+                <a:latin typeface="Open Sans" panose="020B0606030504020204" pitchFamily="34" charset="0"/>
+                <a:ea typeface="Open Sans" panose="020B0606030504020204" pitchFamily="34" charset="0"/>
+                <a:cs typeface="Open Sans" panose="020B0606030504020204" pitchFamily="34" charset="0"/>
+              </a:rPr>
+              <a:t>array</a:t>
+            </a:r>
+            <a:r>
+              <a:rPr lang="fr-FR" sz="3000" dirty="0">
+                <a:latin typeface="Open Sans" panose="020B0606030504020204" pitchFamily="34" charset="0"/>
+                <a:ea typeface="Open Sans" panose="020B0606030504020204" pitchFamily="34" charset="0"/>
+                <a:cs typeface="Open Sans" panose="020B0606030504020204" pitchFamily="34" charset="0"/>
+              </a:rPr>
+              <a:t>[2][</a:t>
+            </a:r>
+            <a:r>
+              <a:rPr lang="fr-FR" sz="3000" dirty="0" err="1">
+                <a:latin typeface="Open Sans" panose="020B0606030504020204" pitchFamily="34" charset="0"/>
+                <a:ea typeface="Open Sans" panose="020B0606030504020204" pitchFamily="34" charset="0"/>
+                <a:cs typeface="Open Sans" panose="020B0606030504020204" pitchFamily="34" charset="0"/>
+              </a:rPr>
+              <a:t>nbSommet</a:t>
+            </a:r>
+            <a:r>
+              <a:rPr lang="fr-FR" sz="3000" dirty="0">
+                <a:latin typeface="Open Sans" panose="020B0606030504020204" pitchFamily="34" charset="0"/>
+                <a:ea typeface="Open Sans" panose="020B0606030504020204" pitchFamily="34" charset="0"/>
+                <a:cs typeface="Open Sans" panose="020B0606030504020204" pitchFamily="34" charset="0"/>
+              </a:rPr>
+              <a:t>]</a:t>
+            </a:r>
+          </a:p>
+          <a:p>
+            <a:r>
+              <a:rPr lang="fr-FR" sz="3000" dirty="0" err="1">
+                <a:latin typeface="Open Sans" panose="020B0606030504020204" pitchFamily="34" charset="0"/>
+                <a:ea typeface="Open Sans" panose="020B0606030504020204" pitchFamily="34" charset="0"/>
+                <a:cs typeface="Open Sans" panose="020B0606030504020204" pitchFamily="34" charset="0"/>
+              </a:rPr>
+              <a:t>array</a:t>
+            </a:r>
+            <a:r>
+              <a:rPr lang="fr-FR" sz="3000" dirty="0">
+                <a:latin typeface="Open Sans" panose="020B0606030504020204" pitchFamily="34" charset="0"/>
+                <a:ea typeface="Open Sans" panose="020B0606030504020204" pitchFamily="34" charset="0"/>
+                <a:cs typeface="Open Sans" panose="020B0606030504020204" pitchFamily="34" charset="0"/>
+              </a:rPr>
+              <a:t>[0][0] = -1;</a:t>
+            </a:r>
+          </a:p>
+          <a:p>
+            <a:r>
+              <a:rPr lang="fr-FR" sz="3000" dirty="0" err="1">
+                <a:latin typeface="Open Sans" panose="020B0606030504020204" pitchFamily="34" charset="0"/>
+                <a:ea typeface="Open Sans" panose="020B0606030504020204" pitchFamily="34" charset="0"/>
+                <a:cs typeface="Open Sans" panose="020B0606030504020204" pitchFamily="34" charset="0"/>
+              </a:rPr>
+              <a:t>array</a:t>
+            </a:r>
+            <a:r>
+              <a:rPr lang="fr-FR" sz="3000" dirty="0">
+                <a:latin typeface="Open Sans" panose="020B0606030504020204" pitchFamily="34" charset="0"/>
+                <a:ea typeface="Open Sans" panose="020B0606030504020204" pitchFamily="34" charset="0"/>
+                <a:cs typeface="Open Sans" panose="020B0606030504020204" pitchFamily="34" charset="0"/>
+              </a:rPr>
+              <a:t>[1][0] = 0;</a:t>
+            </a:r>
+          </a:p>
+          <a:p>
+            <a:r>
+              <a:rPr lang="fr-FR" sz="3000" dirty="0">
+                <a:latin typeface="Open Sans" panose="020B0606030504020204" pitchFamily="34" charset="0"/>
+                <a:ea typeface="Open Sans" panose="020B0606030504020204" pitchFamily="34" charset="0"/>
+                <a:cs typeface="Open Sans" panose="020B0606030504020204" pitchFamily="34" charset="0"/>
+              </a:rPr>
+              <a:t>pour i allant 1 à nbSommet-1</a:t>
+            </a:r>
+          </a:p>
+          <a:p>
+            <a:r>
+              <a:rPr lang="fr-FR" sz="3000" dirty="0">
+                <a:latin typeface="Open Sans" panose="020B0606030504020204" pitchFamily="34" charset="0"/>
+                <a:ea typeface="Open Sans" panose="020B0606030504020204" pitchFamily="34" charset="0"/>
+                <a:cs typeface="Open Sans" panose="020B0606030504020204" pitchFamily="34" charset="0"/>
+              </a:rPr>
+              <a:t>    pour j allant 0 à nbSommet-1</a:t>
+            </a:r>
+          </a:p>
+          <a:p>
+            <a:r>
+              <a:rPr lang="fr-FR" sz="3000" dirty="0">
+                <a:latin typeface="Open Sans" panose="020B0606030504020204" pitchFamily="34" charset="0"/>
+                <a:ea typeface="Open Sans" panose="020B0606030504020204" pitchFamily="34" charset="0"/>
+                <a:cs typeface="Open Sans" panose="020B0606030504020204" pitchFamily="34" charset="0"/>
+              </a:rPr>
+              <a:t>        si </a:t>
+            </a:r>
+            <a:r>
+              <a:rPr lang="fr-FR" sz="3000" dirty="0" err="1">
+                <a:latin typeface="Open Sans" panose="020B0606030504020204" pitchFamily="34" charset="0"/>
+                <a:ea typeface="Open Sans" panose="020B0606030504020204" pitchFamily="34" charset="0"/>
+                <a:cs typeface="Open Sans" panose="020B0606030504020204" pitchFamily="34" charset="0"/>
+              </a:rPr>
+              <a:t>matriceAdjacence</a:t>
+            </a:r>
+            <a:r>
+              <a:rPr lang="fr-FR" sz="3000" dirty="0">
+                <a:latin typeface="Open Sans" panose="020B0606030504020204" pitchFamily="34" charset="0"/>
+                <a:ea typeface="Open Sans" panose="020B0606030504020204" pitchFamily="34" charset="0"/>
+                <a:cs typeface="Open Sans" panose="020B0606030504020204" pitchFamily="34" charset="0"/>
+              </a:rPr>
+              <a:t>[j][</a:t>
+            </a:r>
+            <a:r>
+              <a:rPr lang="fr-FR" sz="3000" dirty="0" err="1">
+                <a:latin typeface="Open Sans" panose="020B0606030504020204" pitchFamily="34" charset="0"/>
+                <a:ea typeface="Open Sans" panose="020B0606030504020204" pitchFamily="34" charset="0"/>
+                <a:cs typeface="Open Sans" panose="020B0606030504020204" pitchFamily="34" charset="0"/>
+              </a:rPr>
+              <a:t>sommetOrdonne</a:t>
+            </a:r>
+            <a:r>
+              <a:rPr lang="fr-FR" sz="3000" dirty="0">
+                <a:latin typeface="Open Sans" panose="020B0606030504020204" pitchFamily="34" charset="0"/>
+                <a:ea typeface="Open Sans" panose="020B0606030504020204" pitchFamily="34" charset="0"/>
+                <a:cs typeface="Open Sans" panose="020B0606030504020204" pitchFamily="34" charset="0"/>
+              </a:rPr>
+              <a:t>[i]] == 1</a:t>
+            </a:r>
+          </a:p>
+          <a:p>
+            <a:r>
+              <a:rPr lang="fr-FR" sz="3000" dirty="0">
+                <a:latin typeface="Open Sans" panose="020B0606030504020204" pitchFamily="34" charset="0"/>
+                <a:ea typeface="Open Sans" panose="020B0606030504020204" pitchFamily="34" charset="0"/>
+                <a:cs typeface="Open Sans" panose="020B0606030504020204" pitchFamily="34" charset="0"/>
+              </a:rPr>
+              <a:t>            ajout j à </a:t>
+            </a:r>
+            <a:r>
+              <a:rPr lang="fr-FR" sz="3000" dirty="0" err="1">
+                <a:latin typeface="Open Sans" panose="020B0606030504020204" pitchFamily="34" charset="0"/>
+                <a:ea typeface="Open Sans" panose="020B0606030504020204" pitchFamily="34" charset="0"/>
+                <a:cs typeface="Open Sans" panose="020B0606030504020204" pitchFamily="34" charset="0"/>
+              </a:rPr>
+              <a:t>listePred</a:t>
+            </a:r>
+            <a:endParaRPr lang="fr-FR" sz="3000" dirty="0">
+              <a:latin typeface="Open Sans" panose="020B0606030504020204" pitchFamily="34" charset="0"/>
+              <a:ea typeface="Open Sans" panose="020B0606030504020204" pitchFamily="34" charset="0"/>
+              <a:cs typeface="Open Sans" panose="020B0606030504020204" pitchFamily="34" charset="0"/>
+            </a:endParaRPr>
+          </a:p>
+          <a:p>
+            <a:r>
+              <a:rPr lang="fr-FR" sz="3000" dirty="0">
+                <a:latin typeface="Open Sans" panose="020B0606030504020204" pitchFamily="34" charset="0"/>
+                <a:ea typeface="Open Sans" panose="020B0606030504020204" pitchFamily="34" charset="0"/>
+                <a:cs typeface="Open Sans" panose="020B0606030504020204" pitchFamily="34" charset="0"/>
+              </a:rPr>
+              <a:t>        fin</a:t>
+            </a:r>
+          </a:p>
+          <a:p>
+            <a:r>
+              <a:rPr lang="fr-FR" sz="3000" dirty="0">
+                <a:latin typeface="Open Sans" panose="020B0606030504020204" pitchFamily="34" charset="0"/>
+                <a:ea typeface="Open Sans" panose="020B0606030504020204" pitchFamily="34" charset="0"/>
+                <a:cs typeface="Open Sans" panose="020B0606030504020204" pitchFamily="34" charset="0"/>
+              </a:rPr>
+              <a:t>    fin</a:t>
+            </a:r>
+          </a:p>
+          <a:p>
+            <a:r>
+              <a:rPr lang="fr-FR" sz="3000" dirty="0">
+                <a:latin typeface="Open Sans" panose="020B0606030504020204" pitchFamily="34" charset="0"/>
+                <a:ea typeface="Open Sans" panose="020B0606030504020204" pitchFamily="34" charset="0"/>
+                <a:cs typeface="Open Sans" panose="020B0606030504020204" pitchFamily="34" charset="0"/>
+              </a:rPr>
+              <a:t>    …</a:t>
+            </a:r>
+          </a:p>
+        </p:txBody>
+      </p:sp>
+      <p:sp>
+        <p:nvSpPr>
+          <p:cNvPr id="18" name="Rectangle 17">
+            <a:extLst>
+              <a:ext uri="{FF2B5EF4-FFF2-40B4-BE49-F238E27FC236}">
+                <a16:creationId xmlns:a16="http://schemas.microsoft.com/office/drawing/2014/main" id="{3151004C-E138-4A08-82E2-A31630CBDDFB}"/>
+              </a:ext>
+            </a:extLst>
+          </p:cNvPr>
+          <p:cNvSpPr/>
+          <p:nvPr/>
+        </p:nvSpPr>
+        <p:spPr>
+          <a:xfrm>
+            <a:off x="13247048" y="9653178"/>
+            <a:ext cx="8857578" cy="2400657"/>
+          </a:xfrm>
+          <a:prstGeom prst="rect">
+            <a:avLst/>
+          </a:prstGeom>
+        </p:spPr>
+        <p:txBody>
+          <a:bodyPr wrap="square">
+            <a:spAutoFit/>
+          </a:bodyPr>
+          <a:lstStyle/>
+          <a:p>
+            <a:r>
+              <a:rPr lang="fr-FR" sz="3000" dirty="0"/>
+              <a:t>    …</a:t>
+            </a:r>
+          </a:p>
+          <a:p>
+            <a:r>
+              <a:rPr lang="fr-FR" sz="3000" dirty="0"/>
+              <a:t>    pour chaque sommet j de </a:t>
+            </a:r>
+            <a:r>
+              <a:rPr lang="fr-FR" sz="3000" dirty="0" err="1"/>
+              <a:t>listePred</a:t>
+            </a:r>
+            <a:endParaRPr lang="fr-FR" sz="3000" dirty="0"/>
+          </a:p>
+          <a:p>
+            <a:r>
+              <a:rPr lang="fr-FR" sz="3000" dirty="0"/>
+              <a:t>           ajoute valeur de la tache de j à </a:t>
+            </a:r>
+            <a:r>
+              <a:rPr lang="fr-FR" sz="3000" dirty="0" err="1"/>
+              <a:t>listeTache</a:t>
+            </a:r>
+            <a:endParaRPr lang="fr-FR" sz="3000" dirty="0"/>
+          </a:p>
+          <a:p>
+            <a:r>
+              <a:rPr lang="fr-FR" sz="3000" dirty="0"/>
+              <a:t>    fin</a:t>
+            </a:r>
+          </a:p>
+          <a:p>
+            <a:r>
+              <a:rPr lang="fr-FR" sz="3000" dirty="0"/>
+              <a:t>    …</a:t>
+            </a:r>
+          </a:p>
+        </p:txBody>
+      </p:sp>
+    </p:spTree>
+    <p:extLst>
+      <p:ext uri="{BB962C8B-B14F-4D97-AF65-F5344CB8AC3E}">
+        <p14:creationId xmlns:p14="http://schemas.microsoft.com/office/powerpoint/2010/main" val="596645117"/>
+      </p:ext>
+    </p:extLst>
+  </p:cSld>
+  <p:clrMapOvr>
+    <a:masterClrMapping/>
+  </p:clrMapOvr>
+</p:sld>
+</file>
+
+<file path=ppt/slides/slide15.xml><?xml version="1.0" encoding="utf-8"?>
+<p:sld xmlns:a="http://schemas.openxmlformats.org/drawingml/2006/main" xmlns:r="http://schemas.openxmlformats.org/officeDocument/2006/relationships" xmlns:p="http://schemas.openxmlformats.org/presentationml/2006/main">
+  <p:cSld>
+    <p:spTree>
+      <p:nvGrpSpPr>
+        <p:cNvPr id="1" name=""/>
+        <p:cNvGrpSpPr/>
+        <p:nvPr/>
+      </p:nvGrpSpPr>
+      <p:grpSpPr>
+        <a:xfrm>
+          <a:off x="0" y="0"/>
+          <a:ext cx="0" cy="0"/>
+          <a:chOff x="0" y="0"/>
+          <a:chExt cx="0" cy="0"/>
+        </a:xfrm>
+      </p:grpSpPr>
+      <p:sp>
+        <p:nvSpPr>
+          <p:cNvPr id="2" name="Oval 58">
+            <a:extLst>
+              <a:ext uri="{FF2B5EF4-FFF2-40B4-BE49-F238E27FC236}">
+                <a16:creationId xmlns:a16="http://schemas.microsoft.com/office/drawing/2014/main" id="{AD70A230-82AA-4409-B505-7464F553F4FB}"/>
+              </a:ext>
+            </a:extLst>
+          </p:cNvPr>
+          <p:cNvSpPr/>
+          <p:nvPr/>
+        </p:nvSpPr>
+        <p:spPr>
+          <a:xfrm>
+            <a:off x="1653792" y="3382571"/>
+            <a:ext cx="1074332" cy="1074611"/>
+          </a:xfrm>
+          <a:prstGeom prst="ellipse">
+            <a:avLst/>
+          </a:prstGeom>
+          <a:noFill/>
+          <a:ln w="28575">
+            <a:solidFill>
+              <a:schemeClr val="tx1"/>
+            </a:solidFill>
+          </a:ln>
+        </p:spPr>
+        <p:style>
+          <a:lnRef idx="2">
+            <a:schemeClr val="accent1">
+              <a:shade val="50000"/>
+            </a:schemeClr>
+          </a:lnRef>
+          <a:fillRef idx="1">
+            <a:schemeClr val="accent1"/>
+          </a:fillRef>
+          <a:effectRef idx="0">
+            <a:schemeClr val="accent1"/>
+          </a:effectRef>
+          <a:fontRef idx="minor">
+            <a:schemeClr val="lt1"/>
+          </a:fontRef>
+        </p:style>
+        <p:txBody>
+          <a:bodyPr rtlCol="0" anchor="ctr"/>
+          <a:lstStyle/>
+          <a:p>
+            <a:pPr algn="ctr"/>
+            <a:endParaRPr lang="en-US" sz="2900" dirty="0">
+              <a:latin typeface="Montserrat Light" charset="0"/>
+              <a:ea typeface="Montserrat Light" charset="0"/>
+              <a:cs typeface="Montserrat Light" charset="0"/>
+            </a:endParaRPr>
+          </a:p>
+        </p:txBody>
+      </p:sp>
+      <p:sp>
+        <p:nvSpPr>
+          <p:cNvPr id="3" name="ZoneTexte 2">
+            <a:extLst>
+              <a:ext uri="{FF2B5EF4-FFF2-40B4-BE49-F238E27FC236}">
+                <a16:creationId xmlns:a16="http://schemas.microsoft.com/office/drawing/2014/main" id="{62CE75D2-956A-4E80-9E11-FFB45D9A9023}"/>
+              </a:ext>
+            </a:extLst>
+          </p:cNvPr>
+          <p:cNvSpPr txBox="1"/>
+          <p:nvPr/>
+        </p:nvSpPr>
+        <p:spPr>
+          <a:xfrm>
+            <a:off x="3813175" y="3498039"/>
+            <a:ext cx="7456472" cy="646331"/>
+          </a:xfrm>
+          <a:prstGeom prst="rect">
+            <a:avLst/>
+          </a:prstGeom>
+          <a:noFill/>
+        </p:spPr>
+        <p:txBody>
+          <a:bodyPr wrap="square" rtlCol="0">
+            <a:spAutoFit/>
+          </a:bodyPr>
+          <a:lstStyle/>
+          <a:p>
+            <a:r>
+              <a:rPr lang="fr-FR" dirty="0">
+                <a:latin typeface="Open Sans" panose="020B0606030504020204" pitchFamily="34" charset="0"/>
+                <a:ea typeface="Open Sans" panose="020B0606030504020204" pitchFamily="34" charset="0"/>
+                <a:cs typeface="Open Sans" panose="020B0606030504020204" pitchFamily="34" charset="0"/>
+              </a:rPr>
+              <a:t>Calcul des dates au plus tôt</a:t>
+            </a:r>
+          </a:p>
+        </p:txBody>
+      </p:sp>
+      <p:sp>
+        <p:nvSpPr>
+          <p:cNvPr id="8" name="ZoneTexte 7">
+            <a:extLst>
+              <a:ext uri="{FF2B5EF4-FFF2-40B4-BE49-F238E27FC236}">
+                <a16:creationId xmlns:a16="http://schemas.microsoft.com/office/drawing/2014/main" id="{F7CEAE41-B470-4249-9F67-341B9FDE0E2E}"/>
+              </a:ext>
+            </a:extLst>
+          </p:cNvPr>
+          <p:cNvSpPr txBox="1"/>
+          <p:nvPr/>
+        </p:nvSpPr>
+        <p:spPr>
+          <a:xfrm>
+            <a:off x="1808211" y="3473599"/>
+            <a:ext cx="765494" cy="892552"/>
+          </a:xfrm>
+          <a:prstGeom prst="rect">
+            <a:avLst/>
+          </a:prstGeom>
+          <a:noFill/>
+        </p:spPr>
+        <p:txBody>
+          <a:bodyPr wrap="square" rtlCol="0">
+            <a:spAutoFit/>
+          </a:bodyPr>
+          <a:lstStyle/>
+          <a:p>
+            <a:pPr algn="ctr"/>
+            <a:r>
+              <a:rPr lang="fr-FR" sz="5200" b="1" dirty="0">
+                <a:latin typeface="Montserrat" panose="00000500000000000000" pitchFamily="2" charset="0"/>
+              </a:rPr>
+              <a:t>3</a:t>
+            </a:r>
+          </a:p>
+        </p:txBody>
+      </p:sp>
+      <p:sp>
+        <p:nvSpPr>
+          <p:cNvPr id="9" name="Oval 58">
+            <a:extLst>
+              <a:ext uri="{FF2B5EF4-FFF2-40B4-BE49-F238E27FC236}">
+                <a16:creationId xmlns:a16="http://schemas.microsoft.com/office/drawing/2014/main" id="{314E2FB6-B01F-4137-9F9C-AF384FC63B9A}"/>
+              </a:ext>
+            </a:extLst>
+          </p:cNvPr>
+          <p:cNvSpPr/>
+          <p:nvPr/>
+        </p:nvSpPr>
+        <p:spPr>
+          <a:xfrm>
+            <a:off x="1653792" y="9456163"/>
+            <a:ext cx="1074332" cy="1074611"/>
+          </a:xfrm>
+          <a:prstGeom prst="ellipse">
+            <a:avLst/>
+          </a:prstGeom>
+          <a:noFill/>
+          <a:ln w="28575">
+            <a:solidFill>
+              <a:schemeClr val="tx1"/>
+            </a:solidFill>
+          </a:ln>
+        </p:spPr>
+        <p:style>
+          <a:lnRef idx="2">
+            <a:schemeClr val="accent1">
+              <a:shade val="50000"/>
+            </a:schemeClr>
+          </a:lnRef>
+          <a:fillRef idx="1">
+            <a:schemeClr val="accent1"/>
+          </a:fillRef>
+          <a:effectRef idx="0">
+            <a:schemeClr val="accent1"/>
+          </a:effectRef>
+          <a:fontRef idx="minor">
+            <a:schemeClr val="lt1"/>
+          </a:fontRef>
+        </p:style>
+        <p:txBody>
+          <a:bodyPr rtlCol="0" anchor="ctr"/>
+          <a:lstStyle/>
+          <a:p>
+            <a:pPr algn="ctr"/>
+            <a:endParaRPr lang="en-US" sz="2900" dirty="0">
+              <a:latin typeface="Montserrat Light" charset="0"/>
+              <a:ea typeface="Montserrat Light" charset="0"/>
+              <a:cs typeface="Montserrat Light" charset="0"/>
+            </a:endParaRPr>
+          </a:p>
+        </p:txBody>
+      </p:sp>
+      <p:sp>
+        <p:nvSpPr>
+          <p:cNvPr id="10" name="ZoneTexte 9">
+            <a:extLst>
+              <a:ext uri="{FF2B5EF4-FFF2-40B4-BE49-F238E27FC236}">
+                <a16:creationId xmlns:a16="http://schemas.microsoft.com/office/drawing/2014/main" id="{EA7305AA-C91D-4327-93CA-B854F5AF5A82}"/>
+              </a:ext>
+            </a:extLst>
+          </p:cNvPr>
+          <p:cNvSpPr txBox="1"/>
+          <p:nvPr/>
+        </p:nvSpPr>
+        <p:spPr>
+          <a:xfrm>
+            <a:off x="3813175" y="9571631"/>
+            <a:ext cx="7456472" cy="1200329"/>
+          </a:xfrm>
+          <a:prstGeom prst="rect">
+            <a:avLst/>
+          </a:prstGeom>
+          <a:noFill/>
+        </p:spPr>
+        <p:txBody>
+          <a:bodyPr wrap="square" rtlCol="0">
+            <a:spAutoFit/>
+          </a:bodyPr>
+          <a:lstStyle/>
+          <a:p>
+            <a:r>
+              <a:rPr lang="fr-FR" dirty="0">
+                <a:latin typeface="Open Sans" panose="020B0606030504020204" pitchFamily="34" charset="0"/>
+                <a:ea typeface="Open Sans" panose="020B0606030504020204" pitchFamily="34" charset="0"/>
+                <a:cs typeface="Open Sans" panose="020B0606030504020204" pitchFamily="34" charset="0"/>
+              </a:rPr>
+              <a:t>Conservation de la date au plus tôt maximale</a:t>
+            </a:r>
+          </a:p>
+        </p:txBody>
+      </p:sp>
+      <p:sp>
+        <p:nvSpPr>
+          <p:cNvPr id="11" name="ZoneTexte 10">
+            <a:extLst>
+              <a:ext uri="{FF2B5EF4-FFF2-40B4-BE49-F238E27FC236}">
+                <a16:creationId xmlns:a16="http://schemas.microsoft.com/office/drawing/2014/main" id="{D1E9F0AC-D027-4719-AF38-04C4EBDAC40B}"/>
+              </a:ext>
+            </a:extLst>
+          </p:cNvPr>
+          <p:cNvSpPr txBox="1"/>
+          <p:nvPr/>
+        </p:nvSpPr>
+        <p:spPr>
+          <a:xfrm>
+            <a:off x="1808211" y="9547191"/>
+            <a:ext cx="765494" cy="892552"/>
+          </a:xfrm>
+          <a:prstGeom prst="rect">
+            <a:avLst/>
+          </a:prstGeom>
+          <a:noFill/>
+        </p:spPr>
+        <p:txBody>
+          <a:bodyPr wrap="square" rtlCol="0">
+            <a:spAutoFit/>
+          </a:bodyPr>
+          <a:lstStyle/>
+          <a:p>
+            <a:pPr algn="ctr"/>
+            <a:r>
+              <a:rPr lang="fr-FR" sz="5200" b="1" dirty="0">
+                <a:latin typeface="Montserrat" panose="00000500000000000000" pitchFamily="2" charset="0"/>
+              </a:rPr>
+              <a:t>4</a:t>
+            </a:r>
+          </a:p>
+        </p:txBody>
+      </p:sp>
+      <p:sp>
+        <p:nvSpPr>
+          <p:cNvPr id="12" name="Rectangle 11">
+            <a:extLst>
+              <a:ext uri="{FF2B5EF4-FFF2-40B4-BE49-F238E27FC236}">
+                <a16:creationId xmlns:a16="http://schemas.microsoft.com/office/drawing/2014/main" id="{9EC294B9-4D95-43E2-9035-3C4E7B2F0ED4}"/>
+              </a:ext>
+            </a:extLst>
+          </p:cNvPr>
+          <p:cNvSpPr/>
+          <p:nvPr/>
+        </p:nvSpPr>
+        <p:spPr>
+          <a:xfrm>
+            <a:off x="11556827" y="1565384"/>
+            <a:ext cx="13160736" cy="5170646"/>
+          </a:xfrm>
+          <a:prstGeom prst="rect">
+            <a:avLst/>
+          </a:prstGeom>
+        </p:spPr>
+        <p:txBody>
+          <a:bodyPr wrap="square">
+            <a:spAutoFit/>
+          </a:bodyPr>
+          <a:lstStyle/>
+          <a:p>
+            <a:r>
+              <a:rPr lang="fr-FR" sz="3000" dirty="0">
+                <a:latin typeface="Open Sans" panose="020B0606030504020204" pitchFamily="34" charset="0"/>
+                <a:ea typeface="Open Sans" panose="020B0606030504020204" pitchFamily="34" charset="0"/>
+                <a:cs typeface="Open Sans" panose="020B0606030504020204" pitchFamily="34" charset="0"/>
+              </a:rPr>
+              <a:t>    pour j allant de 0 à taille </a:t>
+            </a:r>
+            <a:r>
+              <a:rPr lang="fr-FR" sz="3000" dirty="0" err="1">
+                <a:latin typeface="Open Sans" panose="020B0606030504020204" pitchFamily="34" charset="0"/>
+                <a:ea typeface="Open Sans" panose="020B0606030504020204" pitchFamily="34" charset="0"/>
+                <a:cs typeface="Open Sans" panose="020B0606030504020204" pitchFamily="34" charset="0"/>
+              </a:rPr>
+              <a:t>listeTache</a:t>
+            </a:r>
+            <a:r>
+              <a:rPr lang="fr-FR" sz="3000" dirty="0">
+                <a:latin typeface="Open Sans" panose="020B0606030504020204" pitchFamily="34" charset="0"/>
+                <a:ea typeface="Open Sans" panose="020B0606030504020204" pitchFamily="34" charset="0"/>
+                <a:cs typeface="Open Sans" panose="020B0606030504020204" pitchFamily="34" charset="0"/>
+              </a:rPr>
+              <a:t> - 1</a:t>
+            </a:r>
+          </a:p>
+          <a:p>
+            <a:r>
+              <a:rPr lang="fr-FR" sz="3000" dirty="0">
+                <a:latin typeface="Open Sans" panose="020B0606030504020204" pitchFamily="34" charset="0"/>
+                <a:ea typeface="Open Sans" panose="020B0606030504020204" pitchFamily="34" charset="0"/>
+                <a:cs typeface="Open Sans" panose="020B0606030504020204" pitchFamily="34" charset="0"/>
+              </a:rPr>
+              <a:t>         </a:t>
+            </a:r>
+            <a:r>
+              <a:rPr lang="fr-FR" sz="3000" dirty="0" err="1">
+                <a:latin typeface="Open Sans" panose="020B0606030504020204" pitchFamily="34" charset="0"/>
+                <a:ea typeface="Open Sans" panose="020B0606030504020204" pitchFamily="34" charset="0"/>
+                <a:cs typeface="Open Sans" panose="020B0606030504020204" pitchFamily="34" charset="0"/>
+              </a:rPr>
+              <a:t>sommetTache</a:t>
+            </a:r>
+            <a:r>
+              <a:rPr lang="fr-FR" sz="3000" dirty="0">
+                <a:latin typeface="Open Sans" panose="020B0606030504020204" pitchFamily="34" charset="0"/>
+                <a:ea typeface="Open Sans" panose="020B0606030504020204" pitchFamily="34" charset="0"/>
+                <a:cs typeface="Open Sans" panose="020B0606030504020204" pitchFamily="34" charset="0"/>
+              </a:rPr>
+              <a:t> = </a:t>
+            </a:r>
+            <a:r>
+              <a:rPr lang="fr-FR" sz="3000" dirty="0" err="1">
+                <a:latin typeface="Open Sans" panose="020B0606030504020204" pitchFamily="34" charset="0"/>
+                <a:ea typeface="Open Sans" panose="020B0606030504020204" pitchFamily="34" charset="0"/>
+                <a:cs typeface="Open Sans" panose="020B0606030504020204" pitchFamily="34" charset="0"/>
+              </a:rPr>
+              <a:t>listePred.get</a:t>
+            </a:r>
+            <a:r>
+              <a:rPr lang="fr-FR" sz="3000" dirty="0">
+                <a:latin typeface="Open Sans" panose="020B0606030504020204" pitchFamily="34" charset="0"/>
+                <a:ea typeface="Open Sans" panose="020B0606030504020204" pitchFamily="34" charset="0"/>
+                <a:cs typeface="Open Sans" panose="020B0606030504020204" pitchFamily="34" charset="0"/>
+              </a:rPr>
+              <a:t>(j)</a:t>
+            </a:r>
+          </a:p>
+          <a:p>
+            <a:r>
+              <a:rPr lang="fr-FR" sz="3000" dirty="0">
+                <a:latin typeface="Open Sans" panose="020B0606030504020204" pitchFamily="34" charset="0"/>
+                <a:ea typeface="Open Sans" panose="020B0606030504020204" pitchFamily="34" charset="0"/>
+                <a:cs typeface="Open Sans" panose="020B0606030504020204" pitchFamily="34" charset="0"/>
+              </a:rPr>
+              <a:t>         index = 0</a:t>
+            </a:r>
+          </a:p>
+          <a:p>
+            <a:r>
+              <a:rPr lang="fr-FR" sz="3000" dirty="0">
+                <a:latin typeface="Open Sans" panose="020B0606030504020204" pitchFamily="34" charset="0"/>
+                <a:ea typeface="Open Sans" panose="020B0606030504020204" pitchFamily="34" charset="0"/>
+                <a:cs typeface="Open Sans" panose="020B0606030504020204" pitchFamily="34" charset="0"/>
+              </a:rPr>
+              <a:t>         pour k allant de 0 à taille de </a:t>
+            </a:r>
+            <a:r>
+              <a:rPr lang="fr-FR" sz="3000" dirty="0" err="1">
+                <a:latin typeface="Open Sans" panose="020B0606030504020204" pitchFamily="34" charset="0"/>
+                <a:ea typeface="Open Sans" panose="020B0606030504020204" pitchFamily="34" charset="0"/>
+                <a:cs typeface="Open Sans" panose="020B0606030504020204" pitchFamily="34" charset="0"/>
+              </a:rPr>
+              <a:t>sommetOrdonne</a:t>
+            </a:r>
+            <a:r>
+              <a:rPr lang="fr-FR" sz="3000" dirty="0">
+                <a:latin typeface="Open Sans" panose="020B0606030504020204" pitchFamily="34" charset="0"/>
+                <a:ea typeface="Open Sans" panose="020B0606030504020204" pitchFamily="34" charset="0"/>
+                <a:cs typeface="Open Sans" panose="020B0606030504020204" pitchFamily="34" charset="0"/>
+              </a:rPr>
+              <a:t> - 1</a:t>
+            </a:r>
+          </a:p>
+          <a:p>
+            <a:r>
+              <a:rPr lang="fr-FR" sz="3000" dirty="0">
+                <a:latin typeface="Open Sans" panose="020B0606030504020204" pitchFamily="34" charset="0"/>
+                <a:ea typeface="Open Sans" panose="020B0606030504020204" pitchFamily="34" charset="0"/>
+                <a:cs typeface="Open Sans" panose="020B0606030504020204" pitchFamily="34" charset="0"/>
+              </a:rPr>
+              <a:t>             si (</a:t>
+            </a:r>
+            <a:r>
+              <a:rPr lang="fr-FR" sz="3000" dirty="0" err="1">
+                <a:latin typeface="Open Sans" panose="020B0606030504020204" pitchFamily="34" charset="0"/>
+                <a:ea typeface="Open Sans" panose="020B0606030504020204" pitchFamily="34" charset="0"/>
+                <a:cs typeface="Open Sans" panose="020B0606030504020204" pitchFamily="34" charset="0"/>
+              </a:rPr>
+              <a:t>sommetOrdonne</a:t>
+            </a:r>
+            <a:r>
+              <a:rPr lang="fr-FR" sz="3000" dirty="0">
+                <a:latin typeface="Open Sans" panose="020B0606030504020204" pitchFamily="34" charset="0"/>
+                <a:ea typeface="Open Sans" panose="020B0606030504020204" pitchFamily="34" charset="0"/>
+                <a:cs typeface="Open Sans" panose="020B0606030504020204" pitchFamily="34" charset="0"/>
+              </a:rPr>
+              <a:t>[k] == </a:t>
+            </a:r>
+            <a:r>
+              <a:rPr lang="fr-FR" sz="3000" dirty="0" err="1">
+                <a:latin typeface="Open Sans" panose="020B0606030504020204" pitchFamily="34" charset="0"/>
+                <a:ea typeface="Open Sans" panose="020B0606030504020204" pitchFamily="34" charset="0"/>
+                <a:cs typeface="Open Sans" panose="020B0606030504020204" pitchFamily="34" charset="0"/>
+              </a:rPr>
+              <a:t>sommetTache</a:t>
+            </a:r>
+            <a:endParaRPr lang="fr-FR" sz="3000" dirty="0">
+              <a:latin typeface="Open Sans" panose="020B0606030504020204" pitchFamily="34" charset="0"/>
+              <a:ea typeface="Open Sans" panose="020B0606030504020204" pitchFamily="34" charset="0"/>
+              <a:cs typeface="Open Sans" panose="020B0606030504020204" pitchFamily="34" charset="0"/>
+            </a:endParaRPr>
+          </a:p>
+          <a:p>
+            <a:r>
+              <a:rPr lang="fr-FR" sz="3000" dirty="0">
+                <a:latin typeface="Open Sans" panose="020B0606030504020204" pitchFamily="34" charset="0"/>
+                <a:ea typeface="Open Sans" panose="020B0606030504020204" pitchFamily="34" charset="0"/>
+                <a:cs typeface="Open Sans" panose="020B0606030504020204" pitchFamily="34" charset="0"/>
+              </a:rPr>
+              <a:t>                 index = k</a:t>
+            </a:r>
+          </a:p>
+          <a:p>
+            <a:r>
+              <a:rPr lang="fr-FR" sz="3000" dirty="0">
+                <a:latin typeface="Open Sans" panose="020B0606030504020204" pitchFamily="34" charset="0"/>
+                <a:ea typeface="Open Sans" panose="020B0606030504020204" pitchFamily="34" charset="0"/>
+                <a:cs typeface="Open Sans" panose="020B0606030504020204" pitchFamily="34" charset="0"/>
+              </a:rPr>
+              <a:t>             fin</a:t>
+            </a:r>
+          </a:p>
+          <a:p>
+            <a:r>
+              <a:rPr lang="fr-FR" sz="3000" dirty="0">
+                <a:latin typeface="Open Sans" panose="020B0606030504020204" pitchFamily="34" charset="0"/>
+                <a:ea typeface="Open Sans" panose="020B0606030504020204" pitchFamily="34" charset="0"/>
+                <a:cs typeface="Open Sans" panose="020B0606030504020204" pitchFamily="34" charset="0"/>
+              </a:rPr>
+              <a:t>         fin</a:t>
+            </a:r>
+          </a:p>
+          <a:p>
+            <a:r>
+              <a:rPr lang="fr-FR" sz="3000" dirty="0">
+                <a:latin typeface="Open Sans" panose="020B0606030504020204" pitchFamily="34" charset="0"/>
+                <a:ea typeface="Open Sans" panose="020B0606030504020204" pitchFamily="34" charset="0"/>
+                <a:cs typeface="Open Sans" panose="020B0606030504020204" pitchFamily="34" charset="0"/>
+              </a:rPr>
+              <a:t>         ajoute (</a:t>
+            </a:r>
+            <a:r>
+              <a:rPr lang="fr-FR" sz="3000" dirty="0" err="1">
+                <a:latin typeface="Open Sans" panose="020B0606030504020204" pitchFamily="34" charset="0"/>
+                <a:ea typeface="Open Sans" panose="020B0606030504020204" pitchFamily="34" charset="0"/>
+                <a:cs typeface="Open Sans" panose="020B0606030504020204" pitchFamily="34" charset="0"/>
+              </a:rPr>
+              <a:t>array</a:t>
+            </a:r>
+            <a:r>
+              <a:rPr lang="fr-FR" sz="3000" dirty="0">
+                <a:latin typeface="Open Sans" panose="020B0606030504020204" pitchFamily="34" charset="0"/>
+                <a:ea typeface="Open Sans" panose="020B0606030504020204" pitchFamily="34" charset="0"/>
+                <a:cs typeface="Open Sans" panose="020B0606030504020204" pitchFamily="34" charset="0"/>
+              </a:rPr>
+              <a:t>[1][index] + </a:t>
+            </a:r>
+            <a:r>
+              <a:rPr lang="fr-FR" sz="3000" dirty="0" err="1">
+                <a:latin typeface="Open Sans" panose="020B0606030504020204" pitchFamily="34" charset="0"/>
+                <a:ea typeface="Open Sans" panose="020B0606030504020204" pitchFamily="34" charset="0"/>
+                <a:cs typeface="Open Sans" panose="020B0606030504020204" pitchFamily="34" charset="0"/>
+              </a:rPr>
+              <a:t>listeTache.get</a:t>
+            </a:r>
+            <a:r>
+              <a:rPr lang="fr-FR" sz="3000" dirty="0">
+                <a:latin typeface="Open Sans" panose="020B0606030504020204" pitchFamily="34" charset="0"/>
+                <a:ea typeface="Open Sans" panose="020B0606030504020204" pitchFamily="34" charset="0"/>
+                <a:cs typeface="Open Sans" panose="020B0606030504020204" pitchFamily="34" charset="0"/>
+              </a:rPr>
+              <a:t>(j) à </a:t>
+            </a:r>
+            <a:r>
+              <a:rPr lang="fr-FR" sz="3000" dirty="0" err="1">
+                <a:latin typeface="Open Sans" panose="020B0606030504020204" pitchFamily="34" charset="0"/>
+                <a:ea typeface="Open Sans" panose="020B0606030504020204" pitchFamily="34" charset="0"/>
+                <a:cs typeface="Open Sans" panose="020B0606030504020204" pitchFamily="34" charset="0"/>
+              </a:rPr>
+              <a:t>listeDatePlusTot</a:t>
+            </a:r>
+            <a:r>
+              <a:rPr lang="fr-FR" sz="3000" dirty="0">
+                <a:latin typeface="Open Sans" panose="020B0606030504020204" pitchFamily="34" charset="0"/>
+                <a:ea typeface="Open Sans" panose="020B0606030504020204" pitchFamily="34" charset="0"/>
+                <a:cs typeface="Open Sans" panose="020B0606030504020204" pitchFamily="34" charset="0"/>
+              </a:rPr>
+              <a:t>      </a:t>
+            </a:r>
+          </a:p>
+          <a:p>
+            <a:r>
+              <a:rPr lang="fr-FR" sz="3000" dirty="0">
+                <a:latin typeface="Open Sans" panose="020B0606030504020204" pitchFamily="34" charset="0"/>
+                <a:ea typeface="Open Sans" panose="020B0606030504020204" pitchFamily="34" charset="0"/>
+                <a:cs typeface="Open Sans" panose="020B0606030504020204" pitchFamily="34" charset="0"/>
+              </a:rPr>
+              <a:t>    fin</a:t>
+            </a:r>
+          </a:p>
+          <a:p>
+            <a:r>
+              <a:rPr lang="fr-FR" sz="3000" dirty="0">
+                <a:latin typeface="Open Sans" panose="020B0606030504020204" pitchFamily="34" charset="0"/>
+                <a:ea typeface="Open Sans" panose="020B0606030504020204" pitchFamily="34" charset="0"/>
+                <a:cs typeface="Open Sans" panose="020B0606030504020204" pitchFamily="34" charset="0"/>
+              </a:rPr>
+              <a:t>    …</a:t>
+            </a:r>
+          </a:p>
+        </p:txBody>
+      </p:sp>
+      <p:sp>
+        <p:nvSpPr>
+          <p:cNvPr id="14" name="Rectangle 13">
+            <a:extLst>
+              <a:ext uri="{FF2B5EF4-FFF2-40B4-BE49-F238E27FC236}">
+                <a16:creationId xmlns:a16="http://schemas.microsoft.com/office/drawing/2014/main" id="{C238569F-F9A7-49D4-92ED-73A9E7CF192E}"/>
+              </a:ext>
+            </a:extLst>
+          </p:cNvPr>
+          <p:cNvSpPr/>
+          <p:nvPr/>
+        </p:nvSpPr>
+        <p:spPr>
+          <a:xfrm>
+            <a:off x="11556827" y="8362947"/>
+            <a:ext cx="14543330" cy="2862322"/>
+          </a:xfrm>
+          <a:prstGeom prst="rect">
+            <a:avLst/>
+          </a:prstGeom>
+        </p:spPr>
+        <p:txBody>
+          <a:bodyPr wrap="square">
+            <a:spAutoFit/>
+          </a:bodyPr>
+          <a:lstStyle/>
+          <a:p>
+            <a:r>
+              <a:rPr lang="fr-FR" sz="3000" dirty="0">
+                <a:latin typeface="Open Sans" panose="020B0606030504020204" pitchFamily="34" charset="0"/>
+                <a:ea typeface="Open Sans" panose="020B0606030504020204" pitchFamily="34" charset="0"/>
+                <a:cs typeface="Open Sans" panose="020B0606030504020204" pitchFamily="34" charset="0"/>
+              </a:rPr>
+              <a:t>    </a:t>
+            </a:r>
+            <a:r>
+              <a:rPr lang="fr-FR" sz="3000" dirty="0" err="1">
+                <a:latin typeface="Open Sans" panose="020B0606030504020204" pitchFamily="34" charset="0"/>
+                <a:ea typeface="Open Sans" panose="020B0606030504020204" pitchFamily="34" charset="0"/>
+                <a:cs typeface="Open Sans" panose="020B0606030504020204" pitchFamily="34" charset="0"/>
+              </a:rPr>
+              <a:t>array</a:t>
+            </a:r>
+            <a:r>
+              <a:rPr lang="fr-FR" sz="3000" dirty="0">
+                <a:latin typeface="Open Sans" panose="020B0606030504020204" pitchFamily="34" charset="0"/>
+                <a:ea typeface="Open Sans" panose="020B0606030504020204" pitchFamily="34" charset="0"/>
+                <a:cs typeface="Open Sans" panose="020B0606030504020204" pitchFamily="34" charset="0"/>
+              </a:rPr>
+              <a:t>[1][i] = Valeur max de </a:t>
+            </a:r>
+            <a:r>
+              <a:rPr lang="fr-FR" sz="3000" dirty="0" err="1">
+                <a:latin typeface="Open Sans" panose="020B0606030504020204" pitchFamily="34" charset="0"/>
+                <a:ea typeface="Open Sans" panose="020B0606030504020204" pitchFamily="34" charset="0"/>
+                <a:cs typeface="Open Sans" panose="020B0606030504020204" pitchFamily="34" charset="0"/>
+              </a:rPr>
+              <a:t>listDatePlusTot</a:t>
+            </a:r>
+            <a:endParaRPr lang="fr-FR" sz="3000" dirty="0">
+              <a:latin typeface="Open Sans" panose="020B0606030504020204" pitchFamily="34" charset="0"/>
+              <a:ea typeface="Open Sans" panose="020B0606030504020204" pitchFamily="34" charset="0"/>
+              <a:cs typeface="Open Sans" panose="020B0606030504020204" pitchFamily="34" charset="0"/>
+            </a:endParaRPr>
+          </a:p>
+          <a:p>
+            <a:r>
+              <a:rPr lang="fr-FR" sz="3000" dirty="0">
+                <a:latin typeface="Open Sans" panose="020B0606030504020204" pitchFamily="34" charset="0"/>
+                <a:ea typeface="Open Sans" panose="020B0606030504020204" pitchFamily="34" charset="0"/>
+                <a:cs typeface="Open Sans" panose="020B0606030504020204" pitchFamily="34" charset="0"/>
+              </a:rPr>
+              <a:t>    </a:t>
+            </a:r>
+            <a:r>
+              <a:rPr lang="fr-FR" sz="3000" dirty="0" err="1">
+                <a:latin typeface="Open Sans" panose="020B0606030504020204" pitchFamily="34" charset="0"/>
+                <a:ea typeface="Open Sans" panose="020B0606030504020204" pitchFamily="34" charset="0"/>
+                <a:cs typeface="Open Sans" panose="020B0606030504020204" pitchFamily="34" charset="0"/>
+              </a:rPr>
+              <a:t>array</a:t>
+            </a:r>
+            <a:r>
+              <a:rPr lang="fr-FR" sz="3000" dirty="0">
+                <a:latin typeface="Open Sans" panose="020B0606030504020204" pitchFamily="34" charset="0"/>
+                <a:ea typeface="Open Sans" panose="020B0606030504020204" pitchFamily="34" charset="0"/>
+                <a:cs typeface="Open Sans" panose="020B0606030504020204" pitchFamily="34" charset="0"/>
+              </a:rPr>
+              <a:t>[1][i] = </a:t>
+            </a:r>
+            <a:r>
+              <a:rPr lang="fr-FR" sz="3000" dirty="0" err="1">
+                <a:latin typeface="Open Sans" panose="020B0606030504020204" pitchFamily="34" charset="0"/>
+                <a:ea typeface="Open Sans" panose="020B0606030504020204" pitchFamily="34" charset="0"/>
+                <a:cs typeface="Open Sans" panose="020B0606030504020204" pitchFamily="34" charset="0"/>
+              </a:rPr>
+              <a:t>listePred.get</a:t>
+            </a:r>
+            <a:r>
+              <a:rPr lang="fr-FR" sz="3000" dirty="0">
+                <a:latin typeface="Open Sans" panose="020B0606030504020204" pitchFamily="34" charset="0"/>
+                <a:ea typeface="Open Sans" panose="020B0606030504020204" pitchFamily="34" charset="0"/>
+                <a:cs typeface="Open Sans" panose="020B0606030504020204" pitchFamily="34" charset="0"/>
+              </a:rPr>
+              <a:t>(index de </a:t>
+            </a:r>
+            <a:r>
+              <a:rPr lang="fr-FR" sz="3000" dirty="0" err="1">
+                <a:latin typeface="Open Sans" panose="020B0606030504020204" pitchFamily="34" charset="0"/>
+                <a:ea typeface="Open Sans" panose="020B0606030504020204" pitchFamily="34" charset="0"/>
+                <a:cs typeface="Open Sans" panose="020B0606030504020204" pitchFamily="34" charset="0"/>
+              </a:rPr>
+              <a:t>array</a:t>
+            </a:r>
+            <a:r>
+              <a:rPr lang="fr-FR" sz="3000" dirty="0">
+                <a:latin typeface="Open Sans" panose="020B0606030504020204" pitchFamily="34" charset="0"/>
+                <a:ea typeface="Open Sans" panose="020B0606030504020204" pitchFamily="34" charset="0"/>
+                <a:cs typeface="Open Sans" panose="020B0606030504020204" pitchFamily="34" charset="0"/>
+              </a:rPr>
+              <a:t>[1][i] dans </a:t>
+            </a:r>
+            <a:r>
+              <a:rPr lang="fr-FR" sz="3000" dirty="0" err="1">
+                <a:latin typeface="Open Sans" panose="020B0606030504020204" pitchFamily="34" charset="0"/>
+                <a:ea typeface="Open Sans" panose="020B0606030504020204" pitchFamily="34" charset="0"/>
+                <a:cs typeface="Open Sans" panose="020B0606030504020204" pitchFamily="34" charset="0"/>
+              </a:rPr>
+              <a:t>listeDatePlusTot</a:t>
+            </a:r>
+            <a:endParaRPr lang="fr-FR" sz="3000" dirty="0">
+              <a:latin typeface="Open Sans" panose="020B0606030504020204" pitchFamily="34" charset="0"/>
+              <a:ea typeface="Open Sans" panose="020B0606030504020204" pitchFamily="34" charset="0"/>
+              <a:cs typeface="Open Sans" panose="020B0606030504020204" pitchFamily="34" charset="0"/>
+            </a:endParaRPr>
+          </a:p>
+          <a:p>
+            <a:r>
+              <a:rPr lang="fr-FR" sz="3000" dirty="0">
+                <a:latin typeface="Open Sans" panose="020B0606030504020204" pitchFamily="34" charset="0"/>
+                <a:ea typeface="Open Sans" panose="020B0606030504020204" pitchFamily="34" charset="0"/>
+                <a:cs typeface="Open Sans" panose="020B0606030504020204" pitchFamily="34" charset="0"/>
+              </a:rPr>
+              <a:t>    supprime </a:t>
+            </a:r>
+            <a:r>
+              <a:rPr lang="fr-FR" sz="3000" dirty="0" err="1">
+                <a:latin typeface="Open Sans" panose="020B0606030504020204" pitchFamily="34" charset="0"/>
+                <a:ea typeface="Open Sans" panose="020B0606030504020204" pitchFamily="34" charset="0"/>
+                <a:cs typeface="Open Sans" panose="020B0606030504020204" pitchFamily="34" charset="0"/>
+              </a:rPr>
+              <a:t>elements</a:t>
+            </a:r>
+            <a:r>
+              <a:rPr lang="fr-FR" sz="3000" dirty="0">
+                <a:latin typeface="Open Sans" panose="020B0606030504020204" pitchFamily="34" charset="0"/>
+                <a:ea typeface="Open Sans" panose="020B0606030504020204" pitchFamily="34" charset="0"/>
+                <a:cs typeface="Open Sans" panose="020B0606030504020204" pitchFamily="34" charset="0"/>
+              </a:rPr>
+              <a:t> de </a:t>
+            </a:r>
+            <a:r>
+              <a:rPr lang="fr-FR" sz="3000" dirty="0" err="1">
+                <a:latin typeface="Open Sans" panose="020B0606030504020204" pitchFamily="34" charset="0"/>
+                <a:ea typeface="Open Sans" panose="020B0606030504020204" pitchFamily="34" charset="0"/>
+                <a:cs typeface="Open Sans" panose="020B0606030504020204" pitchFamily="34" charset="0"/>
+              </a:rPr>
+              <a:t>listeDatePlusTot</a:t>
+            </a:r>
+            <a:r>
+              <a:rPr lang="fr-FR" sz="3000" dirty="0">
+                <a:latin typeface="Open Sans" panose="020B0606030504020204" pitchFamily="34" charset="0"/>
+                <a:ea typeface="Open Sans" panose="020B0606030504020204" pitchFamily="34" charset="0"/>
+                <a:cs typeface="Open Sans" panose="020B0606030504020204" pitchFamily="34" charset="0"/>
+              </a:rPr>
+              <a:t> </a:t>
+            </a:r>
+          </a:p>
+          <a:p>
+            <a:r>
+              <a:rPr lang="fr-FR" sz="3000" dirty="0">
+                <a:latin typeface="Open Sans" panose="020B0606030504020204" pitchFamily="34" charset="0"/>
+                <a:ea typeface="Open Sans" panose="020B0606030504020204" pitchFamily="34" charset="0"/>
+                <a:cs typeface="Open Sans" panose="020B0606030504020204" pitchFamily="34" charset="0"/>
+              </a:rPr>
+              <a:t>    supprime </a:t>
+            </a:r>
+            <a:r>
+              <a:rPr lang="fr-FR" sz="3000" dirty="0" err="1">
+                <a:latin typeface="Open Sans" panose="020B0606030504020204" pitchFamily="34" charset="0"/>
+                <a:ea typeface="Open Sans" panose="020B0606030504020204" pitchFamily="34" charset="0"/>
+                <a:cs typeface="Open Sans" panose="020B0606030504020204" pitchFamily="34" charset="0"/>
+              </a:rPr>
+              <a:t>elements</a:t>
+            </a:r>
+            <a:r>
+              <a:rPr lang="fr-FR" sz="3000" dirty="0">
+                <a:latin typeface="Open Sans" panose="020B0606030504020204" pitchFamily="34" charset="0"/>
+                <a:ea typeface="Open Sans" panose="020B0606030504020204" pitchFamily="34" charset="0"/>
+                <a:cs typeface="Open Sans" panose="020B0606030504020204" pitchFamily="34" charset="0"/>
+              </a:rPr>
+              <a:t> de </a:t>
+            </a:r>
+            <a:r>
+              <a:rPr lang="fr-FR" sz="3000" dirty="0" err="1">
+                <a:latin typeface="Open Sans" panose="020B0606030504020204" pitchFamily="34" charset="0"/>
+                <a:ea typeface="Open Sans" panose="020B0606030504020204" pitchFamily="34" charset="0"/>
+                <a:cs typeface="Open Sans" panose="020B0606030504020204" pitchFamily="34" charset="0"/>
+              </a:rPr>
+              <a:t>listePred</a:t>
+            </a:r>
+            <a:r>
+              <a:rPr lang="fr-FR" sz="3000" dirty="0">
+                <a:latin typeface="Open Sans" panose="020B0606030504020204" pitchFamily="34" charset="0"/>
+                <a:ea typeface="Open Sans" panose="020B0606030504020204" pitchFamily="34" charset="0"/>
+                <a:cs typeface="Open Sans" panose="020B0606030504020204" pitchFamily="34" charset="0"/>
+              </a:rPr>
+              <a:t> </a:t>
+            </a:r>
+          </a:p>
+          <a:p>
+            <a:r>
+              <a:rPr lang="fr-FR" sz="3000" dirty="0">
+                <a:latin typeface="Open Sans" panose="020B0606030504020204" pitchFamily="34" charset="0"/>
+                <a:ea typeface="Open Sans" panose="020B0606030504020204" pitchFamily="34" charset="0"/>
+                <a:cs typeface="Open Sans" panose="020B0606030504020204" pitchFamily="34" charset="0"/>
+              </a:rPr>
+              <a:t>    supprime </a:t>
+            </a:r>
+            <a:r>
+              <a:rPr lang="fr-FR" sz="3000" dirty="0" err="1">
+                <a:latin typeface="Open Sans" panose="020B0606030504020204" pitchFamily="34" charset="0"/>
+                <a:ea typeface="Open Sans" panose="020B0606030504020204" pitchFamily="34" charset="0"/>
+                <a:cs typeface="Open Sans" panose="020B0606030504020204" pitchFamily="34" charset="0"/>
+              </a:rPr>
+              <a:t>elements</a:t>
+            </a:r>
+            <a:r>
+              <a:rPr lang="fr-FR" sz="3000" dirty="0">
+                <a:latin typeface="Open Sans" panose="020B0606030504020204" pitchFamily="34" charset="0"/>
+                <a:ea typeface="Open Sans" panose="020B0606030504020204" pitchFamily="34" charset="0"/>
+                <a:cs typeface="Open Sans" panose="020B0606030504020204" pitchFamily="34" charset="0"/>
+              </a:rPr>
+              <a:t> de </a:t>
+            </a:r>
+            <a:r>
+              <a:rPr lang="fr-FR" sz="3000" dirty="0" err="1">
+                <a:latin typeface="Open Sans" panose="020B0606030504020204" pitchFamily="34" charset="0"/>
+                <a:ea typeface="Open Sans" panose="020B0606030504020204" pitchFamily="34" charset="0"/>
+                <a:cs typeface="Open Sans" panose="020B0606030504020204" pitchFamily="34" charset="0"/>
+              </a:rPr>
+              <a:t>listeTache</a:t>
+            </a:r>
+            <a:r>
+              <a:rPr lang="fr-FR" sz="3000" dirty="0">
+                <a:latin typeface="Open Sans" panose="020B0606030504020204" pitchFamily="34" charset="0"/>
+                <a:ea typeface="Open Sans" panose="020B0606030504020204" pitchFamily="34" charset="0"/>
+                <a:cs typeface="Open Sans" panose="020B0606030504020204" pitchFamily="34" charset="0"/>
+              </a:rPr>
+              <a:t> </a:t>
+            </a:r>
+          </a:p>
+          <a:p>
+            <a:r>
+              <a:rPr lang="fr-FR" sz="3000" dirty="0">
+                <a:latin typeface="Open Sans" panose="020B0606030504020204" pitchFamily="34" charset="0"/>
+                <a:ea typeface="Open Sans" panose="020B0606030504020204" pitchFamily="34" charset="0"/>
+                <a:cs typeface="Open Sans" panose="020B0606030504020204" pitchFamily="34" charset="0"/>
+              </a:rPr>
+              <a:t>fin</a:t>
+            </a:r>
+          </a:p>
+        </p:txBody>
+      </p:sp>
+    </p:spTree>
+    <p:extLst>
+      <p:ext uri="{BB962C8B-B14F-4D97-AF65-F5344CB8AC3E}">
+        <p14:creationId xmlns:p14="http://schemas.microsoft.com/office/powerpoint/2010/main" val="3825805121"/>
+      </p:ext>
+    </p:extLst>
+  </p:cSld>
+  <p:clrMapOvr>
+    <a:masterClrMapping/>
+  </p:clrMapOvr>
+</p:sld>
+</file>
+
+<file path=ppt/slides/slide16.xml><?xml version="1.0" encoding="utf-8"?>
+<p:sld xmlns:a="http://schemas.openxmlformats.org/drawingml/2006/main" xmlns:r="http://schemas.openxmlformats.org/officeDocument/2006/relationships" xmlns:p="http://schemas.openxmlformats.org/presentationml/2006/main">
+  <p:cSld>
+    <p:spTree>
+      <p:nvGrpSpPr>
+        <p:cNvPr id="1" name=""/>
+        <p:cNvGrpSpPr/>
+        <p:nvPr/>
+      </p:nvGrpSpPr>
+      <p:grpSpPr>
+        <a:xfrm>
+          <a:off x="0" y="0"/>
+          <a:ext cx="0" cy="0"/>
+          <a:chOff x="0" y="0"/>
+          <a:chExt cx="0" cy="0"/>
+        </a:xfrm>
+      </p:grpSpPr>
+      <p:sp>
+        <p:nvSpPr>
           <p:cNvPr id="2" name="ZoneTexte 1">
             <a:extLst>
               <a:ext uri="{FF2B5EF4-FFF2-40B4-BE49-F238E27FC236}">
@@ -3343,7 +4829,7 @@
 </p:sld>
 </file>
 
-<file path=ppt/slides/slide15.xml><?xml version="1.0" encoding="utf-8"?>
+<file path=ppt/slides/slide17.xml><?xml version="1.0" encoding="utf-8"?>
 <p:sld xmlns:a="http://schemas.openxmlformats.org/drawingml/2006/main" xmlns:r="http://schemas.openxmlformats.org/officeDocument/2006/relationships" xmlns:p="http://schemas.openxmlformats.org/presentationml/2006/main">
   <p:cSld>
     <p:spTree>
@@ -7197,7 +8683,7 @@
         <p:spPr>
           <a:xfrm>
             <a:off x="1272209" y="3677479"/>
-            <a:ext cx="9133663" cy="9233297"/>
+            <a:ext cx="9133663" cy="9648795"/>
           </a:xfrm>
           <a:prstGeom prst="rect">
             <a:avLst/>
@@ -7686,6 +9172,16 @@
               <a:t>)</a:t>
             </a:r>
           </a:p>
+          <a:p>
+            <a:r>
+              <a:rPr lang="fr-FR" sz="2700" dirty="0">
+                <a:latin typeface="Open Sans" panose="020B0606030504020204" pitchFamily="34" charset="0"/>
+                <a:ea typeface="Open Sans" panose="020B0606030504020204" pitchFamily="34" charset="0"/>
+                <a:cs typeface="Open Sans" panose="020B0606030504020204" pitchFamily="34" charset="0"/>
+              </a:rPr>
+              <a:t>…</a:t>
+            </a:r>
+          </a:p>
         </p:txBody>
       </p:sp>
       <p:sp>
@@ -7703,7 +9199,7 @@
         <p:spPr>
           <a:xfrm>
             <a:off x="12095784" y="3677479"/>
-            <a:ext cx="12192000" cy="2246769"/>
+            <a:ext cx="12192000" cy="2677656"/>
           </a:xfrm>
           <a:prstGeom prst="rect">
             <a:avLst/>
@@ -7714,6 +9210,16 @@
             <a:spAutoFit/>
           </a:bodyPr>
           <a:lstStyle/>
+          <a:p>
+            <a:r>
+              <a:rPr lang="fr-FR" sz="2800" dirty="0">
+                <a:latin typeface="Open Sans" panose="020B0606030504020204" pitchFamily="34" charset="0"/>
+                <a:ea typeface="Open Sans" panose="020B0606030504020204" pitchFamily="34" charset="0"/>
+                <a:cs typeface="Open Sans" panose="020B0606030504020204" pitchFamily="34" charset="0"/>
+              </a:rPr>
+              <a:t>…</a:t>
+            </a:r>
+          </a:p>
           <a:p>
             <a:r>
               <a:rPr lang="fr-FR" sz="2800" dirty="0">

</xml_diff>

<commit_message>
ppt marge + date [5~ tard
</commit_message>
<xml_diff>
--- a/A4_Presentation.pptx
+++ b/A4_Presentation.pptx
@@ -5,7 +5,7 @@
     <p:sldMasterId id="2147483660" r:id="rId1"/>
   </p:sldMasterIdLst>
   <p:handoutMasterIdLst>
-    <p:handoutMasterId r:id="rId19"/>
+    <p:handoutMasterId r:id="rId23"/>
   </p:handoutMasterIdLst>
   <p:sldIdLst>
     <p:sldId id="280" r:id="rId2"/>
@@ -25,6 +25,10 @@
     <p:sldId id="297" r:id="rId16"/>
     <p:sldId id="287" r:id="rId17"/>
     <p:sldId id="290" r:id="rId18"/>
+    <p:sldId id="298" r:id="rId19"/>
+    <p:sldId id="299" r:id="rId20"/>
+    <p:sldId id="300" r:id="rId21"/>
+    <p:sldId id="301" r:id="rId22"/>
   </p:sldIdLst>
   <p:sldSz cx="24387175" cy="13716000"/>
   <p:notesSz cx="6858000" cy="9144000"/>
@@ -790,12 +794,12 @@
           </a:ln>
           <a:extLst>
             <a:ext uri="{909E8E84-426E-40dd-AFC4-6F175D3DCCD1}">
-              <a14:hiddenFill xmlns="" xmlns:a14="http://schemas.microsoft.com/office/drawing/2010/main">
+              <a14:hiddenFill xmlns:a14="http://schemas.microsoft.com/office/drawing/2010/main" xmlns="">
                 <a:noFill/>
               </a14:hiddenFill>
             </a:ext>
             <a:ext uri="{91240B29-F687-4f45-9708-019B960494DF}">
-              <a14:hiddenLine xmlns="" xmlns:a14="http://schemas.microsoft.com/office/drawing/2010/main" w="9525">
+              <a14:hiddenLine xmlns:a14="http://schemas.microsoft.com/office/drawing/2010/main" xmlns="" w="9525">
                 <a:solidFill>
                   <a:srgbClr val="000000"/>
                 </a:solidFill>
@@ -840,12 +844,12 @@
           </a:ln>
           <a:extLst>
             <a:ext uri="{909E8E84-426E-40dd-AFC4-6F175D3DCCD1}">
-              <a14:hiddenFill xmlns="" xmlns:a14="http://schemas.microsoft.com/office/drawing/2010/main">
+              <a14:hiddenFill xmlns:a14="http://schemas.microsoft.com/office/drawing/2010/main" xmlns="">
                 <a:noFill/>
               </a14:hiddenFill>
             </a:ext>
             <a:ext uri="{91240B29-F687-4f45-9708-019B960494DF}">
-              <a14:hiddenLine xmlns="" xmlns:a14="http://schemas.microsoft.com/office/drawing/2010/main" w="9525">
+              <a14:hiddenLine xmlns:a14="http://schemas.microsoft.com/office/drawing/2010/main" xmlns="" w="9525">
                 <a:solidFill>
                   <a:srgbClr val="000000"/>
                 </a:solidFill>
@@ -3951,7 +3955,7 @@
         <p:spPr>
           <a:xfrm>
             <a:off x="11556827" y="1565384"/>
-            <a:ext cx="13160736" cy="5170646"/>
+            <a:ext cx="13160736" cy="5632311"/>
           </a:xfrm>
           <a:prstGeom prst="rect">
             <a:avLst/>
@@ -3969,6 +3973,16 @@
                 <a:ea typeface="Open Sans" panose="020B0606030504020204" pitchFamily="34" charset="0"/>
                 <a:cs typeface="Open Sans" panose="020B0606030504020204" pitchFamily="34" charset="0"/>
               </a:rPr>
+              <a:t>…</a:t>
+            </a:r>
+          </a:p>
+          <a:p>
+            <a:r>
+              <a:rPr lang="fr-FR" sz="3000" dirty="0">
+                <a:latin typeface="Open Sans" panose="020B0606030504020204" pitchFamily="34" charset="0"/>
+                <a:ea typeface="Open Sans" panose="020B0606030504020204" pitchFamily="34" charset="0"/>
+                <a:cs typeface="Open Sans" panose="020B0606030504020204" pitchFamily="34" charset="0"/>
+              </a:rPr>
               <a:t>    pour j allant de 0 à taille </a:t>
             </a:r>
             <a:r>
@@ -4099,19 +4113,22 @@
               </a:rPr>
               <a:t>sommetTache</a:t>
             </a:r>
-            <a:endParaRPr lang="fr-FR" sz="3000" dirty="0">
-              <a:latin typeface="Open Sans" panose="020B0606030504020204" pitchFamily="34" charset="0"/>
-              <a:ea typeface="Open Sans" panose="020B0606030504020204" pitchFamily="34" charset="0"/>
-              <a:cs typeface="Open Sans" panose="020B0606030504020204" pitchFamily="34" charset="0"/>
-            </a:endParaRPr>
-          </a:p>
-          <a:p>
             <a:r>
               <a:rPr lang="fr-FR" sz="3000" dirty="0">
                 <a:latin typeface="Open Sans" panose="020B0606030504020204" pitchFamily="34" charset="0"/>
                 <a:ea typeface="Open Sans" panose="020B0606030504020204" pitchFamily="34" charset="0"/>
                 <a:cs typeface="Open Sans" panose="020B0606030504020204" pitchFamily="34" charset="0"/>
               </a:rPr>
+              <a:t>)</a:t>
+            </a:r>
+          </a:p>
+          <a:p>
+            <a:r>
+              <a:rPr lang="fr-FR" sz="3000" dirty="0">
+                <a:latin typeface="Open Sans" panose="020B0606030504020204" pitchFamily="34" charset="0"/>
+                <a:ea typeface="Open Sans" panose="020B0606030504020204" pitchFamily="34" charset="0"/>
+                <a:cs typeface="Open Sans" panose="020B0606030504020204" pitchFamily="34" charset="0"/>
+              </a:rPr>
               <a:t>                 index = k</a:t>
             </a:r>
           </a:p>
@@ -4190,7 +4207,7 @@
                 <a:ea typeface="Open Sans" panose="020B0606030504020204" pitchFamily="34" charset="0"/>
                 <a:cs typeface="Open Sans" panose="020B0606030504020204" pitchFamily="34" charset="0"/>
               </a:rPr>
-              <a:t>      </a:t>
+              <a:t>)      </a:t>
             </a:r>
           </a:p>
           <a:p>
@@ -4832,6 +4849,14 @@
 <file path=ppt/slides/slide17.xml><?xml version="1.0" encoding="utf-8"?>
 <p:sld xmlns:a="http://schemas.openxmlformats.org/drawingml/2006/main" xmlns:r="http://schemas.openxmlformats.org/officeDocument/2006/relationships" xmlns:p="http://schemas.openxmlformats.org/presentationml/2006/main">
   <p:cSld>
+    <p:bg>
+      <p:bgPr>
+        <a:solidFill>
+          <a:srgbClr val="0070C0"/>
+        </a:solidFill>
+        <a:effectLst/>
+      </p:bgPr>
+    </p:bg>
     <p:spTree>
       <p:nvGrpSpPr>
         <p:cNvPr id="1" name=""/>
@@ -5386,6 +5411,1447 @@
     <p:extLst>
       <p:ext uri="{BB962C8B-B14F-4D97-AF65-F5344CB8AC3E}">
         <p14:creationId xmlns:p14="http://schemas.microsoft.com/office/powerpoint/2010/main" val="3370405227"/>
+      </p:ext>
+    </p:extLst>
+  </p:cSld>
+  <p:clrMapOvr>
+    <a:masterClrMapping/>
+  </p:clrMapOvr>
+</p:sld>
+</file>
+
+<file path=ppt/slides/slide18.xml><?xml version="1.0" encoding="utf-8"?>
+<p:sld xmlns:a="http://schemas.openxmlformats.org/drawingml/2006/main" xmlns:r="http://schemas.openxmlformats.org/officeDocument/2006/relationships" xmlns:p="http://schemas.openxmlformats.org/presentationml/2006/main">
+  <p:cSld>
+    <p:spTree>
+      <p:nvGrpSpPr>
+        <p:cNvPr id="1" name=""/>
+        <p:cNvGrpSpPr/>
+        <p:nvPr/>
+      </p:nvGrpSpPr>
+      <p:grpSpPr>
+        <a:xfrm>
+          <a:off x="0" y="0"/>
+          <a:ext cx="0" cy="0"/>
+          <a:chOff x="0" y="0"/>
+          <a:chExt cx="0" cy="0"/>
+        </a:xfrm>
+      </p:grpSpPr>
+      <p:sp>
+        <p:nvSpPr>
+          <p:cNvPr id="3" name="ZoneTexte 2">
+            <a:extLst>
+              <a:ext uri="{FF2B5EF4-FFF2-40B4-BE49-F238E27FC236}">
+                <a16:creationId xmlns:a16="http://schemas.microsoft.com/office/drawing/2014/main" id="{168B7E97-4894-436F-9382-6A92F4014357}"/>
+              </a:ext>
+            </a:extLst>
+          </p:cNvPr>
+          <p:cNvSpPr txBox="1"/>
+          <p:nvPr/>
+        </p:nvSpPr>
+        <p:spPr>
+          <a:xfrm>
+            <a:off x="2375271" y="1113184"/>
+            <a:ext cx="17880677" cy="1046440"/>
+          </a:xfrm>
+          <a:prstGeom prst="rect">
+            <a:avLst/>
+          </a:prstGeom>
+          <a:noFill/>
+        </p:spPr>
+        <p:txBody>
+          <a:bodyPr wrap="square" rtlCol="0">
+            <a:spAutoFit/>
+          </a:bodyPr>
+          <a:lstStyle/>
+          <a:p>
+            <a:r>
+              <a:rPr lang="fr-FR" sz="6200" b="1" dirty="0">
+                <a:latin typeface="Montserrat" panose="00000500000000000000" pitchFamily="2" charset="0"/>
+              </a:rPr>
+              <a:t>V : Méthode de l’ordonnancement</a:t>
+            </a:r>
+          </a:p>
+        </p:txBody>
+      </p:sp>
+      <p:sp>
+        <p:nvSpPr>
+          <p:cNvPr id="16" name="Oval 58">
+            <a:extLst>
+              <a:ext uri="{FF2B5EF4-FFF2-40B4-BE49-F238E27FC236}">
+                <a16:creationId xmlns:a16="http://schemas.microsoft.com/office/drawing/2014/main" id="{0E244E65-4A71-4FF1-BD18-75E1912E061C}"/>
+              </a:ext>
+            </a:extLst>
+          </p:cNvPr>
+          <p:cNvSpPr/>
+          <p:nvPr/>
+        </p:nvSpPr>
+        <p:spPr>
+          <a:xfrm>
+            <a:off x="1673229" y="3765604"/>
+            <a:ext cx="1074332" cy="1074611"/>
+          </a:xfrm>
+          <a:prstGeom prst="ellipse">
+            <a:avLst/>
+          </a:prstGeom>
+          <a:noFill/>
+          <a:ln w="28575">
+            <a:solidFill>
+              <a:schemeClr val="tx1"/>
+            </a:solidFill>
+          </a:ln>
+        </p:spPr>
+        <p:style>
+          <a:lnRef idx="2">
+            <a:schemeClr val="accent1">
+              <a:shade val="50000"/>
+            </a:schemeClr>
+          </a:lnRef>
+          <a:fillRef idx="1">
+            <a:schemeClr val="accent1"/>
+          </a:fillRef>
+          <a:effectRef idx="0">
+            <a:schemeClr val="accent1"/>
+          </a:effectRef>
+          <a:fontRef idx="minor">
+            <a:schemeClr val="lt1"/>
+          </a:fontRef>
+        </p:style>
+        <p:txBody>
+          <a:bodyPr rtlCol="0" anchor="ctr"/>
+          <a:lstStyle/>
+          <a:p>
+            <a:pPr algn="ctr"/>
+            <a:endParaRPr lang="en-US" sz="2900" dirty="0">
+              <a:latin typeface="Montserrat Light" charset="0"/>
+              <a:ea typeface="Montserrat Light" charset="0"/>
+              <a:cs typeface="Montserrat Light" charset="0"/>
+            </a:endParaRPr>
+          </a:p>
+        </p:txBody>
+      </p:sp>
+      <p:sp>
+        <p:nvSpPr>
+          <p:cNvPr id="17" name="ZoneTexte 16">
+            <a:extLst>
+              <a:ext uri="{FF2B5EF4-FFF2-40B4-BE49-F238E27FC236}">
+                <a16:creationId xmlns:a16="http://schemas.microsoft.com/office/drawing/2014/main" id="{8490786A-64ED-47C8-87F3-F2BD7C07C2D2}"/>
+              </a:ext>
+            </a:extLst>
+          </p:cNvPr>
+          <p:cNvSpPr txBox="1"/>
+          <p:nvPr/>
+        </p:nvSpPr>
+        <p:spPr>
+          <a:xfrm>
+            <a:off x="1827648" y="3856634"/>
+            <a:ext cx="765494" cy="892552"/>
+          </a:xfrm>
+          <a:prstGeom prst="rect">
+            <a:avLst/>
+          </a:prstGeom>
+          <a:noFill/>
+        </p:spPr>
+        <p:txBody>
+          <a:bodyPr wrap="square" rtlCol="0">
+            <a:spAutoFit/>
+          </a:bodyPr>
+          <a:lstStyle/>
+          <a:p>
+            <a:pPr algn="ctr"/>
+            <a:r>
+              <a:rPr lang="fr-FR" sz="5200" b="1" dirty="0">
+                <a:latin typeface="Montserrat" panose="00000500000000000000" pitchFamily="2" charset="0"/>
+              </a:rPr>
+              <a:t>1</a:t>
+            </a:r>
+          </a:p>
+        </p:txBody>
+      </p:sp>
+      <p:sp>
+        <p:nvSpPr>
+          <p:cNvPr id="19" name="ZoneTexte 18">
+            <a:extLst>
+              <a:ext uri="{FF2B5EF4-FFF2-40B4-BE49-F238E27FC236}">
+                <a16:creationId xmlns:a16="http://schemas.microsoft.com/office/drawing/2014/main" id="{E8411C99-30CC-490C-87A6-28858FED21D7}"/>
+              </a:ext>
+            </a:extLst>
+          </p:cNvPr>
+          <p:cNvSpPr txBox="1"/>
+          <p:nvPr/>
+        </p:nvSpPr>
+        <p:spPr>
+          <a:xfrm>
+            <a:off x="3813175" y="3702744"/>
+            <a:ext cx="7456472" cy="1200329"/>
+          </a:xfrm>
+          <a:prstGeom prst="rect">
+            <a:avLst/>
+          </a:prstGeom>
+          <a:noFill/>
+        </p:spPr>
+        <p:txBody>
+          <a:bodyPr wrap="square" rtlCol="0">
+            <a:spAutoFit/>
+          </a:bodyPr>
+          <a:lstStyle/>
+          <a:p>
+            <a:r>
+              <a:rPr lang="fr-FR" dirty="0">
+                <a:latin typeface="Open Sans" panose="020B0606030504020204" pitchFamily="34" charset="0"/>
+                <a:ea typeface="Open Sans" panose="020B0606030504020204" pitchFamily="34" charset="0"/>
+                <a:cs typeface="Open Sans" panose="020B0606030504020204" pitchFamily="34" charset="0"/>
+              </a:rPr>
+              <a:t>Récupération de la liste des successeurs</a:t>
+            </a:r>
+          </a:p>
+        </p:txBody>
+      </p:sp>
+      <p:sp>
+        <p:nvSpPr>
+          <p:cNvPr id="20" name="Oval 58">
+            <a:extLst>
+              <a:ext uri="{FF2B5EF4-FFF2-40B4-BE49-F238E27FC236}">
+                <a16:creationId xmlns:a16="http://schemas.microsoft.com/office/drawing/2014/main" id="{C6AC175D-B562-45F5-9CE3-3C36DF961328}"/>
+              </a:ext>
+            </a:extLst>
+          </p:cNvPr>
+          <p:cNvSpPr/>
+          <p:nvPr/>
+        </p:nvSpPr>
+        <p:spPr>
+          <a:xfrm>
+            <a:off x="1653792" y="10439313"/>
+            <a:ext cx="1074332" cy="1074611"/>
+          </a:xfrm>
+          <a:prstGeom prst="ellipse">
+            <a:avLst/>
+          </a:prstGeom>
+          <a:noFill/>
+          <a:ln w="28575">
+            <a:solidFill>
+              <a:schemeClr val="tx1"/>
+            </a:solidFill>
+          </a:ln>
+        </p:spPr>
+        <p:style>
+          <a:lnRef idx="2">
+            <a:schemeClr val="accent1">
+              <a:shade val="50000"/>
+            </a:schemeClr>
+          </a:lnRef>
+          <a:fillRef idx="1">
+            <a:schemeClr val="accent1"/>
+          </a:fillRef>
+          <a:effectRef idx="0">
+            <a:schemeClr val="accent1"/>
+          </a:effectRef>
+          <a:fontRef idx="minor">
+            <a:schemeClr val="lt1"/>
+          </a:fontRef>
+        </p:style>
+        <p:txBody>
+          <a:bodyPr rtlCol="0" anchor="ctr"/>
+          <a:lstStyle/>
+          <a:p>
+            <a:pPr algn="ctr"/>
+            <a:endParaRPr lang="en-US" sz="2900" dirty="0">
+              <a:latin typeface="Montserrat Light" charset="0"/>
+              <a:ea typeface="Montserrat Light" charset="0"/>
+              <a:cs typeface="Montserrat Light" charset="0"/>
+            </a:endParaRPr>
+          </a:p>
+        </p:txBody>
+      </p:sp>
+      <p:sp>
+        <p:nvSpPr>
+          <p:cNvPr id="21" name="ZoneTexte 20">
+            <a:extLst>
+              <a:ext uri="{FF2B5EF4-FFF2-40B4-BE49-F238E27FC236}">
+                <a16:creationId xmlns:a16="http://schemas.microsoft.com/office/drawing/2014/main" id="{7D39F379-19DA-462F-82DF-CC0429FDD16A}"/>
+              </a:ext>
+            </a:extLst>
+          </p:cNvPr>
+          <p:cNvSpPr txBox="1"/>
+          <p:nvPr/>
+        </p:nvSpPr>
+        <p:spPr>
+          <a:xfrm>
+            <a:off x="3813175" y="10439492"/>
+            <a:ext cx="7456472" cy="1200329"/>
+          </a:xfrm>
+          <a:prstGeom prst="rect">
+            <a:avLst/>
+          </a:prstGeom>
+          <a:noFill/>
+        </p:spPr>
+        <p:txBody>
+          <a:bodyPr wrap="square" rtlCol="0">
+            <a:spAutoFit/>
+          </a:bodyPr>
+          <a:lstStyle/>
+          <a:p>
+            <a:r>
+              <a:rPr lang="fr-FR" dirty="0">
+                <a:latin typeface="Open Sans" panose="020B0606030504020204" pitchFamily="34" charset="0"/>
+                <a:ea typeface="Open Sans" panose="020B0606030504020204" pitchFamily="34" charset="0"/>
+                <a:cs typeface="Open Sans" panose="020B0606030504020204" pitchFamily="34" charset="0"/>
+              </a:rPr>
+              <a:t>Récupération de la tâche du sommet</a:t>
+            </a:r>
+          </a:p>
+        </p:txBody>
+      </p:sp>
+      <p:sp>
+        <p:nvSpPr>
+          <p:cNvPr id="22" name="ZoneTexte 21">
+            <a:extLst>
+              <a:ext uri="{FF2B5EF4-FFF2-40B4-BE49-F238E27FC236}">
+                <a16:creationId xmlns:a16="http://schemas.microsoft.com/office/drawing/2014/main" id="{73A8A3C1-5182-403C-84AD-7A9C7DD420F7}"/>
+              </a:ext>
+            </a:extLst>
+          </p:cNvPr>
+          <p:cNvSpPr txBox="1"/>
+          <p:nvPr/>
+        </p:nvSpPr>
+        <p:spPr>
+          <a:xfrm>
+            <a:off x="1808211" y="10530341"/>
+            <a:ext cx="765494" cy="892552"/>
+          </a:xfrm>
+          <a:prstGeom prst="rect">
+            <a:avLst/>
+          </a:prstGeom>
+          <a:noFill/>
+        </p:spPr>
+        <p:txBody>
+          <a:bodyPr wrap="square" rtlCol="0">
+            <a:spAutoFit/>
+          </a:bodyPr>
+          <a:lstStyle/>
+          <a:p>
+            <a:pPr algn="ctr"/>
+            <a:r>
+              <a:rPr lang="fr-FR" sz="5200" b="1" dirty="0">
+                <a:latin typeface="Montserrat" panose="00000500000000000000" pitchFamily="2" charset="0"/>
+              </a:rPr>
+              <a:t>2</a:t>
+            </a:r>
+          </a:p>
+        </p:txBody>
+      </p:sp>
+      <p:sp>
+        <p:nvSpPr>
+          <p:cNvPr id="23" name="Rectangle 22">
+            <a:extLst>
+              <a:ext uri="{FF2B5EF4-FFF2-40B4-BE49-F238E27FC236}">
+                <a16:creationId xmlns:a16="http://schemas.microsoft.com/office/drawing/2014/main" id="{E603F1CA-3011-4FF3-9588-EAF41B469703}"/>
+              </a:ext>
+            </a:extLst>
+          </p:cNvPr>
+          <p:cNvSpPr/>
+          <p:nvPr/>
+        </p:nvSpPr>
+        <p:spPr>
+          <a:xfrm>
+            <a:off x="13247048" y="2729880"/>
+            <a:ext cx="9466898" cy="4708981"/>
+          </a:xfrm>
+          <a:prstGeom prst="rect">
+            <a:avLst/>
+          </a:prstGeom>
+        </p:spPr>
+        <p:txBody>
+          <a:bodyPr wrap="square">
+            <a:spAutoFit/>
+          </a:bodyPr>
+          <a:lstStyle/>
+          <a:p>
+            <a:r>
+              <a:rPr lang="fr-FR" sz="3000" dirty="0" err="1">
+                <a:latin typeface="Open Sans" panose="020B0606030504020204" pitchFamily="34" charset="0"/>
+                <a:ea typeface="Open Sans" panose="020B0606030504020204" pitchFamily="34" charset="0"/>
+                <a:cs typeface="Open Sans" panose="020B0606030504020204" pitchFamily="34" charset="0"/>
+              </a:rPr>
+              <a:t>array</a:t>
+            </a:r>
+            <a:r>
+              <a:rPr lang="fr-FR" sz="3000" dirty="0">
+                <a:latin typeface="Open Sans" panose="020B0606030504020204" pitchFamily="34" charset="0"/>
+                <a:ea typeface="Open Sans" panose="020B0606030504020204" pitchFamily="34" charset="0"/>
+                <a:cs typeface="Open Sans" panose="020B0606030504020204" pitchFamily="34" charset="0"/>
+              </a:rPr>
+              <a:t>[2][</a:t>
+            </a:r>
+            <a:r>
+              <a:rPr lang="fr-FR" sz="3000" dirty="0" err="1">
+                <a:latin typeface="Open Sans" panose="020B0606030504020204" pitchFamily="34" charset="0"/>
+                <a:ea typeface="Open Sans" panose="020B0606030504020204" pitchFamily="34" charset="0"/>
+                <a:cs typeface="Open Sans" panose="020B0606030504020204" pitchFamily="34" charset="0"/>
+              </a:rPr>
+              <a:t>nbSommet</a:t>
+            </a:r>
+            <a:r>
+              <a:rPr lang="fr-FR" sz="3000" dirty="0">
+                <a:latin typeface="Open Sans" panose="020B0606030504020204" pitchFamily="34" charset="0"/>
+                <a:ea typeface="Open Sans" panose="020B0606030504020204" pitchFamily="34" charset="0"/>
+                <a:cs typeface="Open Sans" panose="020B0606030504020204" pitchFamily="34" charset="0"/>
+              </a:rPr>
+              <a:t>]</a:t>
+            </a:r>
+          </a:p>
+          <a:p>
+            <a:r>
+              <a:rPr lang="fr-FR" sz="3000" dirty="0" err="1">
+                <a:latin typeface="Open Sans" panose="020B0606030504020204" pitchFamily="34" charset="0"/>
+                <a:ea typeface="Open Sans" panose="020B0606030504020204" pitchFamily="34" charset="0"/>
+                <a:cs typeface="Open Sans" panose="020B0606030504020204" pitchFamily="34" charset="0"/>
+              </a:rPr>
+              <a:t>array</a:t>
+            </a:r>
+            <a:r>
+              <a:rPr lang="fr-FR" sz="3000" dirty="0">
+                <a:latin typeface="Open Sans" panose="020B0606030504020204" pitchFamily="34" charset="0"/>
+                <a:ea typeface="Open Sans" panose="020B0606030504020204" pitchFamily="34" charset="0"/>
+                <a:cs typeface="Open Sans" panose="020B0606030504020204" pitchFamily="34" charset="0"/>
+              </a:rPr>
+              <a:t>[0][nb_sommet-1] = -1;</a:t>
+            </a:r>
+          </a:p>
+          <a:p>
+            <a:r>
+              <a:rPr lang="fr-FR" sz="3000" dirty="0" err="1">
+                <a:latin typeface="Open Sans" panose="020B0606030504020204" pitchFamily="34" charset="0"/>
+                <a:ea typeface="Open Sans" panose="020B0606030504020204" pitchFamily="34" charset="0"/>
+                <a:cs typeface="Open Sans" panose="020B0606030504020204" pitchFamily="34" charset="0"/>
+              </a:rPr>
+              <a:t>array</a:t>
+            </a:r>
+            <a:r>
+              <a:rPr lang="fr-FR" sz="3000" dirty="0">
+                <a:latin typeface="Open Sans" panose="020B0606030504020204" pitchFamily="34" charset="0"/>
+                <a:ea typeface="Open Sans" panose="020B0606030504020204" pitchFamily="34" charset="0"/>
+                <a:cs typeface="Open Sans" panose="020B0606030504020204" pitchFamily="34" charset="0"/>
+              </a:rPr>
+              <a:t>[1][nb_sommet-1] = </a:t>
+            </a:r>
+            <a:r>
+              <a:rPr lang="fr-FR" sz="3000" dirty="0" err="1">
+                <a:latin typeface="Open Sans" panose="020B0606030504020204" pitchFamily="34" charset="0"/>
+                <a:ea typeface="Open Sans" panose="020B0606030504020204" pitchFamily="34" charset="0"/>
+                <a:cs typeface="Open Sans" panose="020B0606030504020204" pitchFamily="34" charset="0"/>
+              </a:rPr>
+              <a:t>datePlusTot</a:t>
+            </a:r>
+            <a:r>
+              <a:rPr lang="fr-FR" sz="3000" dirty="0">
+                <a:latin typeface="Open Sans" panose="020B0606030504020204" pitchFamily="34" charset="0"/>
+                <a:ea typeface="Open Sans" panose="020B0606030504020204" pitchFamily="34" charset="0"/>
+                <a:cs typeface="Open Sans" panose="020B0606030504020204" pitchFamily="34" charset="0"/>
+              </a:rPr>
+              <a:t>;</a:t>
+            </a:r>
+          </a:p>
+          <a:p>
+            <a:r>
+              <a:rPr lang="fr-FR" sz="3000" dirty="0">
+                <a:latin typeface="Open Sans" panose="020B0606030504020204" pitchFamily="34" charset="0"/>
+                <a:ea typeface="Open Sans" panose="020B0606030504020204" pitchFamily="34" charset="0"/>
+                <a:cs typeface="Open Sans" panose="020B0606030504020204" pitchFamily="34" charset="0"/>
+              </a:rPr>
+              <a:t>pour i allant de nb-sommet - 2 à 0</a:t>
+            </a:r>
+          </a:p>
+          <a:p>
+            <a:r>
+              <a:rPr lang="fr-FR" sz="3000" dirty="0">
+                <a:latin typeface="Open Sans" panose="020B0606030504020204" pitchFamily="34" charset="0"/>
+                <a:ea typeface="Open Sans" panose="020B0606030504020204" pitchFamily="34" charset="0"/>
+                <a:cs typeface="Open Sans" panose="020B0606030504020204" pitchFamily="34" charset="0"/>
+              </a:rPr>
+              <a:t>    pour j allant 0 à nbSommet-1</a:t>
+            </a:r>
+          </a:p>
+          <a:p>
+            <a:r>
+              <a:rPr lang="fr-FR" sz="3000" dirty="0">
+                <a:latin typeface="Open Sans" panose="020B0606030504020204" pitchFamily="34" charset="0"/>
+                <a:ea typeface="Open Sans" panose="020B0606030504020204" pitchFamily="34" charset="0"/>
+                <a:cs typeface="Open Sans" panose="020B0606030504020204" pitchFamily="34" charset="0"/>
+              </a:rPr>
+              <a:t>        si </a:t>
+            </a:r>
+            <a:r>
+              <a:rPr lang="fr-FR" sz="3000" dirty="0" err="1">
+                <a:latin typeface="Open Sans" panose="020B0606030504020204" pitchFamily="34" charset="0"/>
+                <a:ea typeface="Open Sans" panose="020B0606030504020204" pitchFamily="34" charset="0"/>
+                <a:cs typeface="Open Sans" panose="020B0606030504020204" pitchFamily="34" charset="0"/>
+              </a:rPr>
+              <a:t>matriceAdjacence</a:t>
+            </a:r>
+            <a:r>
+              <a:rPr lang="fr-FR" sz="3000" dirty="0">
+                <a:latin typeface="Open Sans" panose="020B0606030504020204" pitchFamily="34" charset="0"/>
+                <a:ea typeface="Open Sans" panose="020B0606030504020204" pitchFamily="34" charset="0"/>
+                <a:cs typeface="Open Sans" panose="020B0606030504020204" pitchFamily="34" charset="0"/>
+              </a:rPr>
+              <a:t>[</a:t>
+            </a:r>
+            <a:r>
+              <a:rPr lang="fr-FR" sz="3000" dirty="0" err="1">
+                <a:latin typeface="Open Sans" panose="020B0606030504020204" pitchFamily="34" charset="0"/>
+                <a:ea typeface="Open Sans" panose="020B0606030504020204" pitchFamily="34" charset="0"/>
+                <a:cs typeface="Open Sans" panose="020B0606030504020204" pitchFamily="34" charset="0"/>
+              </a:rPr>
+              <a:t>sommetOrdonne</a:t>
+            </a:r>
+            <a:r>
+              <a:rPr lang="fr-FR" sz="3000" dirty="0">
+                <a:latin typeface="Open Sans" panose="020B0606030504020204" pitchFamily="34" charset="0"/>
+                <a:ea typeface="Open Sans" panose="020B0606030504020204" pitchFamily="34" charset="0"/>
+                <a:cs typeface="Open Sans" panose="020B0606030504020204" pitchFamily="34" charset="0"/>
+              </a:rPr>
+              <a:t>[i][j] == 1</a:t>
+            </a:r>
+          </a:p>
+          <a:p>
+            <a:r>
+              <a:rPr lang="fr-FR" sz="3000" dirty="0">
+                <a:latin typeface="Open Sans" panose="020B0606030504020204" pitchFamily="34" charset="0"/>
+                <a:ea typeface="Open Sans" panose="020B0606030504020204" pitchFamily="34" charset="0"/>
+                <a:cs typeface="Open Sans" panose="020B0606030504020204" pitchFamily="34" charset="0"/>
+              </a:rPr>
+              <a:t>            ajout j à </a:t>
+            </a:r>
+            <a:r>
+              <a:rPr lang="fr-FR" sz="3000" dirty="0" err="1">
+                <a:latin typeface="Open Sans" panose="020B0606030504020204" pitchFamily="34" charset="0"/>
+                <a:ea typeface="Open Sans" panose="020B0606030504020204" pitchFamily="34" charset="0"/>
+                <a:cs typeface="Open Sans" panose="020B0606030504020204" pitchFamily="34" charset="0"/>
+              </a:rPr>
+              <a:t>listeSucc</a:t>
+            </a:r>
+            <a:endParaRPr lang="fr-FR" sz="3000" dirty="0">
+              <a:latin typeface="Open Sans" panose="020B0606030504020204" pitchFamily="34" charset="0"/>
+              <a:ea typeface="Open Sans" panose="020B0606030504020204" pitchFamily="34" charset="0"/>
+              <a:cs typeface="Open Sans" panose="020B0606030504020204" pitchFamily="34" charset="0"/>
+            </a:endParaRPr>
+          </a:p>
+          <a:p>
+            <a:r>
+              <a:rPr lang="fr-FR" sz="3000" dirty="0">
+                <a:latin typeface="Open Sans" panose="020B0606030504020204" pitchFamily="34" charset="0"/>
+                <a:ea typeface="Open Sans" panose="020B0606030504020204" pitchFamily="34" charset="0"/>
+                <a:cs typeface="Open Sans" panose="020B0606030504020204" pitchFamily="34" charset="0"/>
+              </a:rPr>
+              <a:t>        fin</a:t>
+            </a:r>
+          </a:p>
+          <a:p>
+            <a:r>
+              <a:rPr lang="fr-FR" sz="3000" dirty="0">
+                <a:latin typeface="Open Sans" panose="020B0606030504020204" pitchFamily="34" charset="0"/>
+                <a:ea typeface="Open Sans" panose="020B0606030504020204" pitchFamily="34" charset="0"/>
+                <a:cs typeface="Open Sans" panose="020B0606030504020204" pitchFamily="34" charset="0"/>
+              </a:rPr>
+              <a:t>    fin</a:t>
+            </a:r>
+          </a:p>
+          <a:p>
+            <a:r>
+              <a:rPr lang="fr-FR" sz="3000" dirty="0">
+                <a:latin typeface="Open Sans" panose="020B0606030504020204" pitchFamily="34" charset="0"/>
+                <a:ea typeface="Open Sans" panose="020B0606030504020204" pitchFamily="34" charset="0"/>
+                <a:cs typeface="Open Sans" panose="020B0606030504020204" pitchFamily="34" charset="0"/>
+              </a:rPr>
+              <a:t>    …</a:t>
+            </a:r>
+          </a:p>
+        </p:txBody>
+      </p:sp>
+      <p:sp>
+        <p:nvSpPr>
+          <p:cNvPr id="24" name="Rectangle 23">
+            <a:extLst>
+              <a:ext uri="{FF2B5EF4-FFF2-40B4-BE49-F238E27FC236}">
+                <a16:creationId xmlns:a16="http://schemas.microsoft.com/office/drawing/2014/main" id="{E84CBF3F-8B3D-4AE6-A7E7-60951E474342}"/>
+              </a:ext>
+            </a:extLst>
+          </p:cNvPr>
+          <p:cNvSpPr/>
+          <p:nvPr/>
+        </p:nvSpPr>
+        <p:spPr>
+          <a:xfrm>
+            <a:off x="13247048" y="9791677"/>
+            <a:ext cx="8857578" cy="1477328"/>
+          </a:xfrm>
+          <a:prstGeom prst="rect">
+            <a:avLst/>
+          </a:prstGeom>
+        </p:spPr>
+        <p:txBody>
+          <a:bodyPr wrap="square">
+            <a:spAutoFit/>
+          </a:bodyPr>
+          <a:lstStyle/>
+          <a:p>
+            <a:r>
+              <a:rPr lang="fr-FR" sz="3000" dirty="0"/>
+              <a:t>    …</a:t>
+            </a:r>
+          </a:p>
+          <a:p>
+            <a:r>
+              <a:rPr lang="fr-FR" sz="3000" dirty="0"/>
+              <a:t>    tache = valeur de la tache de </a:t>
+            </a:r>
+            <a:r>
+              <a:rPr lang="fr-FR" sz="3000" dirty="0" err="1"/>
+              <a:t>sommetOrdonne</a:t>
+            </a:r>
+            <a:r>
+              <a:rPr lang="fr-FR" sz="3000" dirty="0"/>
+              <a:t>[i]   </a:t>
+            </a:r>
+          </a:p>
+          <a:p>
+            <a:r>
+              <a:rPr lang="fr-FR" sz="3000" dirty="0"/>
+              <a:t>    …</a:t>
+            </a:r>
+          </a:p>
+        </p:txBody>
+      </p:sp>
+    </p:spTree>
+    <p:extLst>
+      <p:ext uri="{BB962C8B-B14F-4D97-AF65-F5344CB8AC3E}">
+        <p14:creationId xmlns:p14="http://schemas.microsoft.com/office/powerpoint/2010/main" val="3295703450"/>
+      </p:ext>
+    </p:extLst>
+  </p:cSld>
+  <p:clrMapOvr>
+    <a:masterClrMapping/>
+  </p:clrMapOvr>
+</p:sld>
+</file>
+
+<file path=ppt/slides/slide19.xml><?xml version="1.0" encoding="utf-8"?>
+<p:sld xmlns:a="http://schemas.openxmlformats.org/drawingml/2006/main" xmlns:r="http://schemas.openxmlformats.org/officeDocument/2006/relationships" xmlns:p="http://schemas.openxmlformats.org/presentationml/2006/main">
+  <p:cSld>
+    <p:spTree>
+      <p:nvGrpSpPr>
+        <p:cNvPr id="1" name=""/>
+        <p:cNvGrpSpPr/>
+        <p:nvPr/>
+      </p:nvGrpSpPr>
+      <p:grpSpPr>
+        <a:xfrm>
+          <a:off x="0" y="0"/>
+          <a:ext cx="0" cy="0"/>
+          <a:chOff x="0" y="0"/>
+          <a:chExt cx="0" cy="0"/>
+        </a:xfrm>
+      </p:grpSpPr>
+      <p:sp>
+        <p:nvSpPr>
+          <p:cNvPr id="2" name="Oval 58">
+            <a:extLst>
+              <a:ext uri="{FF2B5EF4-FFF2-40B4-BE49-F238E27FC236}">
+                <a16:creationId xmlns:a16="http://schemas.microsoft.com/office/drawing/2014/main" id="{AD70A230-82AA-4409-B505-7464F553F4FB}"/>
+              </a:ext>
+            </a:extLst>
+          </p:cNvPr>
+          <p:cNvSpPr/>
+          <p:nvPr/>
+        </p:nvSpPr>
+        <p:spPr>
+          <a:xfrm>
+            <a:off x="1653792" y="4851259"/>
+            <a:ext cx="1074332" cy="1074611"/>
+          </a:xfrm>
+          <a:prstGeom prst="ellipse">
+            <a:avLst/>
+          </a:prstGeom>
+          <a:noFill/>
+          <a:ln w="28575">
+            <a:solidFill>
+              <a:schemeClr val="tx1"/>
+            </a:solidFill>
+          </a:ln>
+        </p:spPr>
+        <p:style>
+          <a:lnRef idx="2">
+            <a:schemeClr val="accent1">
+              <a:shade val="50000"/>
+            </a:schemeClr>
+          </a:lnRef>
+          <a:fillRef idx="1">
+            <a:schemeClr val="accent1"/>
+          </a:fillRef>
+          <a:effectRef idx="0">
+            <a:schemeClr val="accent1"/>
+          </a:effectRef>
+          <a:fontRef idx="minor">
+            <a:schemeClr val="lt1"/>
+          </a:fontRef>
+        </p:style>
+        <p:txBody>
+          <a:bodyPr rtlCol="0" anchor="ctr"/>
+          <a:lstStyle/>
+          <a:p>
+            <a:pPr algn="ctr"/>
+            <a:endParaRPr lang="en-US" sz="2900" dirty="0">
+              <a:latin typeface="Montserrat Light" charset="0"/>
+              <a:ea typeface="Montserrat Light" charset="0"/>
+              <a:cs typeface="Montserrat Light" charset="0"/>
+            </a:endParaRPr>
+          </a:p>
+        </p:txBody>
+      </p:sp>
+      <p:sp>
+        <p:nvSpPr>
+          <p:cNvPr id="3" name="ZoneTexte 2">
+            <a:extLst>
+              <a:ext uri="{FF2B5EF4-FFF2-40B4-BE49-F238E27FC236}">
+                <a16:creationId xmlns:a16="http://schemas.microsoft.com/office/drawing/2014/main" id="{62CE75D2-956A-4E80-9E11-FFB45D9A9023}"/>
+              </a:ext>
+            </a:extLst>
+          </p:cNvPr>
+          <p:cNvSpPr txBox="1"/>
+          <p:nvPr/>
+        </p:nvSpPr>
+        <p:spPr>
+          <a:xfrm>
+            <a:off x="3813175" y="4966727"/>
+            <a:ext cx="7456472" cy="646331"/>
+          </a:xfrm>
+          <a:prstGeom prst="rect">
+            <a:avLst/>
+          </a:prstGeom>
+          <a:noFill/>
+        </p:spPr>
+        <p:txBody>
+          <a:bodyPr wrap="square" rtlCol="0">
+            <a:spAutoFit/>
+          </a:bodyPr>
+          <a:lstStyle/>
+          <a:p>
+            <a:r>
+              <a:rPr lang="fr-FR" dirty="0">
+                <a:latin typeface="Open Sans" panose="020B0606030504020204" pitchFamily="34" charset="0"/>
+                <a:ea typeface="Open Sans" panose="020B0606030504020204" pitchFamily="34" charset="0"/>
+                <a:cs typeface="Open Sans" panose="020B0606030504020204" pitchFamily="34" charset="0"/>
+              </a:rPr>
+              <a:t>Calcul des dates au plus tard</a:t>
+            </a:r>
+          </a:p>
+        </p:txBody>
+      </p:sp>
+      <p:sp>
+        <p:nvSpPr>
+          <p:cNvPr id="8" name="ZoneTexte 7">
+            <a:extLst>
+              <a:ext uri="{FF2B5EF4-FFF2-40B4-BE49-F238E27FC236}">
+                <a16:creationId xmlns:a16="http://schemas.microsoft.com/office/drawing/2014/main" id="{F7CEAE41-B470-4249-9F67-341B9FDE0E2E}"/>
+              </a:ext>
+            </a:extLst>
+          </p:cNvPr>
+          <p:cNvSpPr txBox="1"/>
+          <p:nvPr/>
+        </p:nvSpPr>
+        <p:spPr>
+          <a:xfrm>
+            <a:off x="1808211" y="4942287"/>
+            <a:ext cx="765494" cy="892552"/>
+          </a:xfrm>
+          <a:prstGeom prst="rect">
+            <a:avLst/>
+          </a:prstGeom>
+          <a:noFill/>
+        </p:spPr>
+        <p:txBody>
+          <a:bodyPr wrap="square" rtlCol="0">
+            <a:spAutoFit/>
+          </a:bodyPr>
+          <a:lstStyle/>
+          <a:p>
+            <a:pPr algn="ctr"/>
+            <a:r>
+              <a:rPr lang="fr-FR" sz="5200" b="1" dirty="0">
+                <a:latin typeface="Montserrat" panose="00000500000000000000" pitchFamily="2" charset="0"/>
+              </a:rPr>
+              <a:t>3</a:t>
+            </a:r>
+          </a:p>
+        </p:txBody>
+      </p:sp>
+      <p:sp>
+        <p:nvSpPr>
+          <p:cNvPr id="9" name="Oval 58">
+            <a:extLst>
+              <a:ext uri="{FF2B5EF4-FFF2-40B4-BE49-F238E27FC236}">
+                <a16:creationId xmlns:a16="http://schemas.microsoft.com/office/drawing/2014/main" id="{314E2FB6-B01F-4137-9F9C-AF384FC63B9A}"/>
+              </a:ext>
+            </a:extLst>
+          </p:cNvPr>
+          <p:cNvSpPr/>
+          <p:nvPr/>
+        </p:nvSpPr>
+        <p:spPr>
+          <a:xfrm>
+            <a:off x="1653792" y="10001109"/>
+            <a:ext cx="1074332" cy="1074611"/>
+          </a:xfrm>
+          <a:prstGeom prst="ellipse">
+            <a:avLst/>
+          </a:prstGeom>
+          <a:noFill/>
+          <a:ln w="28575">
+            <a:solidFill>
+              <a:schemeClr val="tx1"/>
+            </a:solidFill>
+          </a:ln>
+        </p:spPr>
+        <p:style>
+          <a:lnRef idx="2">
+            <a:schemeClr val="accent1">
+              <a:shade val="50000"/>
+            </a:schemeClr>
+          </a:lnRef>
+          <a:fillRef idx="1">
+            <a:schemeClr val="accent1"/>
+          </a:fillRef>
+          <a:effectRef idx="0">
+            <a:schemeClr val="accent1"/>
+          </a:effectRef>
+          <a:fontRef idx="minor">
+            <a:schemeClr val="lt1"/>
+          </a:fontRef>
+        </p:style>
+        <p:txBody>
+          <a:bodyPr rtlCol="0" anchor="ctr"/>
+          <a:lstStyle/>
+          <a:p>
+            <a:pPr algn="ctr"/>
+            <a:endParaRPr lang="en-US" sz="2900" dirty="0">
+              <a:latin typeface="Montserrat Light" charset="0"/>
+              <a:ea typeface="Montserrat Light" charset="0"/>
+              <a:cs typeface="Montserrat Light" charset="0"/>
+            </a:endParaRPr>
+          </a:p>
+        </p:txBody>
+      </p:sp>
+      <p:sp>
+        <p:nvSpPr>
+          <p:cNvPr id="10" name="ZoneTexte 9">
+            <a:extLst>
+              <a:ext uri="{FF2B5EF4-FFF2-40B4-BE49-F238E27FC236}">
+                <a16:creationId xmlns:a16="http://schemas.microsoft.com/office/drawing/2014/main" id="{EA7305AA-C91D-4327-93CA-B854F5AF5A82}"/>
+              </a:ext>
+            </a:extLst>
+          </p:cNvPr>
+          <p:cNvSpPr txBox="1"/>
+          <p:nvPr/>
+        </p:nvSpPr>
+        <p:spPr>
+          <a:xfrm>
+            <a:off x="3813175" y="10116577"/>
+            <a:ext cx="7456472" cy="1200329"/>
+          </a:xfrm>
+          <a:prstGeom prst="rect">
+            <a:avLst/>
+          </a:prstGeom>
+          <a:noFill/>
+        </p:spPr>
+        <p:txBody>
+          <a:bodyPr wrap="square" rtlCol="0">
+            <a:spAutoFit/>
+          </a:bodyPr>
+          <a:lstStyle/>
+          <a:p>
+            <a:r>
+              <a:rPr lang="fr-FR" dirty="0">
+                <a:latin typeface="Open Sans" panose="020B0606030504020204" pitchFamily="34" charset="0"/>
+                <a:ea typeface="Open Sans" panose="020B0606030504020204" pitchFamily="34" charset="0"/>
+                <a:cs typeface="Open Sans" panose="020B0606030504020204" pitchFamily="34" charset="0"/>
+              </a:rPr>
+              <a:t>Conservation de la date au plus tard minimale</a:t>
+            </a:r>
+          </a:p>
+        </p:txBody>
+      </p:sp>
+      <p:sp>
+        <p:nvSpPr>
+          <p:cNvPr id="11" name="ZoneTexte 10">
+            <a:extLst>
+              <a:ext uri="{FF2B5EF4-FFF2-40B4-BE49-F238E27FC236}">
+                <a16:creationId xmlns:a16="http://schemas.microsoft.com/office/drawing/2014/main" id="{D1E9F0AC-D027-4719-AF38-04C4EBDAC40B}"/>
+              </a:ext>
+            </a:extLst>
+          </p:cNvPr>
+          <p:cNvSpPr txBox="1"/>
+          <p:nvPr/>
+        </p:nvSpPr>
+        <p:spPr>
+          <a:xfrm>
+            <a:off x="1808211" y="10092137"/>
+            <a:ext cx="765494" cy="892552"/>
+          </a:xfrm>
+          <a:prstGeom prst="rect">
+            <a:avLst/>
+          </a:prstGeom>
+          <a:noFill/>
+        </p:spPr>
+        <p:txBody>
+          <a:bodyPr wrap="square" rtlCol="0">
+            <a:spAutoFit/>
+          </a:bodyPr>
+          <a:lstStyle/>
+          <a:p>
+            <a:pPr algn="ctr"/>
+            <a:r>
+              <a:rPr lang="fr-FR" sz="5200" b="1" dirty="0">
+                <a:latin typeface="Montserrat" panose="00000500000000000000" pitchFamily="2" charset="0"/>
+              </a:rPr>
+              <a:t>4</a:t>
+            </a:r>
+          </a:p>
+        </p:txBody>
+      </p:sp>
+      <p:sp>
+        <p:nvSpPr>
+          <p:cNvPr id="12" name="Rectangle 11">
+            <a:extLst>
+              <a:ext uri="{FF2B5EF4-FFF2-40B4-BE49-F238E27FC236}">
+                <a16:creationId xmlns:a16="http://schemas.microsoft.com/office/drawing/2014/main" id="{9EC294B9-4D95-43E2-9035-3C4E7B2F0ED4}"/>
+              </a:ext>
+            </a:extLst>
+          </p:cNvPr>
+          <p:cNvSpPr/>
+          <p:nvPr/>
+        </p:nvSpPr>
+        <p:spPr>
+          <a:xfrm>
+            <a:off x="11556827" y="2704570"/>
+            <a:ext cx="13160736" cy="5170646"/>
+          </a:xfrm>
+          <a:prstGeom prst="rect">
+            <a:avLst/>
+          </a:prstGeom>
+        </p:spPr>
+        <p:txBody>
+          <a:bodyPr wrap="square">
+            <a:spAutoFit/>
+          </a:bodyPr>
+          <a:lstStyle/>
+          <a:p>
+            <a:r>
+              <a:rPr lang="fr-FR" sz="3000" dirty="0">
+                <a:latin typeface="Open Sans" panose="020B0606030504020204" pitchFamily="34" charset="0"/>
+                <a:ea typeface="Open Sans" panose="020B0606030504020204" pitchFamily="34" charset="0"/>
+                <a:cs typeface="Open Sans" panose="020B0606030504020204" pitchFamily="34" charset="0"/>
+              </a:rPr>
+              <a:t>…</a:t>
+            </a:r>
+          </a:p>
+          <a:p>
+            <a:r>
+              <a:rPr lang="fr-FR" sz="3000" dirty="0">
+                <a:latin typeface="Open Sans" panose="020B0606030504020204" pitchFamily="34" charset="0"/>
+                <a:ea typeface="Open Sans" panose="020B0606030504020204" pitchFamily="34" charset="0"/>
+                <a:cs typeface="Open Sans" panose="020B0606030504020204" pitchFamily="34" charset="0"/>
+              </a:rPr>
+              <a:t>    pour j allant de 0 à taille </a:t>
+            </a:r>
+            <a:r>
+              <a:rPr lang="fr-FR" sz="3000" dirty="0" err="1">
+                <a:latin typeface="Open Sans" panose="020B0606030504020204" pitchFamily="34" charset="0"/>
+                <a:ea typeface="Open Sans" panose="020B0606030504020204" pitchFamily="34" charset="0"/>
+                <a:cs typeface="Open Sans" panose="020B0606030504020204" pitchFamily="34" charset="0"/>
+              </a:rPr>
+              <a:t>listeSucc</a:t>
+            </a:r>
+            <a:r>
+              <a:rPr lang="fr-FR" sz="3000" dirty="0">
+                <a:latin typeface="Open Sans" panose="020B0606030504020204" pitchFamily="34" charset="0"/>
+                <a:ea typeface="Open Sans" panose="020B0606030504020204" pitchFamily="34" charset="0"/>
+                <a:cs typeface="Open Sans" panose="020B0606030504020204" pitchFamily="34" charset="0"/>
+              </a:rPr>
+              <a:t> - 1</a:t>
+            </a:r>
+          </a:p>
+          <a:p>
+            <a:r>
+              <a:rPr lang="fr-FR" sz="3000" dirty="0">
+                <a:latin typeface="Open Sans" panose="020B0606030504020204" pitchFamily="34" charset="0"/>
+                <a:ea typeface="Open Sans" panose="020B0606030504020204" pitchFamily="34" charset="0"/>
+                <a:cs typeface="Open Sans" panose="020B0606030504020204" pitchFamily="34" charset="0"/>
+              </a:rPr>
+              <a:t>	</a:t>
+            </a:r>
+            <a:r>
+              <a:rPr lang="fr-FR" sz="3000" dirty="0" err="1">
+                <a:latin typeface="Open Sans" panose="020B0606030504020204" pitchFamily="34" charset="0"/>
+                <a:ea typeface="Open Sans" panose="020B0606030504020204" pitchFamily="34" charset="0"/>
+                <a:cs typeface="Open Sans" panose="020B0606030504020204" pitchFamily="34" charset="0"/>
+              </a:rPr>
+              <a:t>sommetTache</a:t>
+            </a:r>
+            <a:r>
+              <a:rPr lang="fr-FR" sz="3000" dirty="0">
+                <a:latin typeface="Open Sans" panose="020B0606030504020204" pitchFamily="34" charset="0"/>
+                <a:ea typeface="Open Sans" panose="020B0606030504020204" pitchFamily="34" charset="0"/>
+                <a:cs typeface="Open Sans" panose="020B0606030504020204" pitchFamily="34" charset="0"/>
+              </a:rPr>
+              <a:t> = </a:t>
+            </a:r>
+            <a:r>
+              <a:rPr lang="fr-FR" sz="3000" dirty="0" err="1">
+                <a:latin typeface="Open Sans" panose="020B0606030504020204" pitchFamily="34" charset="0"/>
+                <a:ea typeface="Open Sans" panose="020B0606030504020204" pitchFamily="34" charset="0"/>
+                <a:cs typeface="Open Sans" panose="020B0606030504020204" pitchFamily="34" charset="0"/>
+              </a:rPr>
+              <a:t>listeSucc.get</a:t>
+            </a:r>
+            <a:r>
+              <a:rPr lang="fr-FR" sz="3000" dirty="0">
+                <a:latin typeface="Open Sans" panose="020B0606030504020204" pitchFamily="34" charset="0"/>
+                <a:ea typeface="Open Sans" panose="020B0606030504020204" pitchFamily="34" charset="0"/>
+                <a:cs typeface="Open Sans" panose="020B0606030504020204" pitchFamily="34" charset="0"/>
+              </a:rPr>
+              <a:t>(j)</a:t>
+            </a:r>
+          </a:p>
+          <a:p>
+            <a:r>
+              <a:rPr lang="fr-FR" sz="3000" dirty="0">
+                <a:latin typeface="Open Sans" panose="020B0606030504020204" pitchFamily="34" charset="0"/>
+                <a:ea typeface="Open Sans" panose="020B0606030504020204" pitchFamily="34" charset="0"/>
+                <a:cs typeface="Open Sans" panose="020B0606030504020204" pitchFamily="34" charset="0"/>
+              </a:rPr>
+              <a:t>        	index = 0</a:t>
+            </a:r>
+          </a:p>
+          <a:p>
+            <a:r>
+              <a:rPr lang="fr-FR" sz="3000" dirty="0">
+                <a:latin typeface="Open Sans" panose="020B0606030504020204" pitchFamily="34" charset="0"/>
+                <a:ea typeface="Open Sans" panose="020B0606030504020204" pitchFamily="34" charset="0"/>
+                <a:cs typeface="Open Sans" panose="020B0606030504020204" pitchFamily="34" charset="0"/>
+              </a:rPr>
+              <a:t>        	pour k allant de 0 à taille de </a:t>
+            </a:r>
+            <a:r>
+              <a:rPr lang="fr-FR" sz="3000" dirty="0" err="1">
+                <a:latin typeface="Open Sans" panose="020B0606030504020204" pitchFamily="34" charset="0"/>
+                <a:ea typeface="Open Sans" panose="020B0606030504020204" pitchFamily="34" charset="0"/>
+                <a:cs typeface="Open Sans" panose="020B0606030504020204" pitchFamily="34" charset="0"/>
+              </a:rPr>
+              <a:t>sommetOrdonne</a:t>
+            </a:r>
+            <a:r>
+              <a:rPr lang="fr-FR" sz="3000" dirty="0">
+                <a:latin typeface="Open Sans" panose="020B0606030504020204" pitchFamily="34" charset="0"/>
+                <a:ea typeface="Open Sans" panose="020B0606030504020204" pitchFamily="34" charset="0"/>
+                <a:cs typeface="Open Sans" panose="020B0606030504020204" pitchFamily="34" charset="0"/>
+              </a:rPr>
+              <a:t> - 1</a:t>
+            </a:r>
+          </a:p>
+          <a:p>
+            <a:r>
+              <a:rPr lang="fr-FR" sz="3000" dirty="0">
+                <a:latin typeface="Open Sans" panose="020B0606030504020204" pitchFamily="34" charset="0"/>
+                <a:ea typeface="Open Sans" panose="020B0606030504020204" pitchFamily="34" charset="0"/>
+                <a:cs typeface="Open Sans" panose="020B0606030504020204" pitchFamily="34" charset="0"/>
+              </a:rPr>
+              <a:t>            		si (</a:t>
+            </a:r>
+            <a:r>
+              <a:rPr lang="fr-FR" sz="3000" dirty="0" err="1">
+                <a:latin typeface="Open Sans" panose="020B0606030504020204" pitchFamily="34" charset="0"/>
+                <a:ea typeface="Open Sans" panose="020B0606030504020204" pitchFamily="34" charset="0"/>
+                <a:cs typeface="Open Sans" panose="020B0606030504020204" pitchFamily="34" charset="0"/>
+              </a:rPr>
+              <a:t>sommetOrdonne</a:t>
+            </a:r>
+            <a:r>
+              <a:rPr lang="fr-FR" sz="3000" dirty="0">
+                <a:latin typeface="Open Sans" panose="020B0606030504020204" pitchFamily="34" charset="0"/>
+                <a:ea typeface="Open Sans" panose="020B0606030504020204" pitchFamily="34" charset="0"/>
+                <a:cs typeface="Open Sans" panose="020B0606030504020204" pitchFamily="34" charset="0"/>
+              </a:rPr>
+              <a:t>[k] == </a:t>
+            </a:r>
+            <a:r>
+              <a:rPr lang="fr-FR" sz="3000" dirty="0" err="1">
+                <a:latin typeface="Open Sans" panose="020B0606030504020204" pitchFamily="34" charset="0"/>
+                <a:ea typeface="Open Sans" panose="020B0606030504020204" pitchFamily="34" charset="0"/>
+                <a:cs typeface="Open Sans" panose="020B0606030504020204" pitchFamily="34" charset="0"/>
+              </a:rPr>
+              <a:t>sommetTache</a:t>
+            </a:r>
+            <a:r>
+              <a:rPr lang="fr-FR" sz="3000" dirty="0">
+                <a:latin typeface="Open Sans" panose="020B0606030504020204" pitchFamily="34" charset="0"/>
+                <a:ea typeface="Open Sans" panose="020B0606030504020204" pitchFamily="34" charset="0"/>
+                <a:cs typeface="Open Sans" panose="020B0606030504020204" pitchFamily="34" charset="0"/>
+              </a:rPr>
+              <a:t>)</a:t>
+            </a:r>
+          </a:p>
+          <a:p>
+            <a:r>
+              <a:rPr lang="fr-FR" sz="3000" dirty="0">
+                <a:latin typeface="Open Sans" panose="020B0606030504020204" pitchFamily="34" charset="0"/>
+                <a:ea typeface="Open Sans" panose="020B0606030504020204" pitchFamily="34" charset="0"/>
+                <a:cs typeface="Open Sans" panose="020B0606030504020204" pitchFamily="34" charset="0"/>
+              </a:rPr>
+              <a:t>                			index = k</a:t>
+            </a:r>
+          </a:p>
+          <a:p>
+            <a:r>
+              <a:rPr lang="fr-FR" sz="3000" dirty="0">
+                <a:latin typeface="Open Sans" panose="020B0606030504020204" pitchFamily="34" charset="0"/>
+                <a:ea typeface="Open Sans" panose="020B0606030504020204" pitchFamily="34" charset="0"/>
+                <a:cs typeface="Open Sans" panose="020B0606030504020204" pitchFamily="34" charset="0"/>
+              </a:rPr>
+              <a:t>            		fin</a:t>
+            </a:r>
+          </a:p>
+          <a:p>
+            <a:r>
+              <a:rPr lang="fr-FR" sz="3000" dirty="0">
+                <a:latin typeface="Open Sans" panose="020B0606030504020204" pitchFamily="34" charset="0"/>
+                <a:ea typeface="Open Sans" panose="020B0606030504020204" pitchFamily="34" charset="0"/>
+                <a:cs typeface="Open Sans" panose="020B0606030504020204" pitchFamily="34" charset="0"/>
+              </a:rPr>
+              <a:t>        	fin</a:t>
+            </a:r>
+          </a:p>
+          <a:p>
+            <a:r>
+              <a:rPr lang="fr-FR" sz="3000" dirty="0">
+                <a:latin typeface="Open Sans" panose="020B0606030504020204" pitchFamily="34" charset="0"/>
+                <a:ea typeface="Open Sans" panose="020B0606030504020204" pitchFamily="34" charset="0"/>
+                <a:cs typeface="Open Sans" panose="020B0606030504020204" pitchFamily="34" charset="0"/>
+              </a:rPr>
+              <a:t>        	ajoute (</a:t>
+            </a:r>
+            <a:r>
+              <a:rPr lang="fr-FR" sz="3000" dirty="0" err="1">
+                <a:latin typeface="Open Sans" panose="020B0606030504020204" pitchFamily="34" charset="0"/>
+                <a:ea typeface="Open Sans" panose="020B0606030504020204" pitchFamily="34" charset="0"/>
+                <a:cs typeface="Open Sans" panose="020B0606030504020204" pitchFamily="34" charset="0"/>
+              </a:rPr>
+              <a:t>array</a:t>
+            </a:r>
+            <a:r>
+              <a:rPr lang="fr-FR" sz="3000" dirty="0">
+                <a:latin typeface="Open Sans" panose="020B0606030504020204" pitchFamily="34" charset="0"/>
+                <a:ea typeface="Open Sans" panose="020B0606030504020204" pitchFamily="34" charset="0"/>
+                <a:cs typeface="Open Sans" panose="020B0606030504020204" pitchFamily="34" charset="0"/>
+              </a:rPr>
+              <a:t>[1][index] - tache) à </a:t>
+            </a:r>
+            <a:r>
+              <a:rPr lang="fr-FR" sz="3000" dirty="0" err="1">
+                <a:latin typeface="Open Sans" panose="020B0606030504020204" pitchFamily="34" charset="0"/>
+                <a:ea typeface="Open Sans" panose="020B0606030504020204" pitchFamily="34" charset="0"/>
+                <a:cs typeface="Open Sans" panose="020B0606030504020204" pitchFamily="34" charset="0"/>
+              </a:rPr>
+              <a:t>listeDatePlusTard</a:t>
+            </a:r>
+            <a:endParaRPr lang="fr-FR" sz="3000" dirty="0">
+              <a:latin typeface="Open Sans" panose="020B0606030504020204" pitchFamily="34" charset="0"/>
+              <a:ea typeface="Open Sans" panose="020B0606030504020204" pitchFamily="34" charset="0"/>
+              <a:cs typeface="Open Sans" panose="020B0606030504020204" pitchFamily="34" charset="0"/>
+            </a:endParaRPr>
+          </a:p>
+          <a:p>
+            <a:r>
+              <a:rPr lang="fr-FR" sz="3000" dirty="0">
+                <a:latin typeface="Open Sans" panose="020B0606030504020204" pitchFamily="34" charset="0"/>
+                <a:ea typeface="Open Sans" panose="020B0606030504020204" pitchFamily="34" charset="0"/>
+                <a:cs typeface="Open Sans" panose="020B0606030504020204" pitchFamily="34" charset="0"/>
+              </a:rPr>
+              <a:t>    fin</a:t>
+            </a:r>
+          </a:p>
+        </p:txBody>
+      </p:sp>
+      <p:sp>
+        <p:nvSpPr>
+          <p:cNvPr id="14" name="Rectangle 13">
+            <a:extLst>
+              <a:ext uri="{FF2B5EF4-FFF2-40B4-BE49-F238E27FC236}">
+                <a16:creationId xmlns:a16="http://schemas.microsoft.com/office/drawing/2014/main" id="{C238569F-F9A7-49D4-92ED-73A9E7CF192E}"/>
+              </a:ext>
+            </a:extLst>
+          </p:cNvPr>
+          <p:cNvSpPr/>
+          <p:nvPr/>
+        </p:nvSpPr>
+        <p:spPr>
+          <a:xfrm>
+            <a:off x="11556827" y="9338084"/>
+            <a:ext cx="14543330" cy="2400657"/>
+          </a:xfrm>
+          <a:prstGeom prst="rect">
+            <a:avLst/>
+          </a:prstGeom>
+        </p:spPr>
+        <p:txBody>
+          <a:bodyPr wrap="square">
+            <a:spAutoFit/>
+          </a:bodyPr>
+          <a:lstStyle/>
+          <a:p>
+            <a:r>
+              <a:rPr lang="fr-FR" sz="3000" dirty="0">
+                <a:latin typeface="Open Sans" panose="020B0606030504020204" pitchFamily="34" charset="0"/>
+                <a:ea typeface="Open Sans" panose="020B0606030504020204" pitchFamily="34" charset="0"/>
+                <a:cs typeface="Open Sans" panose="020B0606030504020204" pitchFamily="34" charset="0"/>
+              </a:rPr>
+              <a:t>    </a:t>
+            </a:r>
+            <a:r>
+              <a:rPr lang="fr-FR" sz="3000" dirty="0" err="1">
+                <a:latin typeface="Open Sans" panose="020B0606030504020204" pitchFamily="34" charset="0"/>
+                <a:ea typeface="Open Sans" panose="020B0606030504020204" pitchFamily="34" charset="0"/>
+                <a:cs typeface="Open Sans" panose="020B0606030504020204" pitchFamily="34" charset="0"/>
+              </a:rPr>
+              <a:t>array</a:t>
+            </a:r>
+            <a:r>
+              <a:rPr lang="fr-FR" sz="3000" dirty="0">
+                <a:latin typeface="Open Sans" panose="020B0606030504020204" pitchFamily="34" charset="0"/>
+                <a:ea typeface="Open Sans" panose="020B0606030504020204" pitchFamily="34" charset="0"/>
+                <a:cs typeface="Open Sans" panose="020B0606030504020204" pitchFamily="34" charset="0"/>
+              </a:rPr>
+              <a:t>[1][i] = Valeur min de </a:t>
+            </a:r>
+            <a:r>
+              <a:rPr lang="fr-FR" sz="3000" dirty="0" err="1">
+                <a:latin typeface="Open Sans" panose="020B0606030504020204" pitchFamily="34" charset="0"/>
+                <a:ea typeface="Open Sans" panose="020B0606030504020204" pitchFamily="34" charset="0"/>
+                <a:cs typeface="Open Sans" panose="020B0606030504020204" pitchFamily="34" charset="0"/>
+              </a:rPr>
+              <a:t>listeDatePlusTard</a:t>
+            </a:r>
+            <a:endParaRPr lang="fr-FR" sz="3000" dirty="0">
+              <a:latin typeface="Open Sans" panose="020B0606030504020204" pitchFamily="34" charset="0"/>
+              <a:ea typeface="Open Sans" panose="020B0606030504020204" pitchFamily="34" charset="0"/>
+              <a:cs typeface="Open Sans" panose="020B0606030504020204" pitchFamily="34" charset="0"/>
+            </a:endParaRPr>
+          </a:p>
+          <a:p>
+            <a:r>
+              <a:rPr lang="fr-FR" sz="3000" dirty="0">
+                <a:latin typeface="Open Sans" panose="020B0606030504020204" pitchFamily="34" charset="0"/>
+                <a:ea typeface="Open Sans" panose="020B0606030504020204" pitchFamily="34" charset="0"/>
+                <a:cs typeface="Open Sans" panose="020B0606030504020204" pitchFamily="34" charset="0"/>
+              </a:rPr>
+              <a:t>    </a:t>
+            </a:r>
+            <a:r>
+              <a:rPr lang="fr-FR" sz="3000" dirty="0" err="1">
+                <a:latin typeface="Open Sans" panose="020B0606030504020204" pitchFamily="34" charset="0"/>
+                <a:ea typeface="Open Sans" panose="020B0606030504020204" pitchFamily="34" charset="0"/>
+                <a:cs typeface="Open Sans" panose="020B0606030504020204" pitchFamily="34" charset="0"/>
+              </a:rPr>
+              <a:t>array</a:t>
+            </a:r>
+            <a:r>
+              <a:rPr lang="fr-FR" sz="3000" dirty="0">
+                <a:latin typeface="Open Sans" panose="020B0606030504020204" pitchFamily="34" charset="0"/>
+                <a:ea typeface="Open Sans" panose="020B0606030504020204" pitchFamily="34" charset="0"/>
+                <a:cs typeface="Open Sans" panose="020B0606030504020204" pitchFamily="34" charset="0"/>
+              </a:rPr>
+              <a:t>[0][i] = </a:t>
+            </a:r>
+            <a:r>
+              <a:rPr lang="fr-FR" sz="3000" dirty="0" err="1">
+                <a:latin typeface="Open Sans" panose="020B0606030504020204" pitchFamily="34" charset="0"/>
+                <a:ea typeface="Open Sans" panose="020B0606030504020204" pitchFamily="34" charset="0"/>
+                <a:cs typeface="Open Sans" panose="020B0606030504020204" pitchFamily="34" charset="0"/>
+              </a:rPr>
+              <a:t>listeSucc.get</a:t>
+            </a:r>
+            <a:r>
+              <a:rPr lang="fr-FR" sz="3000" dirty="0">
+                <a:latin typeface="Open Sans" panose="020B0606030504020204" pitchFamily="34" charset="0"/>
+                <a:ea typeface="Open Sans" panose="020B0606030504020204" pitchFamily="34" charset="0"/>
+                <a:cs typeface="Open Sans" panose="020B0606030504020204" pitchFamily="34" charset="0"/>
+              </a:rPr>
+              <a:t>(index de </a:t>
+            </a:r>
+            <a:r>
+              <a:rPr lang="fr-FR" sz="3000" dirty="0" err="1">
+                <a:latin typeface="Open Sans" panose="020B0606030504020204" pitchFamily="34" charset="0"/>
+                <a:ea typeface="Open Sans" panose="020B0606030504020204" pitchFamily="34" charset="0"/>
+                <a:cs typeface="Open Sans" panose="020B0606030504020204" pitchFamily="34" charset="0"/>
+              </a:rPr>
+              <a:t>array</a:t>
+            </a:r>
+            <a:r>
+              <a:rPr lang="fr-FR" sz="3000" dirty="0">
+                <a:latin typeface="Open Sans" panose="020B0606030504020204" pitchFamily="34" charset="0"/>
+                <a:ea typeface="Open Sans" panose="020B0606030504020204" pitchFamily="34" charset="0"/>
+                <a:cs typeface="Open Sans" panose="020B0606030504020204" pitchFamily="34" charset="0"/>
+              </a:rPr>
+              <a:t>[1][i] dans </a:t>
+            </a:r>
+            <a:r>
+              <a:rPr lang="fr-FR" sz="3000" dirty="0" err="1">
+                <a:latin typeface="Open Sans" panose="020B0606030504020204" pitchFamily="34" charset="0"/>
+                <a:ea typeface="Open Sans" panose="020B0606030504020204" pitchFamily="34" charset="0"/>
+                <a:cs typeface="Open Sans" panose="020B0606030504020204" pitchFamily="34" charset="0"/>
+              </a:rPr>
+              <a:t>listeDatePlusTard</a:t>
+            </a:r>
+            <a:r>
+              <a:rPr lang="fr-FR" sz="3000" dirty="0">
+                <a:latin typeface="Open Sans" panose="020B0606030504020204" pitchFamily="34" charset="0"/>
+                <a:ea typeface="Open Sans" panose="020B0606030504020204" pitchFamily="34" charset="0"/>
+                <a:cs typeface="Open Sans" panose="020B0606030504020204" pitchFamily="34" charset="0"/>
+              </a:rPr>
+              <a:t>)</a:t>
+            </a:r>
+          </a:p>
+          <a:p>
+            <a:r>
+              <a:rPr lang="fr-FR" sz="3000" dirty="0">
+                <a:latin typeface="Open Sans" panose="020B0606030504020204" pitchFamily="34" charset="0"/>
+                <a:ea typeface="Open Sans" panose="020B0606030504020204" pitchFamily="34" charset="0"/>
+                <a:cs typeface="Open Sans" panose="020B0606030504020204" pitchFamily="34" charset="0"/>
+              </a:rPr>
+              <a:t>    supprimer </a:t>
+            </a:r>
+            <a:r>
+              <a:rPr lang="fr-FR" sz="3000" dirty="0" err="1">
+                <a:latin typeface="Open Sans" panose="020B0606030504020204" pitchFamily="34" charset="0"/>
+                <a:ea typeface="Open Sans" panose="020B0606030504020204" pitchFamily="34" charset="0"/>
+                <a:cs typeface="Open Sans" panose="020B0606030504020204" pitchFamily="34" charset="0"/>
+              </a:rPr>
+              <a:t>elements</a:t>
+            </a:r>
+            <a:r>
+              <a:rPr lang="fr-FR" sz="3000" dirty="0">
+                <a:latin typeface="Open Sans" panose="020B0606030504020204" pitchFamily="34" charset="0"/>
+                <a:ea typeface="Open Sans" panose="020B0606030504020204" pitchFamily="34" charset="0"/>
+                <a:cs typeface="Open Sans" panose="020B0606030504020204" pitchFamily="34" charset="0"/>
+              </a:rPr>
+              <a:t> de </a:t>
+            </a:r>
+            <a:r>
+              <a:rPr lang="fr-FR" sz="3000" dirty="0" err="1">
+                <a:latin typeface="Open Sans" panose="020B0606030504020204" pitchFamily="34" charset="0"/>
+                <a:ea typeface="Open Sans" panose="020B0606030504020204" pitchFamily="34" charset="0"/>
+                <a:cs typeface="Open Sans" panose="020B0606030504020204" pitchFamily="34" charset="0"/>
+              </a:rPr>
+              <a:t>listeDatePlusTard</a:t>
+            </a:r>
+            <a:endParaRPr lang="fr-FR" sz="3000" dirty="0">
+              <a:latin typeface="Open Sans" panose="020B0606030504020204" pitchFamily="34" charset="0"/>
+              <a:ea typeface="Open Sans" panose="020B0606030504020204" pitchFamily="34" charset="0"/>
+              <a:cs typeface="Open Sans" panose="020B0606030504020204" pitchFamily="34" charset="0"/>
+            </a:endParaRPr>
+          </a:p>
+          <a:p>
+            <a:r>
+              <a:rPr lang="fr-FR" sz="3000" dirty="0">
+                <a:latin typeface="Open Sans" panose="020B0606030504020204" pitchFamily="34" charset="0"/>
+                <a:ea typeface="Open Sans" panose="020B0606030504020204" pitchFamily="34" charset="0"/>
+                <a:cs typeface="Open Sans" panose="020B0606030504020204" pitchFamily="34" charset="0"/>
+              </a:rPr>
+              <a:t>    supprimer </a:t>
+            </a:r>
+            <a:r>
+              <a:rPr lang="fr-FR" sz="3000" dirty="0" err="1">
+                <a:latin typeface="Open Sans" panose="020B0606030504020204" pitchFamily="34" charset="0"/>
+                <a:ea typeface="Open Sans" panose="020B0606030504020204" pitchFamily="34" charset="0"/>
+                <a:cs typeface="Open Sans" panose="020B0606030504020204" pitchFamily="34" charset="0"/>
+              </a:rPr>
+              <a:t>elements</a:t>
+            </a:r>
+            <a:r>
+              <a:rPr lang="fr-FR" sz="3000" dirty="0">
+                <a:latin typeface="Open Sans" panose="020B0606030504020204" pitchFamily="34" charset="0"/>
+                <a:ea typeface="Open Sans" panose="020B0606030504020204" pitchFamily="34" charset="0"/>
+                <a:cs typeface="Open Sans" panose="020B0606030504020204" pitchFamily="34" charset="0"/>
+              </a:rPr>
+              <a:t> de </a:t>
+            </a:r>
+            <a:r>
+              <a:rPr lang="fr-FR" sz="3000" dirty="0" err="1">
+                <a:latin typeface="Open Sans" panose="020B0606030504020204" pitchFamily="34" charset="0"/>
+                <a:ea typeface="Open Sans" panose="020B0606030504020204" pitchFamily="34" charset="0"/>
+                <a:cs typeface="Open Sans" panose="020B0606030504020204" pitchFamily="34" charset="0"/>
+              </a:rPr>
+              <a:t>listeSucc</a:t>
+            </a:r>
+            <a:endParaRPr lang="fr-FR" sz="3000" dirty="0">
+              <a:latin typeface="Open Sans" panose="020B0606030504020204" pitchFamily="34" charset="0"/>
+              <a:ea typeface="Open Sans" panose="020B0606030504020204" pitchFamily="34" charset="0"/>
+              <a:cs typeface="Open Sans" panose="020B0606030504020204" pitchFamily="34" charset="0"/>
+            </a:endParaRPr>
+          </a:p>
+          <a:p>
+            <a:r>
+              <a:rPr lang="fr-FR" sz="3000" dirty="0">
+                <a:latin typeface="Open Sans" panose="020B0606030504020204" pitchFamily="34" charset="0"/>
+                <a:ea typeface="Open Sans" panose="020B0606030504020204" pitchFamily="34" charset="0"/>
+                <a:cs typeface="Open Sans" panose="020B0606030504020204" pitchFamily="34" charset="0"/>
+              </a:rPr>
+              <a:t>fin</a:t>
+            </a:r>
+          </a:p>
+        </p:txBody>
+      </p:sp>
+      <p:sp>
+        <p:nvSpPr>
+          <p:cNvPr id="13" name="ZoneTexte 12">
+            <a:extLst>
+              <a:ext uri="{FF2B5EF4-FFF2-40B4-BE49-F238E27FC236}">
+                <a16:creationId xmlns:a16="http://schemas.microsoft.com/office/drawing/2014/main" id="{8E4FBDAF-2EF7-4071-B76E-A7D89DA6484D}"/>
+              </a:ext>
+            </a:extLst>
+          </p:cNvPr>
+          <p:cNvSpPr txBox="1"/>
+          <p:nvPr/>
+        </p:nvSpPr>
+        <p:spPr>
+          <a:xfrm>
+            <a:off x="2375271" y="1113184"/>
+            <a:ext cx="17880677" cy="1046440"/>
+          </a:xfrm>
+          <a:prstGeom prst="rect">
+            <a:avLst/>
+          </a:prstGeom>
+          <a:noFill/>
+        </p:spPr>
+        <p:txBody>
+          <a:bodyPr wrap="square" rtlCol="0">
+            <a:spAutoFit/>
+          </a:bodyPr>
+          <a:lstStyle/>
+          <a:p>
+            <a:r>
+              <a:rPr lang="fr-FR" sz="6200" b="1" dirty="0">
+                <a:latin typeface="Montserrat" panose="00000500000000000000" pitchFamily="2" charset="0"/>
+              </a:rPr>
+              <a:t>V : Méthode de l’ordonnancement</a:t>
+            </a:r>
+          </a:p>
+        </p:txBody>
+      </p:sp>
+    </p:spTree>
+    <p:extLst>
+      <p:ext uri="{BB962C8B-B14F-4D97-AF65-F5344CB8AC3E}">
+        <p14:creationId xmlns:p14="http://schemas.microsoft.com/office/powerpoint/2010/main" val="3157817152"/>
       </p:ext>
     </p:extLst>
   </p:cSld>
@@ -5659,6 +7125,1860 @@
     <p:extLst>
       <p:ext uri="{BB962C8B-B14F-4D97-AF65-F5344CB8AC3E}">
         <p14:creationId xmlns:p14="http://schemas.microsoft.com/office/powerpoint/2010/main" val="3219929643"/>
+      </p:ext>
+    </p:extLst>
+  </p:cSld>
+  <p:clrMapOvr>
+    <a:masterClrMapping/>
+  </p:clrMapOvr>
+</p:sld>
+</file>
+
+<file path=ppt/slides/slide20.xml><?xml version="1.0" encoding="utf-8"?>
+<p:sld xmlns:a="http://schemas.openxmlformats.org/drawingml/2006/main" xmlns:r="http://schemas.openxmlformats.org/officeDocument/2006/relationships" xmlns:p="http://schemas.openxmlformats.org/presentationml/2006/main">
+  <p:cSld>
+    <p:spTree>
+      <p:nvGrpSpPr>
+        <p:cNvPr id="1" name=""/>
+        <p:cNvGrpSpPr/>
+        <p:nvPr/>
+      </p:nvGrpSpPr>
+      <p:grpSpPr>
+        <a:xfrm>
+          <a:off x="0" y="0"/>
+          <a:ext cx="0" cy="0"/>
+          <a:chOff x="0" y="0"/>
+          <a:chExt cx="0" cy="0"/>
+        </a:xfrm>
+      </p:grpSpPr>
+      <p:sp>
+        <p:nvSpPr>
+          <p:cNvPr id="2" name="ZoneTexte 1">
+            <a:extLst>
+              <a:ext uri="{FF2B5EF4-FFF2-40B4-BE49-F238E27FC236}">
+                <a16:creationId xmlns:a16="http://schemas.microsoft.com/office/drawing/2014/main" id="{ADF6F31D-D7A2-4393-933B-EA8608FE10F6}"/>
+              </a:ext>
+            </a:extLst>
+          </p:cNvPr>
+          <p:cNvSpPr txBox="1"/>
+          <p:nvPr/>
+        </p:nvSpPr>
+        <p:spPr>
+          <a:xfrm>
+            <a:off x="2375271" y="1113184"/>
+            <a:ext cx="17880677" cy="1046440"/>
+          </a:xfrm>
+          <a:prstGeom prst="rect">
+            <a:avLst/>
+          </a:prstGeom>
+          <a:noFill/>
+        </p:spPr>
+        <p:txBody>
+          <a:bodyPr wrap="square" rtlCol="0">
+            <a:spAutoFit/>
+          </a:bodyPr>
+          <a:lstStyle/>
+          <a:p>
+            <a:r>
+              <a:rPr lang="fr-FR" sz="6200" b="1" dirty="0">
+                <a:latin typeface="Montserrat" panose="00000500000000000000" pitchFamily="2" charset="0"/>
+              </a:rPr>
+              <a:t>V : Méthode de l’ordonnancement</a:t>
+            </a:r>
+          </a:p>
+        </p:txBody>
+      </p:sp>
+      <mc:AlternateContent xmlns:mc="http://schemas.openxmlformats.org/markup-compatibility/2006">
+        <mc:Choice xmlns:a14="http://schemas.microsoft.com/office/drawing/2010/main" Requires="a14">
+          <p:graphicFrame>
+            <p:nvGraphicFramePr>
+              <p:cNvPr id="4" name="Tableau 4">
+                <a:extLst>
+                  <a:ext uri="{FF2B5EF4-FFF2-40B4-BE49-F238E27FC236}">
+                    <a16:creationId xmlns:a16="http://schemas.microsoft.com/office/drawing/2014/main" id="{055DFC33-19BB-45F5-AE28-406FFBF8D91B}"/>
+                  </a:ext>
+                </a:extLst>
+              </p:cNvPr>
+              <p:cNvGraphicFramePr>
+                <a:graphicFrameLocks noGrp="1"/>
+              </p:cNvGraphicFramePr>
+              <p:nvPr>
+                <p:extLst>
+                  <p:ext uri="{D42A27DB-BD31-4B8C-83A1-F6EECF244321}">
+                    <p14:modId xmlns:p14="http://schemas.microsoft.com/office/powerpoint/2010/main" val="3899981507"/>
+                  </p:ext>
+                </p:extLst>
+              </p:nvPr>
+            </p:nvGraphicFramePr>
+            <p:xfrm>
+              <a:off x="1172368" y="3675988"/>
+              <a:ext cx="22042438" cy="7058406"/>
+            </p:xfrm>
+            <a:graphic>
+              <a:graphicData uri="http://schemas.openxmlformats.org/drawingml/2006/table">
+                <a:tbl>
+                  <a:tblPr>
+                    <a:tableStyleId>{5C22544A-7EE6-4342-B048-85BDC9FD1C3A}</a:tableStyleId>
+                  </a:tblPr>
+                  <a:tblGrid>
+                    <a:gridCol w="11021219">
+                      <a:extLst>
+                        <a:ext uri="{9D8B030D-6E8A-4147-A177-3AD203B41FA5}">
+                          <a16:colId xmlns:a16="http://schemas.microsoft.com/office/drawing/2014/main" val="1323346958"/>
+                        </a:ext>
+                      </a:extLst>
+                    </a:gridCol>
+                    <a:gridCol w="11021219">
+                      <a:extLst>
+                        <a:ext uri="{9D8B030D-6E8A-4147-A177-3AD203B41FA5}">
+                          <a16:colId xmlns:a16="http://schemas.microsoft.com/office/drawing/2014/main" val="334484170"/>
+                        </a:ext>
+                      </a:extLst>
+                    </a:gridCol>
+                  </a:tblGrid>
+                  <a:tr h="370840">
+                    <a:tc>
+                      <a:txBody>
+                        <a:bodyPr/>
+                        <a:lstStyle/>
+                        <a:p>
+                          <a:pPr algn="ctr"/>
+                          <a:r>
+                            <a:rPr lang="fr-FR" dirty="0">
+                              <a:latin typeface="Open Sans" panose="020B0606030504020204" pitchFamily="34" charset="0"/>
+                              <a:ea typeface="Open Sans" panose="020B0606030504020204" pitchFamily="34" charset="0"/>
+                              <a:cs typeface="Open Sans" panose="020B0606030504020204" pitchFamily="34" charset="0"/>
+                            </a:rPr>
+                            <a:t>Marge totale</a:t>
+                          </a:r>
+                        </a:p>
+                      </a:txBody>
+                      <a:tcPr>
+                        <a:lnL w="12700" cap="flat" cmpd="sng" algn="ctr">
+                          <a:noFill/>
+                          <a:prstDash val="solid"/>
+                          <a:round/>
+                          <a:headEnd type="none" w="med" len="med"/>
+                          <a:tailEnd type="none" w="med" len="med"/>
+                        </a:lnL>
+                        <a:lnR w="12700" cap="flat" cmpd="sng" algn="ctr">
+                          <a:solidFill>
+                            <a:schemeClr val="tx1"/>
+                          </a:solidFill>
+                          <a:prstDash val="solid"/>
+                          <a:round/>
+                          <a:headEnd type="none" w="med" len="med"/>
+                          <a:tailEnd type="none" w="med" len="med"/>
+                        </a:lnR>
+                        <a:lnT w="12700" cap="flat" cmpd="sng" algn="ctr">
+                          <a:noFill/>
+                          <a:prstDash val="solid"/>
+                          <a:round/>
+                          <a:headEnd type="none" w="med" len="med"/>
+                          <a:tailEnd type="none" w="med" len="med"/>
+                        </a:lnT>
+                        <a:lnB w="12700" cap="flat" cmpd="sng" algn="ctr">
+                          <a:noFill/>
+                          <a:prstDash val="solid"/>
+                          <a:round/>
+                          <a:headEnd type="none" w="med" len="med"/>
+                          <a:tailEnd type="none" w="med" len="med"/>
+                        </a:lnB>
+                        <a:lnTlToBr w="12700" cmpd="sng">
+                          <a:noFill/>
+                          <a:prstDash val="solid"/>
+                        </a:lnTlToBr>
+                        <a:lnBlToTr w="12700" cmpd="sng">
+                          <a:noFill/>
+                          <a:prstDash val="solid"/>
+                        </a:lnBlToTr>
+                        <a:solidFill>
+                          <a:schemeClr val="bg1"/>
+                        </a:solidFill>
+                      </a:tcPr>
+                    </a:tc>
+                    <a:tc>
+                      <a:txBody>
+                        <a:bodyPr/>
+                        <a:lstStyle/>
+                        <a:p>
+                          <a:pPr algn="ctr"/>
+                          <a:r>
+                            <a:rPr lang="fr-FR" dirty="0">
+                              <a:latin typeface="Open Sans" panose="020B0606030504020204" pitchFamily="34" charset="0"/>
+                              <a:ea typeface="Open Sans" panose="020B0606030504020204" pitchFamily="34" charset="0"/>
+                              <a:cs typeface="Open Sans" panose="020B0606030504020204" pitchFamily="34" charset="0"/>
+                            </a:rPr>
+                            <a:t>Marge libre</a:t>
+                          </a:r>
+                        </a:p>
+                      </a:txBody>
+                      <a:tcPr>
+                        <a:lnL w="12700" cap="flat" cmpd="sng" algn="ctr">
+                          <a:solidFill>
+                            <a:schemeClr val="tx1"/>
+                          </a:solidFill>
+                          <a:prstDash val="solid"/>
+                          <a:round/>
+                          <a:headEnd type="none" w="med" len="med"/>
+                          <a:tailEnd type="none" w="med" len="med"/>
+                        </a:lnL>
+                        <a:lnR w="12700" cap="flat" cmpd="sng" algn="ctr">
+                          <a:noFill/>
+                          <a:prstDash val="solid"/>
+                          <a:round/>
+                          <a:headEnd type="none" w="med" len="med"/>
+                          <a:tailEnd type="none" w="med" len="med"/>
+                        </a:lnR>
+                        <a:lnT w="12700" cap="flat" cmpd="sng" algn="ctr">
+                          <a:noFill/>
+                          <a:prstDash val="solid"/>
+                          <a:round/>
+                          <a:headEnd type="none" w="med" len="med"/>
+                          <a:tailEnd type="none" w="med" len="med"/>
+                        </a:lnT>
+                        <a:lnB w="12700" cap="flat" cmpd="sng" algn="ctr">
+                          <a:noFill/>
+                          <a:prstDash val="solid"/>
+                          <a:round/>
+                          <a:headEnd type="none" w="med" len="med"/>
+                          <a:tailEnd type="none" w="med" len="med"/>
+                        </a:lnB>
+                        <a:lnTlToBr w="12700" cmpd="sng">
+                          <a:noFill/>
+                          <a:prstDash val="solid"/>
+                        </a:lnTlToBr>
+                        <a:lnBlToTr w="12700" cmpd="sng">
+                          <a:noFill/>
+                          <a:prstDash val="solid"/>
+                        </a:lnBlToTr>
+                        <a:solidFill>
+                          <a:schemeClr val="bg1"/>
+                        </a:solidFill>
+                      </a:tcPr>
+                    </a:tc>
+                    <a:extLst>
+                      <a:ext uri="{0D108BD9-81ED-4DB2-BD59-A6C34878D82A}">
+                        <a16:rowId xmlns:a16="http://schemas.microsoft.com/office/drawing/2014/main" val="265165884"/>
+                      </a:ext>
+                    </a:extLst>
+                  </a:tr>
+                  <a:tr h="370840">
+                    <a:tc>
+                      <a:txBody>
+                        <a:bodyPr/>
+                        <a:lstStyle/>
+                        <a:p>
+                          <a:endParaRPr lang="fr-FR" dirty="0">
+                            <a:latin typeface="Open Sans" panose="020B0606030504020204" pitchFamily="34" charset="0"/>
+                            <a:ea typeface="Open Sans" panose="020B0606030504020204" pitchFamily="34" charset="0"/>
+                            <a:cs typeface="Open Sans" panose="020B0606030504020204" pitchFamily="34" charset="0"/>
+                          </a:endParaRPr>
+                        </a:p>
+                        <a:p>
+                          <a:pPr marL="0" marR="0" lvl="0" indent="0" algn="l" defTabSz="1828800" rtl="0" eaLnBrk="1" fontAlgn="auto" latinLnBrk="0" hangingPunct="1">
+                            <a:lnSpc>
+                              <a:spcPct val="100000"/>
+                            </a:lnSpc>
+                            <a:spcBef>
+                              <a:spcPts val="0"/>
+                            </a:spcBef>
+                            <a:spcAft>
+                              <a:spcPts val="0"/>
+                            </a:spcAft>
+                            <a:buClrTx/>
+                            <a:buSzTx/>
+                            <a:buFontTx/>
+                            <a:buNone/>
+                            <a:tabLst/>
+                            <a:defRPr/>
+                          </a:pPr>
+                          <a:r>
+                            <a:rPr lang="fr-FR" sz="3600" dirty="0">
+                              <a:latin typeface="Open Sans" panose="020B0606030504020204" pitchFamily="34" charset="0"/>
+                              <a:ea typeface="Open Sans" panose="020B0606030504020204" pitchFamily="34" charset="0"/>
+                              <a:cs typeface="Open Sans" panose="020B0606030504020204" pitchFamily="34" charset="0"/>
+                              <a:sym typeface="Symbol" pitchFamily="18" charset="2"/>
+                            </a:rPr>
+                            <a:t>Pour chaque sommet i :</a:t>
+                          </a:r>
+                        </a:p>
+                        <a:p>
+                          <a:pPr marL="0" marR="0" lvl="0" indent="0" algn="l" defTabSz="1828800" rtl="0" eaLnBrk="1" fontAlgn="auto" latinLnBrk="0" hangingPunct="1">
+                            <a:lnSpc>
+                              <a:spcPct val="100000"/>
+                            </a:lnSpc>
+                            <a:spcBef>
+                              <a:spcPts val="0"/>
+                            </a:spcBef>
+                            <a:spcAft>
+                              <a:spcPts val="0"/>
+                            </a:spcAft>
+                            <a:buClrTx/>
+                            <a:buSzTx/>
+                            <a:buFontTx/>
+                            <a:buNone/>
+                            <a:tabLst/>
+                            <a:defRPr/>
+                          </a:pPr>
+                          <a:endParaRPr lang="fr-FR" sz="3600" dirty="0">
+                            <a:latin typeface="Open Sans" panose="020B0606030504020204" pitchFamily="34" charset="0"/>
+                            <a:ea typeface="Open Sans" panose="020B0606030504020204" pitchFamily="34" charset="0"/>
+                            <a:cs typeface="Open Sans" panose="020B0606030504020204" pitchFamily="34" charset="0"/>
+                            <a:sym typeface="Symbol" pitchFamily="18" charset="2"/>
+                          </a:endParaRPr>
+                        </a:p>
+                        <a:p>
+                          <a:pPr marL="914400" marR="0" lvl="1" indent="0" algn="l" defTabSz="1828800" rtl="0" eaLnBrk="1" fontAlgn="auto" latinLnBrk="0" hangingPunct="1">
+                            <a:lnSpc>
+                              <a:spcPct val="100000"/>
+                            </a:lnSpc>
+                            <a:spcBef>
+                              <a:spcPts val="0"/>
+                            </a:spcBef>
+                            <a:spcAft>
+                              <a:spcPts val="0"/>
+                            </a:spcAft>
+                            <a:buClrTx/>
+                            <a:buSzTx/>
+                            <a:buFontTx/>
+                            <a:buNone/>
+                            <a:tabLst/>
+                            <a:defRPr/>
+                          </a:pPr>
+                          <a:r>
+                            <a:rPr lang="fr-FR" sz="3600" dirty="0" err="1">
+                              <a:latin typeface="Open Sans" panose="020B0606030504020204" pitchFamily="34" charset="0"/>
+                              <a:ea typeface="Open Sans" panose="020B0606030504020204" pitchFamily="34" charset="0"/>
+                              <a:cs typeface="Open Sans" panose="020B0606030504020204" pitchFamily="34" charset="0"/>
+                              <a:sym typeface="Symbol" pitchFamily="18" charset="2"/>
+                            </a:rPr>
+                            <a:t>m</a:t>
+                          </a:r>
+                          <a:r>
+                            <a:rPr lang="fr-FR" sz="3600" baseline="-25000" dirty="0" err="1">
+                              <a:latin typeface="Open Sans" panose="020B0606030504020204" pitchFamily="34" charset="0"/>
+                              <a:ea typeface="Open Sans" panose="020B0606030504020204" pitchFamily="34" charset="0"/>
+                              <a:cs typeface="Open Sans" panose="020B0606030504020204" pitchFamily="34" charset="0"/>
+                              <a:sym typeface="Symbol" pitchFamily="18" charset="2"/>
+                            </a:rPr>
+                            <a:t>T</a:t>
+                          </a:r>
+                          <a:r>
+                            <a:rPr lang="fr-FR" sz="3600" baseline="-25000" dirty="0">
+                              <a:latin typeface="Open Sans" panose="020B0606030504020204" pitchFamily="34" charset="0"/>
+                              <a:ea typeface="Open Sans" panose="020B0606030504020204" pitchFamily="34" charset="0"/>
+                              <a:cs typeface="Open Sans" panose="020B0606030504020204" pitchFamily="34" charset="0"/>
+                              <a:sym typeface="Symbol" pitchFamily="18" charset="2"/>
+                            </a:rPr>
+                            <a:t> i </a:t>
+                          </a:r>
+                          <a:r>
+                            <a:rPr lang="fr-FR" sz="3600" dirty="0">
+                              <a:latin typeface="Open Sans" panose="020B0606030504020204" pitchFamily="34" charset="0"/>
+                              <a:ea typeface="Open Sans" panose="020B0606030504020204" pitchFamily="34" charset="0"/>
+                              <a:cs typeface="Open Sans" panose="020B0606030504020204" pitchFamily="34" charset="0"/>
+                              <a:sym typeface="Symbol" pitchFamily="18" charset="2"/>
+                            </a:rPr>
+                            <a:t>= T</a:t>
+                          </a:r>
+                          <a:r>
+                            <a:rPr lang="fr-FR" sz="3600" baseline="-25000" dirty="0">
+                              <a:latin typeface="Open Sans" panose="020B0606030504020204" pitchFamily="34" charset="0"/>
+                              <a:ea typeface="Open Sans" panose="020B0606030504020204" pitchFamily="34" charset="0"/>
+                              <a:cs typeface="Open Sans" panose="020B0606030504020204" pitchFamily="34" charset="0"/>
+                              <a:sym typeface="Symbol" pitchFamily="18" charset="2"/>
+                            </a:rPr>
+                            <a:t>i </a:t>
+                          </a:r>
+                          <a:r>
+                            <a:rPr lang="fr-FR" sz="3600" dirty="0">
+                              <a:latin typeface="Open Sans" panose="020B0606030504020204" pitchFamily="34" charset="0"/>
+                              <a:ea typeface="Open Sans" panose="020B0606030504020204" pitchFamily="34" charset="0"/>
+                              <a:cs typeface="Open Sans" panose="020B0606030504020204" pitchFamily="34" charset="0"/>
+                              <a:sym typeface="Symbol" pitchFamily="18" charset="2"/>
+                            </a:rPr>
+                            <a:t>- </a:t>
+                          </a:r>
+                          <a:r>
+                            <a:rPr lang="fr-FR" sz="3600" baseline="-25000" dirty="0">
+                              <a:latin typeface="Open Sans" panose="020B0606030504020204" pitchFamily="34" charset="0"/>
+                              <a:ea typeface="Open Sans" panose="020B0606030504020204" pitchFamily="34" charset="0"/>
+                              <a:cs typeface="Open Sans" panose="020B0606030504020204" pitchFamily="34" charset="0"/>
+                            </a:rPr>
+                            <a:t>i</a:t>
+                          </a:r>
+                        </a:p>
+                        <a:p>
+                          <a:pPr marL="914400" marR="0" lvl="1" indent="0" algn="l" defTabSz="1828800" rtl="0" eaLnBrk="1" fontAlgn="auto" latinLnBrk="0" hangingPunct="1">
+                            <a:lnSpc>
+                              <a:spcPct val="100000"/>
+                            </a:lnSpc>
+                            <a:spcBef>
+                              <a:spcPts val="0"/>
+                            </a:spcBef>
+                            <a:spcAft>
+                              <a:spcPts val="0"/>
+                            </a:spcAft>
+                            <a:buClrTx/>
+                            <a:buSzTx/>
+                            <a:buFontTx/>
+                            <a:buNone/>
+                            <a:tabLst/>
+                            <a:defRPr/>
+                          </a:pPr>
+                          <a:endParaRPr lang="fr-FR" sz="3600" baseline="-25000" dirty="0">
+                            <a:latin typeface="Open Sans" panose="020B0606030504020204" pitchFamily="34" charset="0"/>
+                            <a:ea typeface="Open Sans" panose="020B0606030504020204" pitchFamily="34" charset="0"/>
+                            <a:cs typeface="Open Sans" panose="020B0606030504020204" pitchFamily="34" charset="0"/>
+                          </a:endParaRPr>
+                        </a:p>
+                        <a:p>
+                          <a:pPr marL="914400" marR="0" lvl="1" indent="0" algn="l" defTabSz="1828800" rtl="0" eaLnBrk="1" fontAlgn="auto" latinLnBrk="0" hangingPunct="1">
+                            <a:lnSpc>
+                              <a:spcPct val="100000"/>
+                            </a:lnSpc>
+                            <a:spcBef>
+                              <a:spcPts val="0"/>
+                            </a:spcBef>
+                            <a:spcAft>
+                              <a:spcPts val="0"/>
+                            </a:spcAft>
+                            <a:buClrTx/>
+                            <a:buSzTx/>
+                            <a:buFontTx/>
+                            <a:buNone/>
+                            <a:tabLst/>
+                            <a:defRPr/>
+                          </a:pPr>
+                          <a:r>
+                            <a:rPr lang="fr-FR" sz="3600" dirty="0">
+                              <a:latin typeface="Open Sans" panose="020B0606030504020204" pitchFamily="34" charset="0"/>
+                              <a:ea typeface="Open Sans" panose="020B0606030504020204" pitchFamily="34" charset="0"/>
+                              <a:cs typeface="Open Sans" panose="020B0606030504020204" pitchFamily="34" charset="0"/>
+                              <a:sym typeface="Symbol" pitchFamily="18" charset="2"/>
+                            </a:rPr>
+                            <a:t>avec</a:t>
+                          </a:r>
+                        </a:p>
+                        <a:p>
+                          <a:pPr marL="1828800" marR="0" lvl="2" indent="0" algn="l" defTabSz="1828800" rtl="0" eaLnBrk="1" fontAlgn="auto" latinLnBrk="0" hangingPunct="1">
+                            <a:lnSpc>
+                              <a:spcPct val="100000"/>
+                            </a:lnSpc>
+                            <a:spcBef>
+                              <a:spcPts val="0"/>
+                            </a:spcBef>
+                            <a:spcAft>
+                              <a:spcPts val="0"/>
+                            </a:spcAft>
+                            <a:buClrTx/>
+                            <a:buSzTx/>
+                            <a:buFontTx/>
+                            <a:buNone/>
+                            <a:tabLst/>
+                            <a:defRPr/>
+                          </a:pPr>
+                          <a:r>
+                            <a:rPr lang="fr-FR" sz="3600" dirty="0">
+                              <a:latin typeface="Open Sans" panose="020B0606030504020204" pitchFamily="34" charset="0"/>
+                              <a:ea typeface="Open Sans" panose="020B0606030504020204" pitchFamily="34" charset="0"/>
+                              <a:cs typeface="Open Sans" panose="020B0606030504020204" pitchFamily="34" charset="0"/>
+                              <a:sym typeface="Symbol" pitchFamily="18" charset="2"/>
+                            </a:rPr>
+                            <a:t>T</a:t>
+                          </a:r>
+                          <a:r>
+                            <a:rPr lang="fr-FR" sz="3600" baseline="-25000" dirty="0">
+                              <a:latin typeface="Open Sans" panose="020B0606030504020204" pitchFamily="34" charset="0"/>
+                              <a:ea typeface="Open Sans" panose="020B0606030504020204" pitchFamily="34" charset="0"/>
+                              <a:cs typeface="Open Sans" panose="020B0606030504020204" pitchFamily="34" charset="0"/>
+                              <a:sym typeface="Symbol" pitchFamily="18" charset="2"/>
+                            </a:rPr>
+                            <a:t>i</a:t>
+                          </a:r>
+                          <a:r>
+                            <a:rPr lang="fr-FR" sz="3600" baseline="0" dirty="0">
+                              <a:latin typeface="Open Sans" panose="020B0606030504020204" pitchFamily="34" charset="0"/>
+                              <a:ea typeface="Open Sans" panose="020B0606030504020204" pitchFamily="34" charset="0"/>
+                              <a:cs typeface="Open Sans" panose="020B0606030504020204" pitchFamily="34" charset="0"/>
+                              <a:sym typeface="Symbol" pitchFamily="18" charset="2"/>
+                            </a:rPr>
+                            <a:t> = date au plus tard</a:t>
+                          </a:r>
+                        </a:p>
+                        <a:p>
+                          <a:pPr marL="1828800" marR="0" lvl="2" indent="0" algn="l" defTabSz="1828800" rtl="0" eaLnBrk="1" fontAlgn="auto" latinLnBrk="0" hangingPunct="1">
+                            <a:lnSpc>
+                              <a:spcPct val="100000"/>
+                            </a:lnSpc>
+                            <a:spcBef>
+                              <a:spcPts val="0"/>
+                            </a:spcBef>
+                            <a:spcAft>
+                              <a:spcPts val="0"/>
+                            </a:spcAft>
+                            <a:buClrTx/>
+                            <a:buSzTx/>
+                            <a:buFontTx/>
+                            <a:buNone/>
+                            <a:tabLst/>
+                            <a:defRPr/>
+                          </a:pPr>
+                          <a:r>
+                            <a:rPr lang="fr-FR" sz="3600" dirty="0">
+                              <a:latin typeface="Open Sans" panose="020B0606030504020204" pitchFamily="34" charset="0"/>
+                              <a:ea typeface="Open Sans" panose="020B0606030504020204" pitchFamily="34" charset="0"/>
+                              <a:cs typeface="Open Sans" panose="020B0606030504020204" pitchFamily="34" charset="0"/>
+                              <a:sym typeface="Symbol" pitchFamily="18" charset="2"/>
+                            </a:rPr>
+                            <a:t></a:t>
+                          </a:r>
+                          <a:r>
+                            <a:rPr lang="fr-FR" sz="3600" baseline="-25000" dirty="0">
+                              <a:latin typeface="Open Sans" panose="020B0606030504020204" pitchFamily="34" charset="0"/>
+                              <a:ea typeface="Open Sans" panose="020B0606030504020204" pitchFamily="34" charset="0"/>
+                              <a:cs typeface="Open Sans" panose="020B0606030504020204" pitchFamily="34" charset="0"/>
+                            </a:rPr>
+                            <a:t>i</a:t>
+                          </a:r>
+                          <a:r>
+                            <a:rPr lang="fr-FR" sz="3600" baseline="0" dirty="0">
+                              <a:latin typeface="Open Sans" panose="020B0606030504020204" pitchFamily="34" charset="0"/>
+                              <a:ea typeface="Open Sans" panose="020B0606030504020204" pitchFamily="34" charset="0"/>
+                              <a:cs typeface="Open Sans" panose="020B0606030504020204" pitchFamily="34" charset="0"/>
+                            </a:rPr>
+                            <a:t> = date au plus tôt</a:t>
+                          </a:r>
+                          <a:endParaRPr lang="fr-FR" sz="3600" baseline="-25000" dirty="0">
+                            <a:latin typeface="Open Sans" panose="020B0606030504020204" pitchFamily="34" charset="0"/>
+                            <a:ea typeface="Open Sans" panose="020B0606030504020204" pitchFamily="34" charset="0"/>
+                            <a:cs typeface="Open Sans" panose="020B0606030504020204" pitchFamily="34" charset="0"/>
+                          </a:endParaRPr>
+                        </a:p>
+                        <a:p>
+                          <a:pPr marL="914400" marR="0" lvl="1" indent="0" algn="l" defTabSz="1828800" rtl="0" eaLnBrk="1" fontAlgn="auto" latinLnBrk="0" hangingPunct="1">
+                            <a:lnSpc>
+                              <a:spcPct val="100000"/>
+                            </a:lnSpc>
+                            <a:spcBef>
+                              <a:spcPts val="0"/>
+                            </a:spcBef>
+                            <a:spcAft>
+                              <a:spcPts val="0"/>
+                            </a:spcAft>
+                            <a:buClrTx/>
+                            <a:buSzTx/>
+                            <a:buFontTx/>
+                            <a:buNone/>
+                            <a:tabLst/>
+                            <a:defRPr/>
+                          </a:pPr>
+                          <a:endParaRPr lang="fr-FR" sz="3600" baseline="0" dirty="0">
+                            <a:latin typeface="Open Sans" panose="020B0606030504020204" pitchFamily="34" charset="0"/>
+                            <a:ea typeface="Open Sans" panose="020B0606030504020204" pitchFamily="34" charset="0"/>
+                            <a:cs typeface="Open Sans" panose="020B0606030504020204" pitchFamily="34" charset="0"/>
+                            <a:sym typeface="Symbol" pitchFamily="18" charset="2"/>
+                          </a:endParaRPr>
+                        </a:p>
+                        <a:p>
+                          <a:pPr marL="914400" marR="0" lvl="1" indent="0" algn="l" defTabSz="1828800" rtl="0" eaLnBrk="1" fontAlgn="auto" latinLnBrk="0" hangingPunct="1">
+                            <a:lnSpc>
+                              <a:spcPct val="100000"/>
+                            </a:lnSpc>
+                            <a:spcBef>
+                              <a:spcPts val="0"/>
+                            </a:spcBef>
+                            <a:spcAft>
+                              <a:spcPts val="0"/>
+                            </a:spcAft>
+                            <a:buClrTx/>
+                            <a:buSzTx/>
+                            <a:buFontTx/>
+                            <a:buNone/>
+                            <a:tabLst/>
+                            <a:defRPr/>
+                          </a:pPr>
+                          <a:endParaRPr lang="fr-FR" sz="3600" dirty="0">
+                            <a:latin typeface="Open Sans" panose="020B0606030504020204" pitchFamily="34" charset="0"/>
+                            <a:ea typeface="Open Sans" panose="020B0606030504020204" pitchFamily="34" charset="0"/>
+                            <a:cs typeface="Open Sans" panose="020B0606030504020204" pitchFamily="34" charset="0"/>
+                          </a:endParaRPr>
+                        </a:p>
+                        <a:p>
+                          <a:endParaRPr lang="fr-FR" dirty="0">
+                            <a:latin typeface="Open Sans" panose="020B0606030504020204" pitchFamily="34" charset="0"/>
+                            <a:ea typeface="Open Sans" panose="020B0606030504020204" pitchFamily="34" charset="0"/>
+                            <a:cs typeface="Open Sans" panose="020B0606030504020204" pitchFamily="34" charset="0"/>
+                          </a:endParaRPr>
+                        </a:p>
+                      </a:txBody>
+                      <a:tcPr>
+                        <a:lnL w="12700" cap="flat" cmpd="sng" algn="ctr">
+                          <a:noFill/>
+                          <a:prstDash val="solid"/>
+                          <a:round/>
+                          <a:headEnd type="none" w="med" len="med"/>
+                          <a:tailEnd type="none" w="med" len="med"/>
+                        </a:lnL>
+                        <a:lnR w="12700" cap="flat" cmpd="sng" algn="ctr">
+                          <a:solidFill>
+                            <a:schemeClr val="tx1"/>
+                          </a:solidFill>
+                          <a:prstDash val="solid"/>
+                          <a:round/>
+                          <a:headEnd type="none" w="med" len="med"/>
+                          <a:tailEnd type="none" w="med" len="med"/>
+                        </a:lnR>
+                        <a:lnT w="12700" cap="flat" cmpd="sng" algn="ctr">
+                          <a:noFill/>
+                          <a:prstDash val="solid"/>
+                          <a:round/>
+                          <a:headEnd type="none" w="med" len="med"/>
+                          <a:tailEnd type="none" w="med" len="med"/>
+                        </a:lnT>
+                        <a:lnB w="12700" cap="flat" cmpd="sng" algn="ctr">
+                          <a:noFill/>
+                          <a:prstDash val="solid"/>
+                          <a:round/>
+                          <a:headEnd type="none" w="med" len="med"/>
+                          <a:tailEnd type="none" w="med" len="med"/>
+                        </a:lnB>
+                        <a:lnTlToBr w="12700" cmpd="sng">
+                          <a:noFill/>
+                          <a:prstDash val="solid"/>
+                        </a:lnTlToBr>
+                        <a:lnBlToTr w="12700" cmpd="sng">
+                          <a:noFill/>
+                          <a:prstDash val="solid"/>
+                        </a:lnBlToTr>
+                        <a:solidFill>
+                          <a:schemeClr val="bg1"/>
+                        </a:solidFill>
+                      </a:tcPr>
+                    </a:tc>
+                    <a:tc>
+                      <a:txBody>
+                        <a:bodyPr/>
+                        <a:lstStyle/>
+                        <a:p>
+                          <a:endParaRPr lang="fr-FR" dirty="0">
+                            <a:latin typeface="Open Sans" panose="020B0606030504020204" pitchFamily="34" charset="0"/>
+                            <a:ea typeface="Open Sans" panose="020B0606030504020204" pitchFamily="34" charset="0"/>
+                            <a:cs typeface="Open Sans" panose="020B0606030504020204" pitchFamily="34" charset="0"/>
+                          </a:endParaRPr>
+                        </a:p>
+                        <a:p>
+                          <a:r>
+                            <a:rPr lang="fr-FR" dirty="0">
+                              <a:latin typeface="Open Sans" panose="020B0606030504020204" pitchFamily="34" charset="0"/>
+                              <a:ea typeface="Open Sans" panose="020B0606030504020204" pitchFamily="34" charset="0"/>
+                              <a:cs typeface="Open Sans" panose="020B0606030504020204" pitchFamily="34" charset="0"/>
+                            </a:rPr>
+                            <a:t>Pour chaque sommet i :</a:t>
+                          </a:r>
+                        </a:p>
+                        <a:p>
+                          <a:pPr marL="0" marR="0" lvl="0" indent="0" algn="l" defTabSz="1828800" rtl="0" eaLnBrk="1" fontAlgn="auto" latinLnBrk="0" hangingPunct="1">
+                            <a:lnSpc>
+                              <a:spcPct val="100000"/>
+                            </a:lnSpc>
+                            <a:spcBef>
+                              <a:spcPts val="0"/>
+                            </a:spcBef>
+                            <a:spcAft>
+                              <a:spcPts val="0"/>
+                            </a:spcAft>
+                            <a:buClrTx/>
+                            <a:buSzTx/>
+                            <a:buFontTx/>
+                            <a:buNone/>
+                            <a:tabLst/>
+                            <a:defRPr/>
+                          </a:pPr>
+                          <a:endParaRPr lang="fr-FR" sz="3600" dirty="0">
+                            <a:latin typeface="Open Sans" panose="020B0606030504020204" pitchFamily="34" charset="0"/>
+                            <a:ea typeface="Open Sans" panose="020B0606030504020204" pitchFamily="34" charset="0"/>
+                            <a:cs typeface="Open Sans" panose="020B0606030504020204" pitchFamily="34" charset="0"/>
+                            <a:sym typeface="Symbol" pitchFamily="18" charset="2"/>
+                          </a:endParaRPr>
+                        </a:p>
+                        <a:p>
+                          <a:pPr marL="914400" marR="0" lvl="1" indent="0" algn="l" defTabSz="1828800" rtl="0" eaLnBrk="1" fontAlgn="auto" latinLnBrk="0" hangingPunct="1">
+                            <a:lnSpc>
+                              <a:spcPct val="100000"/>
+                            </a:lnSpc>
+                            <a:spcBef>
+                              <a:spcPts val="0"/>
+                            </a:spcBef>
+                            <a:spcAft>
+                              <a:spcPts val="0"/>
+                            </a:spcAft>
+                            <a:buClrTx/>
+                            <a:buSzTx/>
+                            <a:buFontTx/>
+                            <a:buNone/>
+                            <a:tabLst/>
+                            <a:defRPr/>
+                          </a:pPr>
+                          <a:r>
+                            <a:rPr lang="fr-FR" sz="3600" dirty="0" err="1">
+                              <a:latin typeface="Open Sans" panose="020B0606030504020204" pitchFamily="34" charset="0"/>
+                              <a:ea typeface="Open Sans" panose="020B0606030504020204" pitchFamily="34" charset="0"/>
+                              <a:cs typeface="Open Sans" panose="020B0606030504020204" pitchFamily="34" charset="0"/>
+                              <a:sym typeface="Symbol" pitchFamily="18" charset="2"/>
+                            </a:rPr>
+                            <a:t>m</a:t>
+                          </a:r>
+                          <a:r>
+                            <a:rPr lang="fr-FR" sz="3600" baseline="-25000" dirty="0" err="1">
+                              <a:latin typeface="Open Sans" panose="020B0606030504020204" pitchFamily="34" charset="0"/>
+                              <a:ea typeface="Open Sans" panose="020B0606030504020204" pitchFamily="34" charset="0"/>
+                              <a:cs typeface="Open Sans" panose="020B0606030504020204" pitchFamily="34" charset="0"/>
+                              <a:sym typeface="Symbol" pitchFamily="18" charset="2"/>
+                            </a:rPr>
+                            <a:t>L</a:t>
+                          </a:r>
+                          <a:r>
+                            <a:rPr lang="fr-FR" sz="3600" baseline="-25000" dirty="0">
+                              <a:latin typeface="Open Sans" panose="020B0606030504020204" pitchFamily="34" charset="0"/>
+                              <a:ea typeface="Open Sans" panose="020B0606030504020204" pitchFamily="34" charset="0"/>
+                              <a:cs typeface="Open Sans" panose="020B0606030504020204" pitchFamily="34" charset="0"/>
+                              <a:sym typeface="Symbol" pitchFamily="18" charset="2"/>
+                            </a:rPr>
+                            <a:t> i </a:t>
+                          </a:r>
+                          <a:r>
+                            <a:rPr lang="fr-FR" sz="3600" dirty="0">
+                              <a:latin typeface="Open Sans" panose="020B0606030504020204" pitchFamily="34" charset="0"/>
+                              <a:ea typeface="Open Sans" panose="020B0606030504020204" pitchFamily="34" charset="0"/>
+                              <a:cs typeface="Open Sans" panose="020B0606030504020204" pitchFamily="34" charset="0"/>
+                              <a:sym typeface="Symbol" pitchFamily="18" charset="2"/>
+                            </a:rPr>
+                            <a:t>= </a:t>
+                          </a:r>
+                          <a14:m>
+                            <m:oMath xmlns:m="http://schemas.openxmlformats.org/officeDocument/2006/math">
+                              <m:func>
+                                <m:funcPr>
+                                  <m:ctrlPr>
+                                    <a:rPr lang="fr-FR" sz="3600" i="1" smtClean="0">
+                                      <a:latin typeface="Cambria Math" panose="02040503050406030204" pitchFamily="18" charset="0"/>
+                                      <a:ea typeface="Times New Roman" pitchFamily="18" charset="0"/>
+                                      <a:cs typeface="Arial" charset="0"/>
+                                      <a:sym typeface="Symbol" pitchFamily="18" charset="2"/>
+                                    </a:rPr>
+                                  </m:ctrlPr>
+                                </m:funcPr>
+                                <m:fName>
+                                  <m:limLow>
+                                    <m:limLowPr>
+                                      <m:ctrlPr>
+                                        <a:rPr lang="fr-FR" sz="3600" i="1" smtClean="0">
+                                          <a:latin typeface="Cambria Math" panose="02040503050406030204" pitchFamily="18" charset="0"/>
+                                          <a:ea typeface="Times New Roman" pitchFamily="18" charset="0"/>
+                                          <a:cs typeface="Arial" charset="0"/>
+                                          <a:sym typeface="Symbol" pitchFamily="18" charset="2"/>
+                                        </a:rPr>
+                                      </m:ctrlPr>
+                                    </m:limLowPr>
+                                    <m:e>
+                                      <m:r>
+                                        <m:rPr>
+                                          <m:sty m:val="p"/>
+                                        </m:rPr>
+                                        <a:rPr lang="fr-FR" sz="3600" i="0" smtClean="0">
+                                          <a:latin typeface="Cambria Math"/>
+                                          <a:ea typeface="Times New Roman" pitchFamily="18" charset="0"/>
+                                          <a:cs typeface="Arial" charset="0"/>
+                                          <a:sym typeface="Symbol" pitchFamily="18" charset="2"/>
+                                        </a:rPr>
+                                        <m:t>min</m:t>
+                                      </m:r>
+                                    </m:e>
+                                    <m:lim>
+                                      <m:r>
+                                        <a:rPr lang="fr-FR" sz="3600" b="0" i="1" smtClean="0">
+                                          <a:latin typeface="Cambria Math"/>
+                                          <a:ea typeface="Times New Roman" pitchFamily="18" charset="0"/>
+                                          <a:cs typeface="Arial" charset="0"/>
+                                          <a:sym typeface="Symbol" pitchFamily="18" charset="2"/>
+                                        </a:rPr>
+                                        <m:t>𝑗</m:t>
+                                      </m:r>
+                                      <m:r>
+                                        <a:rPr lang="fr-FR" sz="3600" b="0" i="1" smtClean="0">
+                                          <a:latin typeface="Cambria Math"/>
+                                          <a:ea typeface="Cambria Math"/>
+                                          <a:cs typeface="Arial" charset="0"/>
+                                          <a:sym typeface="Symbol" pitchFamily="18" charset="2"/>
+                                        </a:rPr>
+                                        <m:t>∈</m:t>
+                                      </m:r>
+                                      <m:r>
+                                        <m:rPr>
+                                          <m:nor/>
+                                        </m:rPr>
+                                        <a:rPr lang="fr-FR" sz="3600" dirty="0">
+                                          <a:latin typeface="Open Sans" panose="020B0606030504020204" pitchFamily="34" charset="0"/>
+                                          <a:ea typeface="Open Sans" panose="020B0606030504020204" pitchFamily="34" charset="0"/>
+                                          <a:cs typeface="Open Sans" panose="020B0606030504020204" pitchFamily="34" charset="0"/>
+                                          <a:sym typeface="Symbol" pitchFamily="18" charset="2"/>
+                                        </a:rPr>
+                                        <m:t></m:t>
+                                      </m:r>
+                                      <m:r>
+                                        <a:rPr lang="fr-FR" sz="3600" b="0" i="1" dirty="0" smtClean="0">
+                                          <a:latin typeface="Cambria Math"/>
+                                          <a:ea typeface="Times New Roman" pitchFamily="18" charset="0"/>
+                                          <a:cs typeface="Arial" charset="0"/>
+                                          <a:sym typeface="Symbol" pitchFamily="18" charset="2"/>
+                                        </a:rPr>
+                                        <m:t>(</m:t>
+                                      </m:r>
+                                      <m:r>
+                                        <a:rPr lang="fr-FR" sz="3600" b="0" i="1" dirty="0" smtClean="0">
+                                          <a:latin typeface="Cambria Math"/>
+                                          <a:ea typeface="Times New Roman" pitchFamily="18" charset="0"/>
+                                          <a:cs typeface="Arial" charset="0"/>
+                                          <a:sym typeface="Symbol" pitchFamily="18" charset="2"/>
+                                        </a:rPr>
+                                        <m:t>𝑖</m:t>
+                                      </m:r>
+                                      <m:r>
+                                        <a:rPr lang="fr-FR" sz="3600" b="0" i="1" dirty="0" smtClean="0">
+                                          <a:latin typeface="Cambria Math"/>
+                                          <a:ea typeface="Times New Roman" pitchFamily="18" charset="0"/>
+                                          <a:cs typeface="Arial" charset="0"/>
+                                          <a:sym typeface="Symbol" pitchFamily="18" charset="2"/>
+                                        </a:rPr>
+                                        <m:t>)</m:t>
+                                      </m:r>
+                                    </m:lim>
+                                  </m:limLow>
+                                </m:fName>
+                                <m:e>
+                                  <m:r>
+                                    <a:rPr lang="fr-FR" sz="3600" b="0" i="1" smtClean="0">
+                                      <a:latin typeface="Cambria Math"/>
+                                      <a:ea typeface="Times New Roman" pitchFamily="18" charset="0"/>
+                                      <a:cs typeface="Arial" charset="0"/>
+                                      <a:sym typeface="Symbol" pitchFamily="18" charset="2"/>
+                                    </a:rPr>
+                                    <m:t>(</m:t>
+                                  </m:r>
+                                  <m:sSub>
+                                    <m:sSubPr>
+                                      <m:ctrlPr>
+                                        <a:rPr lang="fr-FR" sz="3600" b="0" i="1" smtClean="0">
+                                          <a:latin typeface="Cambria Math" panose="02040503050406030204" pitchFamily="18" charset="0"/>
+                                          <a:cs typeface="Arial" charset="0"/>
+                                          <a:sym typeface="Symbol" pitchFamily="18" charset="2"/>
+                                        </a:rPr>
+                                      </m:ctrlPr>
+                                    </m:sSubPr>
+                                    <m:e>
+                                      <m:r>
+                                        <a:rPr lang="fr-FR" sz="3600" b="0" i="1" smtClean="0">
+                                          <a:latin typeface="Cambria Math" panose="02040503050406030204" pitchFamily="18" charset="0"/>
+                                          <a:ea typeface="Cambria Math" panose="02040503050406030204" pitchFamily="18" charset="0"/>
+                                          <a:cs typeface="Arial" charset="0"/>
+                                          <a:sym typeface="Symbol" pitchFamily="18" charset="2"/>
+                                        </a:rPr>
+                                        <m:t>𝜏</m:t>
+                                      </m:r>
+                                    </m:e>
+                                    <m:sub>
+                                      <m:r>
+                                        <a:rPr lang="fr-FR" sz="3600" b="0" i="1" smtClean="0">
+                                          <a:latin typeface="Cambria Math"/>
+                                          <a:cs typeface="Arial" charset="0"/>
+                                          <a:sym typeface="Symbol" pitchFamily="18" charset="2"/>
+                                        </a:rPr>
+                                        <m:t>𝑗</m:t>
+                                      </m:r>
+                                    </m:sub>
+                                  </m:sSub>
+                                  <m:r>
+                                    <a:rPr lang="fr-FR" sz="3600" b="0" i="1" smtClean="0">
+                                      <a:latin typeface="Cambria Math" panose="02040503050406030204" pitchFamily="18" charset="0"/>
+                                      <a:cs typeface="Arial" charset="0"/>
+                                      <a:sym typeface="Symbol" pitchFamily="18" charset="2"/>
+                                    </a:rPr>
+                                    <m:t>)</m:t>
+                                  </m:r>
+                                  <m:r>
+                                    <a:rPr lang="fr-FR" sz="3600" b="0" i="1" smtClean="0">
+                                      <a:latin typeface="Cambria Math"/>
+                                      <a:cs typeface="Arial" charset="0"/>
+                                      <a:sym typeface="Symbol" pitchFamily="18" charset="2"/>
+                                    </a:rPr>
+                                    <m:t>−</m:t>
+                                  </m:r>
+                                  <m:r>
+                                    <a:rPr lang="fr-FR" sz="3600" b="0" i="1" smtClean="0">
+                                      <a:latin typeface="Cambria Math" panose="02040503050406030204" pitchFamily="18" charset="0"/>
+                                      <a:cs typeface="Arial" charset="0"/>
+                                      <a:sym typeface="Symbol" pitchFamily="18" charset="2"/>
+                                    </a:rPr>
+                                    <m:t>(</m:t>
+                                  </m:r>
+                                  <m:sSub>
+                                    <m:sSubPr>
+                                      <m:ctrlPr>
+                                        <a:rPr lang="fr-FR" sz="3600" i="1">
+                                          <a:latin typeface="Cambria Math" panose="02040503050406030204" pitchFamily="18" charset="0"/>
+                                          <a:cs typeface="Arial" charset="0"/>
+                                          <a:sym typeface="Symbol" pitchFamily="18" charset="2"/>
+                                        </a:rPr>
+                                      </m:ctrlPr>
+                                    </m:sSubPr>
+                                    <m:e>
+                                      <m:r>
+                                        <a:rPr lang="fr-FR" sz="3600" i="1">
+                                          <a:latin typeface="Cambria Math" panose="02040503050406030204" pitchFamily="18" charset="0"/>
+                                          <a:ea typeface="Cambria Math" panose="02040503050406030204" pitchFamily="18" charset="0"/>
+                                          <a:cs typeface="Arial" charset="0"/>
+                                          <a:sym typeface="Symbol" pitchFamily="18" charset="2"/>
+                                        </a:rPr>
+                                        <m:t>𝜏</m:t>
+                                      </m:r>
+                                    </m:e>
+                                    <m:sub>
+                                      <m:r>
+                                        <a:rPr lang="fr-FR" sz="3600" b="0" i="1" smtClean="0">
+                                          <a:latin typeface="Cambria Math"/>
+                                          <a:cs typeface="Arial" charset="0"/>
+                                          <a:sym typeface="Symbol" pitchFamily="18" charset="2"/>
+                                        </a:rPr>
+                                        <m:t>𝑖</m:t>
+                                      </m:r>
+                                    </m:sub>
+                                  </m:sSub>
+                                  <m:r>
+                                    <a:rPr lang="fr-FR" sz="3600" b="0" i="1" smtClean="0">
+                                      <a:latin typeface="Cambria Math" panose="02040503050406030204" pitchFamily="18" charset="0"/>
+                                      <a:cs typeface="Arial" charset="0"/>
+                                      <a:sym typeface="Symbol" pitchFamily="18" charset="2"/>
+                                    </a:rPr>
+                                    <m:t>+</m:t>
+                                  </m:r>
+                                  <m:sSub>
+                                    <m:sSubPr>
+                                      <m:ctrlPr>
+                                        <a:rPr lang="fr-FR" sz="3600" i="1">
+                                          <a:latin typeface="Cambria Math" panose="02040503050406030204" pitchFamily="18" charset="0"/>
+                                          <a:cs typeface="Arial" charset="0"/>
+                                          <a:sym typeface="Symbol" pitchFamily="18" charset="2"/>
+                                        </a:rPr>
+                                      </m:ctrlPr>
+                                    </m:sSubPr>
+                                    <m:e>
+                                      <m:r>
+                                        <a:rPr lang="fr-FR" sz="3600" b="0" i="1" smtClean="0">
+                                          <a:latin typeface="Cambria Math"/>
+                                          <a:cs typeface="Arial" charset="0"/>
+                                          <a:sym typeface="Symbol" pitchFamily="18" charset="2"/>
+                                        </a:rPr>
+                                        <m:t>𝑑</m:t>
+                                      </m:r>
+                                    </m:e>
+                                    <m:sub>
+                                      <m:r>
+                                        <a:rPr lang="fr-FR" sz="3600" i="1">
+                                          <a:latin typeface="Cambria Math"/>
+                                          <a:cs typeface="Arial" charset="0"/>
+                                          <a:sym typeface="Symbol" pitchFamily="18" charset="2"/>
+                                        </a:rPr>
+                                        <m:t>𝑖</m:t>
+                                      </m:r>
+                                    </m:sub>
+                                  </m:sSub>
+                                </m:e>
+                              </m:func>
+                              <m:r>
+                                <a:rPr lang="fr-FR" sz="3600" b="0" i="1" smtClean="0">
+                                  <a:latin typeface="Cambria Math" panose="02040503050406030204" pitchFamily="18" charset="0"/>
+                                  <a:cs typeface="Arial" charset="0"/>
+                                  <a:sym typeface="Symbol" pitchFamily="18" charset="2"/>
+                                </a:rPr>
+                                <m:t>)</m:t>
+                              </m:r>
+                            </m:oMath>
+                          </a14:m>
+                          <a:endParaRPr lang="fr-FR" sz="3600" dirty="0">
+                            <a:latin typeface="Open Sans" panose="020B0606030504020204" pitchFamily="34" charset="0"/>
+                            <a:ea typeface="Open Sans" panose="020B0606030504020204" pitchFamily="34" charset="0"/>
+                            <a:cs typeface="Open Sans" panose="020B0606030504020204" pitchFamily="34" charset="0"/>
+                          </a:endParaRPr>
+                        </a:p>
+                        <a:p>
+                          <a:pPr marL="1828800" lvl="2" indent="0">
+                            <a:buFont typeface="+mj-lt"/>
+                            <a:buNone/>
+                          </a:pPr>
+                          <a:endParaRPr lang="fr-FR" dirty="0">
+                            <a:latin typeface="Open Sans" panose="020B0606030504020204" pitchFamily="34" charset="0"/>
+                            <a:ea typeface="Open Sans" panose="020B0606030504020204" pitchFamily="34" charset="0"/>
+                            <a:cs typeface="Open Sans" panose="020B0606030504020204" pitchFamily="34" charset="0"/>
+                          </a:endParaRPr>
+                        </a:p>
+                        <a:p>
+                          <a:pPr marL="914400" lvl="1" indent="0">
+                            <a:buFont typeface="+mj-lt"/>
+                            <a:buNone/>
+                          </a:pPr>
+                          <a:r>
+                            <a:rPr lang="fr-FR" dirty="0">
+                              <a:latin typeface="Open Sans" panose="020B0606030504020204" pitchFamily="34" charset="0"/>
+                              <a:ea typeface="Open Sans" panose="020B0606030504020204" pitchFamily="34" charset="0"/>
+                              <a:cs typeface="Open Sans" panose="020B0606030504020204" pitchFamily="34" charset="0"/>
+                            </a:rPr>
+                            <a:t>avec </a:t>
+                          </a:r>
+                        </a:p>
+                        <a:p>
+                          <a:pPr marL="1828800" lvl="2" indent="0">
+                            <a:buFont typeface="+mj-lt"/>
+                            <a:buNone/>
+                          </a:pPr>
+                          <a:r>
+                            <a:rPr lang="fr-FR" dirty="0">
+                              <a:latin typeface="Open Sans" panose="020B0606030504020204" pitchFamily="34" charset="0"/>
+                              <a:ea typeface="Open Sans" panose="020B0606030504020204" pitchFamily="34" charset="0"/>
+                              <a:cs typeface="Open Sans" panose="020B0606030504020204" pitchFamily="34" charset="0"/>
+                            </a:rPr>
+                            <a:t>j les successeurs de i</a:t>
+                          </a:r>
+                        </a:p>
+                        <a:p>
+                          <a:pPr marL="1828800" lvl="2" indent="0">
+                            <a:buFont typeface="+mj-lt"/>
+                            <a:buNone/>
+                          </a:pPr>
+                          <a:r>
+                            <a:rPr lang="fr-FR" dirty="0">
+                              <a:latin typeface="Open Sans" panose="020B0606030504020204" pitchFamily="34" charset="0"/>
+                              <a:ea typeface="Open Sans" panose="020B0606030504020204" pitchFamily="34" charset="0"/>
+                              <a:cs typeface="Open Sans" panose="020B0606030504020204" pitchFamily="34" charset="0"/>
+                            </a:rPr>
+                            <a:t>𝑑𝑖 la tâche de i</a:t>
+                          </a:r>
+                        </a:p>
+                        <a:p>
+                          <a:pPr lvl="0"/>
+                          <a:endParaRPr lang="fr-FR" dirty="0">
+                            <a:latin typeface="Open Sans" panose="020B0606030504020204" pitchFamily="34" charset="0"/>
+                            <a:ea typeface="Open Sans" panose="020B0606030504020204" pitchFamily="34" charset="0"/>
+                            <a:cs typeface="Open Sans" panose="020B0606030504020204" pitchFamily="34" charset="0"/>
+                          </a:endParaRPr>
+                        </a:p>
+                        <a:p>
+                          <a:endParaRPr lang="fr-FR" dirty="0">
+                            <a:latin typeface="Open Sans" panose="020B0606030504020204" pitchFamily="34" charset="0"/>
+                            <a:ea typeface="Open Sans" panose="020B0606030504020204" pitchFamily="34" charset="0"/>
+                            <a:cs typeface="Open Sans" panose="020B0606030504020204" pitchFamily="34" charset="0"/>
+                          </a:endParaRPr>
+                        </a:p>
+                        <a:p>
+                          <a:endParaRPr lang="fr-FR" dirty="0">
+                            <a:latin typeface="Open Sans" panose="020B0606030504020204" pitchFamily="34" charset="0"/>
+                            <a:ea typeface="Open Sans" panose="020B0606030504020204" pitchFamily="34" charset="0"/>
+                            <a:cs typeface="Open Sans" panose="020B0606030504020204" pitchFamily="34" charset="0"/>
+                          </a:endParaRPr>
+                        </a:p>
+                      </a:txBody>
+                      <a:tcPr>
+                        <a:lnL w="12700" cap="flat" cmpd="sng" algn="ctr">
+                          <a:solidFill>
+                            <a:schemeClr val="tx1"/>
+                          </a:solidFill>
+                          <a:prstDash val="solid"/>
+                          <a:round/>
+                          <a:headEnd type="none" w="med" len="med"/>
+                          <a:tailEnd type="none" w="med" len="med"/>
+                        </a:lnL>
+                        <a:lnR w="12700" cap="flat" cmpd="sng" algn="ctr">
+                          <a:noFill/>
+                          <a:prstDash val="solid"/>
+                          <a:round/>
+                          <a:headEnd type="none" w="med" len="med"/>
+                          <a:tailEnd type="none" w="med" len="med"/>
+                        </a:lnR>
+                        <a:lnT w="12700" cap="flat" cmpd="sng" algn="ctr">
+                          <a:noFill/>
+                          <a:prstDash val="solid"/>
+                          <a:round/>
+                          <a:headEnd type="none" w="med" len="med"/>
+                          <a:tailEnd type="none" w="med" len="med"/>
+                        </a:lnT>
+                        <a:lnB w="12700" cap="flat" cmpd="sng" algn="ctr">
+                          <a:noFill/>
+                          <a:prstDash val="solid"/>
+                          <a:round/>
+                          <a:headEnd type="none" w="med" len="med"/>
+                          <a:tailEnd type="none" w="med" len="med"/>
+                        </a:lnB>
+                        <a:lnTlToBr w="12700" cmpd="sng">
+                          <a:noFill/>
+                          <a:prstDash val="solid"/>
+                        </a:lnTlToBr>
+                        <a:lnBlToTr w="12700" cmpd="sng">
+                          <a:noFill/>
+                          <a:prstDash val="solid"/>
+                        </a:lnBlToTr>
+                        <a:solidFill>
+                          <a:schemeClr val="bg1"/>
+                        </a:solidFill>
+                      </a:tcPr>
+                    </a:tc>
+                    <a:extLst>
+                      <a:ext uri="{0D108BD9-81ED-4DB2-BD59-A6C34878D82A}">
+                        <a16:rowId xmlns:a16="http://schemas.microsoft.com/office/drawing/2014/main" val="1625328047"/>
+                      </a:ext>
+                    </a:extLst>
+                  </a:tr>
+                </a:tbl>
+              </a:graphicData>
+            </a:graphic>
+          </p:graphicFrame>
+        </mc:Choice>
+        <mc:Fallback>
+          <p:graphicFrame>
+            <p:nvGraphicFramePr>
+              <p:cNvPr id="4" name="Tableau 4">
+                <a:extLst>
+                  <a:ext uri="{FF2B5EF4-FFF2-40B4-BE49-F238E27FC236}">
+                    <a16:creationId xmlns:a16="http://schemas.microsoft.com/office/drawing/2014/main" id="{055DFC33-19BB-45F5-AE28-406FFBF8D91B}"/>
+                  </a:ext>
+                </a:extLst>
+              </p:cNvPr>
+              <p:cNvGraphicFramePr>
+                <a:graphicFrameLocks noGrp="1"/>
+              </p:cNvGraphicFramePr>
+              <p:nvPr>
+                <p:extLst>
+                  <p:ext uri="{D42A27DB-BD31-4B8C-83A1-F6EECF244321}">
+                    <p14:modId xmlns:p14="http://schemas.microsoft.com/office/powerpoint/2010/main" val="3899981507"/>
+                  </p:ext>
+                </p:extLst>
+              </p:nvPr>
+            </p:nvGraphicFramePr>
+            <p:xfrm>
+              <a:off x="1172368" y="3675988"/>
+              <a:ext cx="22042438" cy="7058406"/>
+            </p:xfrm>
+            <a:graphic>
+              <a:graphicData uri="http://schemas.openxmlformats.org/drawingml/2006/table">
+                <a:tbl>
+                  <a:tblPr>
+                    <a:tableStyleId>{5C22544A-7EE6-4342-B048-85BDC9FD1C3A}</a:tableStyleId>
+                  </a:tblPr>
+                  <a:tblGrid>
+                    <a:gridCol w="11021219">
+                      <a:extLst>
+                        <a:ext uri="{9D8B030D-6E8A-4147-A177-3AD203B41FA5}">
+                          <a16:colId xmlns:a16="http://schemas.microsoft.com/office/drawing/2014/main" val="1323346958"/>
+                        </a:ext>
+                      </a:extLst>
+                    </a:gridCol>
+                    <a:gridCol w="11021219">
+                      <a:extLst>
+                        <a:ext uri="{9D8B030D-6E8A-4147-A177-3AD203B41FA5}">
+                          <a16:colId xmlns:a16="http://schemas.microsoft.com/office/drawing/2014/main" val="334484170"/>
+                        </a:ext>
+                      </a:extLst>
+                    </a:gridCol>
+                  </a:tblGrid>
+                  <a:tr h="640080">
+                    <a:tc>
+                      <a:txBody>
+                        <a:bodyPr/>
+                        <a:lstStyle/>
+                        <a:p>
+                          <a:pPr algn="ctr"/>
+                          <a:r>
+                            <a:rPr lang="fr-FR" dirty="0">
+                              <a:latin typeface="Open Sans" panose="020B0606030504020204" pitchFamily="34" charset="0"/>
+                              <a:ea typeface="Open Sans" panose="020B0606030504020204" pitchFamily="34" charset="0"/>
+                              <a:cs typeface="Open Sans" panose="020B0606030504020204" pitchFamily="34" charset="0"/>
+                            </a:rPr>
+                            <a:t>Marge totale</a:t>
+                          </a:r>
+                        </a:p>
+                      </a:txBody>
+                      <a:tcPr>
+                        <a:lnL w="12700" cap="flat" cmpd="sng" algn="ctr">
+                          <a:noFill/>
+                          <a:prstDash val="solid"/>
+                          <a:round/>
+                          <a:headEnd type="none" w="med" len="med"/>
+                          <a:tailEnd type="none" w="med" len="med"/>
+                        </a:lnL>
+                        <a:lnR w="12700" cap="flat" cmpd="sng" algn="ctr">
+                          <a:solidFill>
+                            <a:schemeClr val="tx1"/>
+                          </a:solidFill>
+                          <a:prstDash val="solid"/>
+                          <a:round/>
+                          <a:headEnd type="none" w="med" len="med"/>
+                          <a:tailEnd type="none" w="med" len="med"/>
+                        </a:lnR>
+                        <a:lnT w="12700" cap="flat" cmpd="sng" algn="ctr">
+                          <a:noFill/>
+                          <a:prstDash val="solid"/>
+                          <a:round/>
+                          <a:headEnd type="none" w="med" len="med"/>
+                          <a:tailEnd type="none" w="med" len="med"/>
+                        </a:lnT>
+                        <a:lnB w="12700" cap="flat" cmpd="sng" algn="ctr">
+                          <a:noFill/>
+                          <a:prstDash val="solid"/>
+                          <a:round/>
+                          <a:headEnd type="none" w="med" len="med"/>
+                          <a:tailEnd type="none" w="med" len="med"/>
+                        </a:lnB>
+                        <a:lnTlToBr w="12700" cmpd="sng">
+                          <a:noFill/>
+                          <a:prstDash val="solid"/>
+                        </a:lnTlToBr>
+                        <a:lnBlToTr w="12700" cmpd="sng">
+                          <a:noFill/>
+                          <a:prstDash val="solid"/>
+                        </a:lnBlToTr>
+                        <a:solidFill>
+                          <a:schemeClr val="bg1"/>
+                        </a:solidFill>
+                      </a:tcPr>
+                    </a:tc>
+                    <a:tc>
+                      <a:txBody>
+                        <a:bodyPr/>
+                        <a:lstStyle/>
+                        <a:p>
+                          <a:pPr algn="ctr"/>
+                          <a:r>
+                            <a:rPr lang="fr-FR" dirty="0">
+                              <a:latin typeface="Open Sans" panose="020B0606030504020204" pitchFamily="34" charset="0"/>
+                              <a:ea typeface="Open Sans" panose="020B0606030504020204" pitchFamily="34" charset="0"/>
+                              <a:cs typeface="Open Sans" panose="020B0606030504020204" pitchFamily="34" charset="0"/>
+                            </a:rPr>
+                            <a:t>Marge libre</a:t>
+                          </a:r>
+                        </a:p>
+                      </a:txBody>
+                      <a:tcPr>
+                        <a:lnL w="12700" cap="flat" cmpd="sng" algn="ctr">
+                          <a:solidFill>
+                            <a:schemeClr val="tx1"/>
+                          </a:solidFill>
+                          <a:prstDash val="solid"/>
+                          <a:round/>
+                          <a:headEnd type="none" w="med" len="med"/>
+                          <a:tailEnd type="none" w="med" len="med"/>
+                        </a:lnL>
+                        <a:lnR w="12700" cap="flat" cmpd="sng" algn="ctr">
+                          <a:noFill/>
+                          <a:prstDash val="solid"/>
+                          <a:round/>
+                          <a:headEnd type="none" w="med" len="med"/>
+                          <a:tailEnd type="none" w="med" len="med"/>
+                        </a:lnR>
+                        <a:lnT w="12700" cap="flat" cmpd="sng" algn="ctr">
+                          <a:noFill/>
+                          <a:prstDash val="solid"/>
+                          <a:round/>
+                          <a:headEnd type="none" w="med" len="med"/>
+                          <a:tailEnd type="none" w="med" len="med"/>
+                        </a:lnT>
+                        <a:lnB w="12700" cap="flat" cmpd="sng" algn="ctr">
+                          <a:noFill/>
+                          <a:prstDash val="solid"/>
+                          <a:round/>
+                          <a:headEnd type="none" w="med" len="med"/>
+                          <a:tailEnd type="none" w="med" len="med"/>
+                        </a:lnB>
+                        <a:lnTlToBr w="12700" cmpd="sng">
+                          <a:noFill/>
+                          <a:prstDash val="solid"/>
+                        </a:lnTlToBr>
+                        <a:lnBlToTr w="12700" cmpd="sng">
+                          <a:noFill/>
+                          <a:prstDash val="solid"/>
+                        </a:lnBlToTr>
+                        <a:solidFill>
+                          <a:schemeClr val="bg1"/>
+                        </a:solidFill>
+                      </a:tcPr>
+                    </a:tc>
+                    <a:extLst>
+                      <a:ext uri="{0D108BD9-81ED-4DB2-BD59-A6C34878D82A}">
+                        <a16:rowId xmlns:a16="http://schemas.microsoft.com/office/drawing/2014/main" val="265165884"/>
+                      </a:ext>
+                    </a:extLst>
+                  </a:tr>
+                  <a:tr h="6418326">
+                    <a:tc>
+                      <a:txBody>
+                        <a:bodyPr/>
+                        <a:lstStyle/>
+                        <a:p>
+                          <a:endParaRPr lang="fr-FR" dirty="0">
+                            <a:latin typeface="Open Sans" panose="020B0606030504020204" pitchFamily="34" charset="0"/>
+                            <a:ea typeface="Open Sans" panose="020B0606030504020204" pitchFamily="34" charset="0"/>
+                            <a:cs typeface="Open Sans" panose="020B0606030504020204" pitchFamily="34" charset="0"/>
+                          </a:endParaRPr>
+                        </a:p>
+                        <a:p>
+                          <a:pPr marL="0" marR="0" lvl="0" indent="0" algn="l" defTabSz="1828800" rtl="0" eaLnBrk="1" fontAlgn="auto" latinLnBrk="0" hangingPunct="1">
+                            <a:lnSpc>
+                              <a:spcPct val="100000"/>
+                            </a:lnSpc>
+                            <a:spcBef>
+                              <a:spcPts val="0"/>
+                            </a:spcBef>
+                            <a:spcAft>
+                              <a:spcPts val="0"/>
+                            </a:spcAft>
+                            <a:buClrTx/>
+                            <a:buSzTx/>
+                            <a:buFontTx/>
+                            <a:buNone/>
+                            <a:tabLst/>
+                            <a:defRPr/>
+                          </a:pPr>
+                          <a:r>
+                            <a:rPr lang="fr-FR" sz="3600" dirty="0">
+                              <a:latin typeface="Open Sans" panose="020B0606030504020204" pitchFamily="34" charset="0"/>
+                              <a:ea typeface="Open Sans" panose="020B0606030504020204" pitchFamily="34" charset="0"/>
+                              <a:cs typeface="Open Sans" panose="020B0606030504020204" pitchFamily="34" charset="0"/>
+                              <a:sym typeface="Symbol" pitchFamily="18" charset="2"/>
+                            </a:rPr>
+                            <a:t>Pour chaque sommet i :</a:t>
+                          </a:r>
+                        </a:p>
+                        <a:p>
+                          <a:pPr marL="0" marR="0" lvl="0" indent="0" algn="l" defTabSz="1828800" rtl="0" eaLnBrk="1" fontAlgn="auto" latinLnBrk="0" hangingPunct="1">
+                            <a:lnSpc>
+                              <a:spcPct val="100000"/>
+                            </a:lnSpc>
+                            <a:spcBef>
+                              <a:spcPts val="0"/>
+                            </a:spcBef>
+                            <a:spcAft>
+                              <a:spcPts val="0"/>
+                            </a:spcAft>
+                            <a:buClrTx/>
+                            <a:buSzTx/>
+                            <a:buFontTx/>
+                            <a:buNone/>
+                            <a:tabLst/>
+                            <a:defRPr/>
+                          </a:pPr>
+                          <a:endParaRPr lang="fr-FR" sz="3600" dirty="0">
+                            <a:latin typeface="Open Sans" panose="020B0606030504020204" pitchFamily="34" charset="0"/>
+                            <a:ea typeface="Open Sans" panose="020B0606030504020204" pitchFamily="34" charset="0"/>
+                            <a:cs typeface="Open Sans" panose="020B0606030504020204" pitchFamily="34" charset="0"/>
+                            <a:sym typeface="Symbol" pitchFamily="18" charset="2"/>
+                          </a:endParaRPr>
+                        </a:p>
+                        <a:p>
+                          <a:pPr marL="914400" marR="0" lvl="1" indent="0" algn="l" defTabSz="1828800" rtl="0" eaLnBrk="1" fontAlgn="auto" latinLnBrk="0" hangingPunct="1">
+                            <a:lnSpc>
+                              <a:spcPct val="100000"/>
+                            </a:lnSpc>
+                            <a:spcBef>
+                              <a:spcPts val="0"/>
+                            </a:spcBef>
+                            <a:spcAft>
+                              <a:spcPts val="0"/>
+                            </a:spcAft>
+                            <a:buClrTx/>
+                            <a:buSzTx/>
+                            <a:buFontTx/>
+                            <a:buNone/>
+                            <a:tabLst/>
+                            <a:defRPr/>
+                          </a:pPr>
+                          <a:r>
+                            <a:rPr lang="fr-FR" sz="3600" dirty="0" err="1">
+                              <a:latin typeface="Open Sans" panose="020B0606030504020204" pitchFamily="34" charset="0"/>
+                              <a:ea typeface="Open Sans" panose="020B0606030504020204" pitchFamily="34" charset="0"/>
+                              <a:cs typeface="Open Sans" panose="020B0606030504020204" pitchFamily="34" charset="0"/>
+                              <a:sym typeface="Symbol" pitchFamily="18" charset="2"/>
+                            </a:rPr>
+                            <a:t>m</a:t>
+                          </a:r>
+                          <a:r>
+                            <a:rPr lang="fr-FR" sz="3600" baseline="-25000" dirty="0" err="1">
+                              <a:latin typeface="Open Sans" panose="020B0606030504020204" pitchFamily="34" charset="0"/>
+                              <a:ea typeface="Open Sans" panose="020B0606030504020204" pitchFamily="34" charset="0"/>
+                              <a:cs typeface="Open Sans" panose="020B0606030504020204" pitchFamily="34" charset="0"/>
+                              <a:sym typeface="Symbol" pitchFamily="18" charset="2"/>
+                            </a:rPr>
+                            <a:t>T</a:t>
+                          </a:r>
+                          <a:r>
+                            <a:rPr lang="fr-FR" sz="3600" baseline="-25000" dirty="0">
+                              <a:latin typeface="Open Sans" panose="020B0606030504020204" pitchFamily="34" charset="0"/>
+                              <a:ea typeface="Open Sans" panose="020B0606030504020204" pitchFamily="34" charset="0"/>
+                              <a:cs typeface="Open Sans" panose="020B0606030504020204" pitchFamily="34" charset="0"/>
+                              <a:sym typeface="Symbol" pitchFamily="18" charset="2"/>
+                            </a:rPr>
+                            <a:t> i </a:t>
+                          </a:r>
+                          <a:r>
+                            <a:rPr lang="fr-FR" sz="3600" dirty="0">
+                              <a:latin typeface="Open Sans" panose="020B0606030504020204" pitchFamily="34" charset="0"/>
+                              <a:ea typeface="Open Sans" panose="020B0606030504020204" pitchFamily="34" charset="0"/>
+                              <a:cs typeface="Open Sans" panose="020B0606030504020204" pitchFamily="34" charset="0"/>
+                              <a:sym typeface="Symbol" pitchFamily="18" charset="2"/>
+                            </a:rPr>
+                            <a:t>= T</a:t>
+                          </a:r>
+                          <a:r>
+                            <a:rPr lang="fr-FR" sz="3600" baseline="-25000" dirty="0">
+                              <a:latin typeface="Open Sans" panose="020B0606030504020204" pitchFamily="34" charset="0"/>
+                              <a:ea typeface="Open Sans" panose="020B0606030504020204" pitchFamily="34" charset="0"/>
+                              <a:cs typeface="Open Sans" panose="020B0606030504020204" pitchFamily="34" charset="0"/>
+                              <a:sym typeface="Symbol" pitchFamily="18" charset="2"/>
+                            </a:rPr>
+                            <a:t>i </a:t>
+                          </a:r>
+                          <a:r>
+                            <a:rPr lang="fr-FR" sz="3600" dirty="0">
+                              <a:latin typeface="Open Sans" panose="020B0606030504020204" pitchFamily="34" charset="0"/>
+                              <a:ea typeface="Open Sans" panose="020B0606030504020204" pitchFamily="34" charset="0"/>
+                              <a:cs typeface="Open Sans" panose="020B0606030504020204" pitchFamily="34" charset="0"/>
+                              <a:sym typeface="Symbol" pitchFamily="18" charset="2"/>
+                            </a:rPr>
+                            <a:t>- </a:t>
+                          </a:r>
+                          <a:r>
+                            <a:rPr lang="fr-FR" sz="3600" baseline="-25000" dirty="0">
+                              <a:latin typeface="Open Sans" panose="020B0606030504020204" pitchFamily="34" charset="0"/>
+                              <a:ea typeface="Open Sans" panose="020B0606030504020204" pitchFamily="34" charset="0"/>
+                              <a:cs typeface="Open Sans" panose="020B0606030504020204" pitchFamily="34" charset="0"/>
+                            </a:rPr>
+                            <a:t>i</a:t>
+                          </a:r>
+                        </a:p>
+                        <a:p>
+                          <a:pPr marL="914400" marR="0" lvl="1" indent="0" algn="l" defTabSz="1828800" rtl="0" eaLnBrk="1" fontAlgn="auto" latinLnBrk="0" hangingPunct="1">
+                            <a:lnSpc>
+                              <a:spcPct val="100000"/>
+                            </a:lnSpc>
+                            <a:spcBef>
+                              <a:spcPts val="0"/>
+                            </a:spcBef>
+                            <a:spcAft>
+                              <a:spcPts val="0"/>
+                            </a:spcAft>
+                            <a:buClrTx/>
+                            <a:buSzTx/>
+                            <a:buFontTx/>
+                            <a:buNone/>
+                            <a:tabLst/>
+                            <a:defRPr/>
+                          </a:pPr>
+                          <a:endParaRPr lang="fr-FR" sz="3600" baseline="-25000" dirty="0">
+                            <a:latin typeface="Open Sans" panose="020B0606030504020204" pitchFamily="34" charset="0"/>
+                            <a:ea typeface="Open Sans" panose="020B0606030504020204" pitchFamily="34" charset="0"/>
+                            <a:cs typeface="Open Sans" panose="020B0606030504020204" pitchFamily="34" charset="0"/>
+                          </a:endParaRPr>
+                        </a:p>
+                        <a:p>
+                          <a:pPr marL="914400" marR="0" lvl="1" indent="0" algn="l" defTabSz="1828800" rtl="0" eaLnBrk="1" fontAlgn="auto" latinLnBrk="0" hangingPunct="1">
+                            <a:lnSpc>
+                              <a:spcPct val="100000"/>
+                            </a:lnSpc>
+                            <a:spcBef>
+                              <a:spcPts val="0"/>
+                            </a:spcBef>
+                            <a:spcAft>
+                              <a:spcPts val="0"/>
+                            </a:spcAft>
+                            <a:buClrTx/>
+                            <a:buSzTx/>
+                            <a:buFontTx/>
+                            <a:buNone/>
+                            <a:tabLst/>
+                            <a:defRPr/>
+                          </a:pPr>
+                          <a:r>
+                            <a:rPr lang="fr-FR" sz="3600" dirty="0">
+                              <a:latin typeface="Open Sans" panose="020B0606030504020204" pitchFamily="34" charset="0"/>
+                              <a:ea typeface="Open Sans" panose="020B0606030504020204" pitchFamily="34" charset="0"/>
+                              <a:cs typeface="Open Sans" panose="020B0606030504020204" pitchFamily="34" charset="0"/>
+                              <a:sym typeface="Symbol" pitchFamily="18" charset="2"/>
+                            </a:rPr>
+                            <a:t>avec</a:t>
+                          </a:r>
+                        </a:p>
+                        <a:p>
+                          <a:pPr marL="1828800" marR="0" lvl="2" indent="0" algn="l" defTabSz="1828800" rtl="0" eaLnBrk="1" fontAlgn="auto" latinLnBrk="0" hangingPunct="1">
+                            <a:lnSpc>
+                              <a:spcPct val="100000"/>
+                            </a:lnSpc>
+                            <a:spcBef>
+                              <a:spcPts val="0"/>
+                            </a:spcBef>
+                            <a:spcAft>
+                              <a:spcPts val="0"/>
+                            </a:spcAft>
+                            <a:buClrTx/>
+                            <a:buSzTx/>
+                            <a:buFontTx/>
+                            <a:buNone/>
+                            <a:tabLst/>
+                            <a:defRPr/>
+                          </a:pPr>
+                          <a:r>
+                            <a:rPr lang="fr-FR" sz="3600" dirty="0">
+                              <a:latin typeface="Open Sans" panose="020B0606030504020204" pitchFamily="34" charset="0"/>
+                              <a:ea typeface="Open Sans" panose="020B0606030504020204" pitchFamily="34" charset="0"/>
+                              <a:cs typeface="Open Sans" panose="020B0606030504020204" pitchFamily="34" charset="0"/>
+                              <a:sym typeface="Symbol" pitchFamily="18" charset="2"/>
+                            </a:rPr>
+                            <a:t>T</a:t>
+                          </a:r>
+                          <a:r>
+                            <a:rPr lang="fr-FR" sz="3600" baseline="-25000" dirty="0">
+                              <a:latin typeface="Open Sans" panose="020B0606030504020204" pitchFamily="34" charset="0"/>
+                              <a:ea typeface="Open Sans" panose="020B0606030504020204" pitchFamily="34" charset="0"/>
+                              <a:cs typeface="Open Sans" panose="020B0606030504020204" pitchFamily="34" charset="0"/>
+                              <a:sym typeface="Symbol" pitchFamily="18" charset="2"/>
+                            </a:rPr>
+                            <a:t>i</a:t>
+                          </a:r>
+                          <a:r>
+                            <a:rPr lang="fr-FR" sz="3600" baseline="0" dirty="0">
+                              <a:latin typeface="Open Sans" panose="020B0606030504020204" pitchFamily="34" charset="0"/>
+                              <a:ea typeface="Open Sans" panose="020B0606030504020204" pitchFamily="34" charset="0"/>
+                              <a:cs typeface="Open Sans" panose="020B0606030504020204" pitchFamily="34" charset="0"/>
+                              <a:sym typeface="Symbol" pitchFamily="18" charset="2"/>
+                            </a:rPr>
+                            <a:t> = date au plus tard</a:t>
+                          </a:r>
+                        </a:p>
+                        <a:p>
+                          <a:pPr marL="1828800" marR="0" lvl="2" indent="0" algn="l" defTabSz="1828800" rtl="0" eaLnBrk="1" fontAlgn="auto" latinLnBrk="0" hangingPunct="1">
+                            <a:lnSpc>
+                              <a:spcPct val="100000"/>
+                            </a:lnSpc>
+                            <a:spcBef>
+                              <a:spcPts val="0"/>
+                            </a:spcBef>
+                            <a:spcAft>
+                              <a:spcPts val="0"/>
+                            </a:spcAft>
+                            <a:buClrTx/>
+                            <a:buSzTx/>
+                            <a:buFontTx/>
+                            <a:buNone/>
+                            <a:tabLst/>
+                            <a:defRPr/>
+                          </a:pPr>
+                          <a:r>
+                            <a:rPr lang="fr-FR" sz="3600" dirty="0">
+                              <a:latin typeface="Open Sans" panose="020B0606030504020204" pitchFamily="34" charset="0"/>
+                              <a:ea typeface="Open Sans" panose="020B0606030504020204" pitchFamily="34" charset="0"/>
+                              <a:cs typeface="Open Sans" panose="020B0606030504020204" pitchFamily="34" charset="0"/>
+                              <a:sym typeface="Symbol" pitchFamily="18" charset="2"/>
+                            </a:rPr>
+                            <a:t></a:t>
+                          </a:r>
+                          <a:r>
+                            <a:rPr lang="fr-FR" sz="3600" baseline="-25000" dirty="0">
+                              <a:latin typeface="Open Sans" panose="020B0606030504020204" pitchFamily="34" charset="0"/>
+                              <a:ea typeface="Open Sans" panose="020B0606030504020204" pitchFamily="34" charset="0"/>
+                              <a:cs typeface="Open Sans" panose="020B0606030504020204" pitchFamily="34" charset="0"/>
+                            </a:rPr>
+                            <a:t>i</a:t>
+                          </a:r>
+                          <a:r>
+                            <a:rPr lang="fr-FR" sz="3600" baseline="0" dirty="0">
+                              <a:latin typeface="Open Sans" panose="020B0606030504020204" pitchFamily="34" charset="0"/>
+                              <a:ea typeface="Open Sans" panose="020B0606030504020204" pitchFamily="34" charset="0"/>
+                              <a:cs typeface="Open Sans" panose="020B0606030504020204" pitchFamily="34" charset="0"/>
+                            </a:rPr>
+                            <a:t> = date au plus tôt</a:t>
+                          </a:r>
+                          <a:endParaRPr lang="fr-FR" sz="3600" baseline="-25000" dirty="0">
+                            <a:latin typeface="Open Sans" panose="020B0606030504020204" pitchFamily="34" charset="0"/>
+                            <a:ea typeface="Open Sans" panose="020B0606030504020204" pitchFamily="34" charset="0"/>
+                            <a:cs typeface="Open Sans" panose="020B0606030504020204" pitchFamily="34" charset="0"/>
+                          </a:endParaRPr>
+                        </a:p>
+                        <a:p>
+                          <a:pPr marL="914400" marR="0" lvl="1" indent="0" algn="l" defTabSz="1828800" rtl="0" eaLnBrk="1" fontAlgn="auto" latinLnBrk="0" hangingPunct="1">
+                            <a:lnSpc>
+                              <a:spcPct val="100000"/>
+                            </a:lnSpc>
+                            <a:spcBef>
+                              <a:spcPts val="0"/>
+                            </a:spcBef>
+                            <a:spcAft>
+                              <a:spcPts val="0"/>
+                            </a:spcAft>
+                            <a:buClrTx/>
+                            <a:buSzTx/>
+                            <a:buFontTx/>
+                            <a:buNone/>
+                            <a:tabLst/>
+                            <a:defRPr/>
+                          </a:pPr>
+                          <a:endParaRPr lang="fr-FR" sz="3600" baseline="0" dirty="0">
+                            <a:latin typeface="Open Sans" panose="020B0606030504020204" pitchFamily="34" charset="0"/>
+                            <a:ea typeface="Open Sans" panose="020B0606030504020204" pitchFamily="34" charset="0"/>
+                            <a:cs typeface="Open Sans" panose="020B0606030504020204" pitchFamily="34" charset="0"/>
+                            <a:sym typeface="Symbol" pitchFamily="18" charset="2"/>
+                          </a:endParaRPr>
+                        </a:p>
+                        <a:p>
+                          <a:pPr marL="914400" marR="0" lvl="1" indent="0" algn="l" defTabSz="1828800" rtl="0" eaLnBrk="1" fontAlgn="auto" latinLnBrk="0" hangingPunct="1">
+                            <a:lnSpc>
+                              <a:spcPct val="100000"/>
+                            </a:lnSpc>
+                            <a:spcBef>
+                              <a:spcPts val="0"/>
+                            </a:spcBef>
+                            <a:spcAft>
+                              <a:spcPts val="0"/>
+                            </a:spcAft>
+                            <a:buClrTx/>
+                            <a:buSzTx/>
+                            <a:buFontTx/>
+                            <a:buNone/>
+                            <a:tabLst/>
+                            <a:defRPr/>
+                          </a:pPr>
+                          <a:endParaRPr lang="fr-FR" sz="3600" dirty="0">
+                            <a:latin typeface="Open Sans" panose="020B0606030504020204" pitchFamily="34" charset="0"/>
+                            <a:ea typeface="Open Sans" panose="020B0606030504020204" pitchFamily="34" charset="0"/>
+                            <a:cs typeface="Open Sans" panose="020B0606030504020204" pitchFamily="34" charset="0"/>
+                          </a:endParaRPr>
+                        </a:p>
+                        <a:p>
+                          <a:endParaRPr lang="fr-FR" dirty="0">
+                            <a:latin typeface="Open Sans" panose="020B0606030504020204" pitchFamily="34" charset="0"/>
+                            <a:ea typeface="Open Sans" panose="020B0606030504020204" pitchFamily="34" charset="0"/>
+                            <a:cs typeface="Open Sans" panose="020B0606030504020204" pitchFamily="34" charset="0"/>
+                          </a:endParaRPr>
+                        </a:p>
+                      </a:txBody>
+                      <a:tcPr>
+                        <a:lnL w="12700" cap="flat" cmpd="sng" algn="ctr">
+                          <a:noFill/>
+                          <a:prstDash val="solid"/>
+                          <a:round/>
+                          <a:headEnd type="none" w="med" len="med"/>
+                          <a:tailEnd type="none" w="med" len="med"/>
+                        </a:lnL>
+                        <a:lnR w="12700" cap="flat" cmpd="sng" algn="ctr">
+                          <a:solidFill>
+                            <a:schemeClr val="tx1"/>
+                          </a:solidFill>
+                          <a:prstDash val="solid"/>
+                          <a:round/>
+                          <a:headEnd type="none" w="med" len="med"/>
+                          <a:tailEnd type="none" w="med" len="med"/>
+                        </a:lnR>
+                        <a:lnT w="12700" cap="flat" cmpd="sng" algn="ctr">
+                          <a:noFill/>
+                          <a:prstDash val="solid"/>
+                          <a:round/>
+                          <a:headEnd type="none" w="med" len="med"/>
+                          <a:tailEnd type="none" w="med" len="med"/>
+                        </a:lnT>
+                        <a:lnB w="12700" cap="flat" cmpd="sng" algn="ctr">
+                          <a:noFill/>
+                          <a:prstDash val="solid"/>
+                          <a:round/>
+                          <a:headEnd type="none" w="med" len="med"/>
+                          <a:tailEnd type="none" w="med" len="med"/>
+                        </a:lnB>
+                        <a:lnTlToBr w="12700" cmpd="sng">
+                          <a:noFill/>
+                          <a:prstDash val="solid"/>
+                        </a:lnTlToBr>
+                        <a:lnBlToTr w="12700" cmpd="sng">
+                          <a:noFill/>
+                          <a:prstDash val="solid"/>
+                        </a:lnBlToTr>
+                        <a:solidFill>
+                          <a:schemeClr val="bg1"/>
+                        </a:solidFill>
+                      </a:tcPr>
+                    </a:tc>
+                    <a:tc>
+                      <a:txBody>
+                        <a:bodyPr/>
+                        <a:lstStyle/>
+                        <a:p>
+                          <a:endParaRPr lang="fr-FR"/>
+                        </a:p>
+                      </a:txBody>
+                      <a:tcPr>
+                        <a:lnL w="12700" cap="flat" cmpd="sng" algn="ctr">
+                          <a:solidFill>
+                            <a:schemeClr val="tx1"/>
+                          </a:solidFill>
+                          <a:prstDash val="solid"/>
+                          <a:round/>
+                          <a:headEnd type="none" w="med" len="med"/>
+                          <a:tailEnd type="none" w="med" len="med"/>
+                        </a:lnL>
+                        <a:lnR w="12700" cap="flat" cmpd="sng" algn="ctr">
+                          <a:noFill/>
+                          <a:prstDash val="solid"/>
+                          <a:round/>
+                          <a:headEnd type="none" w="med" len="med"/>
+                          <a:tailEnd type="none" w="med" len="med"/>
+                        </a:lnR>
+                        <a:lnT w="12700" cap="flat" cmpd="sng" algn="ctr">
+                          <a:noFill/>
+                          <a:prstDash val="solid"/>
+                          <a:round/>
+                          <a:headEnd type="none" w="med" len="med"/>
+                          <a:tailEnd type="none" w="med" len="med"/>
+                        </a:lnT>
+                        <a:lnB w="12700" cap="flat" cmpd="sng" algn="ctr">
+                          <a:noFill/>
+                          <a:prstDash val="solid"/>
+                          <a:round/>
+                          <a:headEnd type="none" w="med" len="med"/>
+                          <a:tailEnd type="none" w="med" len="med"/>
+                        </a:lnB>
+                        <a:lnTlToBr w="12700" cmpd="sng">
+                          <a:noFill/>
+                          <a:prstDash val="solid"/>
+                        </a:lnTlToBr>
+                        <a:lnBlToTr w="12700" cmpd="sng">
+                          <a:noFill/>
+                          <a:prstDash val="solid"/>
+                        </a:lnBlToTr>
+                        <a:blipFill>
+                          <a:blip r:embed="rId2"/>
+                          <a:stretch>
+                            <a:fillRect l="-100055" t="-11396" b="-95"/>
+                          </a:stretch>
+                        </a:blipFill>
+                      </a:tcPr>
+                    </a:tc>
+                    <a:extLst>
+                      <a:ext uri="{0D108BD9-81ED-4DB2-BD59-A6C34878D82A}">
+                        <a16:rowId xmlns:a16="http://schemas.microsoft.com/office/drawing/2014/main" val="1625328047"/>
+                      </a:ext>
+                    </a:extLst>
+                  </a:tr>
+                </a:tbl>
+              </a:graphicData>
+            </a:graphic>
+          </p:graphicFrame>
+        </mc:Fallback>
+      </mc:AlternateContent>
+    </p:spTree>
+    <p:extLst>
+      <p:ext uri="{BB962C8B-B14F-4D97-AF65-F5344CB8AC3E}">
+        <p14:creationId xmlns:p14="http://schemas.microsoft.com/office/powerpoint/2010/main" val="384183547"/>
+      </p:ext>
+    </p:extLst>
+  </p:cSld>
+  <p:clrMapOvr>
+    <a:masterClrMapping/>
+  </p:clrMapOvr>
+</p:sld>
+</file>
+
+<file path=ppt/slides/slide21.xml><?xml version="1.0" encoding="utf-8"?>
+<p:sld xmlns:a="http://schemas.openxmlformats.org/drawingml/2006/main" xmlns:r="http://schemas.openxmlformats.org/officeDocument/2006/relationships" xmlns:p="http://schemas.openxmlformats.org/presentationml/2006/main">
+  <p:cSld>
+    <p:spTree>
+      <p:nvGrpSpPr>
+        <p:cNvPr id="1" name=""/>
+        <p:cNvGrpSpPr/>
+        <p:nvPr/>
+      </p:nvGrpSpPr>
+      <p:grpSpPr>
+        <a:xfrm>
+          <a:off x="0" y="0"/>
+          <a:ext cx="0" cy="0"/>
+          <a:chOff x="0" y="0"/>
+          <a:chExt cx="0" cy="0"/>
+        </a:xfrm>
+      </p:grpSpPr>
+      <p:sp>
+        <p:nvSpPr>
+          <p:cNvPr id="2" name="ZoneTexte 1">
+            <a:extLst>
+              <a:ext uri="{FF2B5EF4-FFF2-40B4-BE49-F238E27FC236}">
+                <a16:creationId xmlns:a16="http://schemas.microsoft.com/office/drawing/2014/main" id="{633365F7-C813-433A-A0BE-B1CECF57D748}"/>
+              </a:ext>
+            </a:extLst>
+          </p:cNvPr>
+          <p:cNvSpPr txBox="1"/>
+          <p:nvPr/>
+        </p:nvSpPr>
+        <p:spPr>
+          <a:xfrm>
+            <a:off x="2375271" y="1113184"/>
+            <a:ext cx="17880677" cy="1046440"/>
+          </a:xfrm>
+          <a:prstGeom prst="rect">
+            <a:avLst/>
+          </a:prstGeom>
+          <a:noFill/>
+        </p:spPr>
+        <p:txBody>
+          <a:bodyPr wrap="square" rtlCol="0">
+            <a:spAutoFit/>
+          </a:bodyPr>
+          <a:lstStyle/>
+          <a:p>
+            <a:r>
+              <a:rPr lang="fr-FR" sz="6200" b="1" dirty="0">
+                <a:latin typeface="Montserrat" panose="00000500000000000000" pitchFamily="2" charset="0"/>
+              </a:rPr>
+              <a:t>V : Méthode de l’ordonnancement</a:t>
+            </a:r>
+          </a:p>
+        </p:txBody>
+      </p:sp>
+      <p:pic>
+        <p:nvPicPr>
+          <p:cNvPr id="3" name="Image 2">
+            <a:extLst>
+              <a:ext uri="{FF2B5EF4-FFF2-40B4-BE49-F238E27FC236}">
+                <a16:creationId xmlns:a16="http://schemas.microsoft.com/office/drawing/2014/main" id="{5B1C28B7-52AA-421F-BF5B-5E12CD7C4A37}"/>
+              </a:ext>
+            </a:extLst>
+          </p:cNvPr>
+          <p:cNvPicPr>
+            <a:picLocks noChangeAspect="1"/>
+          </p:cNvPicPr>
+          <p:nvPr/>
+        </p:nvPicPr>
+        <p:blipFill>
+          <a:blip r:embed="rId2"/>
+          <a:stretch>
+            <a:fillRect/>
+          </a:stretch>
+        </p:blipFill>
+        <p:spPr>
+          <a:xfrm>
+            <a:off x="5768974" y="4188538"/>
+            <a:ext cx="13493061" cy="5536328"/>
+          </a:xfrm>
+          <a:prstGeom prst="rect">
+            <a:avLst/>
+          </a:prstGeom>
+        </p:spPr>
+      </p:pic>
+    </p:spTree>
+    <p:extLst>
+      <p:ext uri="{BB962C8B-B14F-4D97-AF65-F5344CB8AC3E}">
+        <p14:creationId xmlns:p14="http://schemas.microsoft.com/office/powerpoint/2010/main" val="1479981017"/>
       </p:ext>
     </p:extLst>
   </p:cSld>

</xml_diff>